<commit_message>
Create slides for classical statistics
</commit_message>
<xml_diff>
--- a/slides/intro_to_bayes_slides.pptx
+++ b/slides/intro_to_bayes_slides.pptx
@@ -16,25 +16,33 @@
     <p:sldId id="261" r:id="rId11"/>
     <p:sldId id="262" r:id="rId12"/>
     <p:sldId id="263" r:id="rId13"/>
+    <p:sldId id="264" r:id="rId14"/>
+    <p:sldId id="265" r:id="rId15"/>
+    <p:sldId id="266" r:id="rId16"/>
+    <p:sldId id="267" r:id="rId17"/>
+    <p:sldId id="268" r:id="rId18"/>
+    <p:sldId id="269" r:id="rId19"/>
+    <p:sldId id="270" r:id="rId20"/>
+    <p:sldId id="271" r:id="rId21"/>
   </p:sldIdLst>
   <p:sldSz cy="5143500" cx="9144000"/>
   <p:notesSz cx="6858000" cy="9144000"/>
   <p:embeddedFontLst>
     <p:embeddedFont>
       <p:font typeface="Average"/>
-      <p:regular r:id="rId14"/>
+      <p:regular r:id="rId22"/>
     </p:embeddedFont>
     <p:embeddedFont>
       <p:font typeface="Ubuntu Mono"/>
-      <p:regular r:id="rId15"/>
-      <p:bold r:id="rId16"/>
-      <p:italic r:id="rId17"/>
-      <p:boldItalic r:id="rId18"/>
+      <p:regular r:id="rId23"/>
+      <p:bold r:id="rId24"/>
+      <p:italic r:id="rId25"/>
+      <p:boldItalic r:id="rId26"/>
     </p:embeddedFont>
     <p:embeddedFont>
       <p:font typeface="Oswald"/>
-      <p:regular r:id="rId19"/>
-      <p:bold r:id="rId20"/>
+      <p:regular r:id="rId27"/>
+      <p:bold r:id="rId28"/>
     </p:embeddedFont>
   </p:embeddedFontLst>
   <p:defaultTextStyle>
@@ -810,6 +818,699 @@
 </p:notes>
 </file>
 
+<file path=ppt/notesSlides/notesSlide10.xml><?xml version="1.0" encoding="utf-8"?>
+<p:notes xmlns:a="http://schemas.openxmlformats.org/drawingml/2006/main" xmlns:r="http://schemas.openxmlformats.org/officeDocument/2006/relationships" xmlns:mc="http://schemas.openxmlformats.org/markup-compatibility/2006" xmlns:mv="urn:schemas-microsoft-com:mac:vml" xmlns:p="http://schemas.openxmlformats.org/presentationml/2006/main" xmlns:c="http://schemas.openxmlformats.org/drawingml/2006/chart" xmlns:dgm="http://schemas.openxmlformats.org/drawingml/2006/diagram" xmlns:o="urn:schemas-microsoft-com:office:office" xmlns:v="urn:schemas-microsoft-com:vml" xmlns:pvml="urn:schemas-microsoft-com:office:powerpoint" xmlns:com="http://schemas.openxmlformats.org/drawingml/2006/compatibility" xmlns:p14="http://schemas.microsoft.com/office/powerpoint/2010/main" xmlns:p15="http://schemas.microsoft.com/office/powerpoint/2012/main" showMasterPhAnim="0" showMasterSp="0">
+  <p:cSld>
+    <p:spTree>
+      <p:nvGrpSpPr>
+        <p:cNvPr id="115" name="Shape 115"/>
+        <p:cNvGrpSpPr/>
+        <p:nvPr/>
+      </p:nvGrpSpPr>
+      <p:grpSpPr>
+        <a:xfrm>
+          <a:off x="0" y="0"/>
+          <a:ext cx="0" cy="0"/>
+          <a:chOff x="0" y="0"/>
+          <a:chExt cx="0" cy="0"/>
+        </a:xfrm>
+      </p:grpSpPr>
+      <p:sp>
+        <p:nvSpPr>
+          <p:cNvPr id="116" name="Google Shape;116;g5d7ecab40a_0_130:notes"/>
+          <p:cNvSpPr/>
+          <p:nvPr>
+            <p:ph idx="2" type="sldImg"/>
+          </p:nvPr>
+        </p:nvSpPr>
+        <p:spPr>
+          <a:xfrm>
+            <a:off x="381300" y="685800"/>
+            <a:ext cx="6096000" cy="3429000"/>
+          </a:xfrm>
+          <a:custGeom>
+            <a:rect b="b" l="l" r="r" t="t"/>
+            <a:pathLst>
+              <a:path extrusionOk="0" h="120000" w="120000">
+                <a:moveTo>
+                  <a:pt x="0" y="0"/>
+                </a:moveTo>
+                <a:lnTo>
+                  <a:pt x="120000" y="0"/>
+                </a:lnTo>
+                <a:lnTo>
+                  <a:pt x="120000" y="120000"/>
+                </a:lnTo>
+                <a:lnTo>
+                  <a:pt x="0" y="120000"/>
+                </a:lnTo>
+                <a:close/>
+              </a:path>
+            </a:pathLst>
+          </a:custGeom>
+        </p:spPr>
+      </p:sp>
+      <p:sp>
+        <p:nvSpPr>
+          <p:cNvPr id="117" name="Google Shape;117;g5d7ecab40a_0_130:notes"/>
+          <p:cNvSpPr txBox="1"/>
+          <p:nvPr>
+            <p:ph idx="1" type="body"/>
+          </p:nvPr>
+        </p:nvSpPr>
+        <p:spPr>
+          <a:xfrm>
+            <a:off x="685800" y="4343400"/>
+            <a:ext cx="5486400" cy="4114800"/>
+          </a:xfrm>
+          <a:prstGeom prst="rect">
+            <a:avLst/>
+          </a:prstGeom>
+        </p:spPr>
+        <p:txBody>
+          <a:bodyPr anchorCtr="0" anchor="t" bIns="91425" lIns="91425" spcFirstLastPara="1" rIns="91425" wrap="square" tIns="91425">
+            <a:noAutofit/>
+          </a:bodyPr>
+          <a:lstStyle/>
+          <a:p>
+            <a:pPr indent="0" lvl="0" marL="0" rtl="0" algn="l">
+              <a:spcBef>
+                <a:spcPts val="0"/>
+              </a:spcBef>
+              <a:spcAft>
+                <a:spcPts val="0"/>
+              </a:spcAft>
+              <a:buNone/>
+            </a:pPr>
+            <a:r>
+              <a:t/>
+            </a:r>
+            <a:endParaRPr/>
+          </a:p>
+        </p:txBody>
+      </p:sp>
+    </p:spTree>
+  </p:cSld>
+  <p:clrMapOvr>
+    <a:masterClrMapping/>
+  </p:clrMapOvr>
+</p:notes>
+</file>
+
+<file path=ppt/notesSlides/notesSlide11.xml><?xml version="1.0" encoding="utf-8"?>
+<p:notes xmlns:a="http://schemas.openxmlformats.org/drawingml/2006/main" xmlns:r="http://schemas.openxmlformats.org/officeDocument/2006/relationships" xmlns:mc="http://schemas.openxmlformats.org/markup-compatibility/2006" xmlns:mv="urn:schemas-microsoft-com:mac:vml" xmlns:p="http://schemas.openxmlformats.org/presentationml/2006/main" xmlns:c="http://schemas.openxmlformats.org/drawingml/2006/chart" xmlns:dgm="http://schemas.openxmlformats.org/drawingml/2006/diagram" xmlns:o="urn:schemas-microsoft-com:office:office" xmlns:v="urn:schemas-microsoft-com:vml" xmlns:pvml="urn:schemas-microsoft-com:office:powerpoint" xmlns:com="http://schemas.openxmlformats.org/drawingml/2006/compatibility" xmlns:p14="http://schemas.microsoft.com/office/powerpoint/2010/main" xmlns:p15="http://schemas.microsoft.com/office/powerpoint/2012/main" showMasterPhAnim="0" showMasterSp="0">
+  <p:cSld>
+    <p:spTree>
+      <p:nvGrpSpPr>
+        <p:cNvPr id="123" name="Shape 123"/>
+        <p:cNvGrpSpPr/>
+        <p:nvPr/>
+      </p:nvGrpSpPr>
+      <p:grpSpPr>
+        <a:xfrm>
+          <a:off x="0" y="0"/>
+          <a:ext cx="0" cy="0"/>
+          <a:chOff x="0" y="0"/>
+          <a:chExt cx="0" cy="0"/>
+        </a:xfrm>
+      </p:grpSpPr>
+      <p:sp>
+        <p:nvSpPr>
+          <p:cNvPr id="124" name="Google Shape;124;g5d7ecab40a_0_86:notes"/>
+          <p:cNvSpPr/>
+          <p:nvPr>
+            <p:ph idx="2" type="sldImg"/>
+          </p:nvPr>
+        </p:nvSpPr>
+        <p:spPr>
+          <a:xfrm>
+            <a:off x="381300" y="685800"/>
+            <a:ext cx="6096000" cy="3429000"/>
+          </a:xfrm>
+          <a:custGeom>
+            <a:rect b="b" l="l" r="r" t="t"/>
+            <a:pathLst>
+              <a:path extrusionOk="0" h="120000" w="120000">
+                <a:moveTo>
+                  <a:pt x="0" y="0"/>
+                </a:moveTo>
+                <a:lnTo>
+                  <a:pt x="120000" y="0"/>
+                </a:lnTo>
+                <a:lnTo>
+                  <a:pt x="120000" y="120000"/>
+                </a:lnTo>
+                <a:lnTo>
+                  <a:pt x="0" y="120000"/>
+                </a:lnTo>
+                <a:close/>
+              </a:path>
+            </a:pathLst>
+          </a:custGeom>
+        </p:spPr>
+      </p:sp>
+      <p:sp>
+        <p:nvSpPr>
+          <p:cNvPr id="125" name="Google Shape;125;g5d7ecab40a_0_86:notes"/>
+          <p:cNvSpPr txBox="1"/>
+          <p:nvPr>
+            <p:ph idx="1" type="body"/>
+          </p:nvPr>
+        </p:nvSpPr>
+        <p:spPr>
+          <a:xfrm>
+            <a:off x="685800" y="4343400"/>
+            <a:ext cx="5486400" cy="4114800"/>
+          </a:xfrm>
+          <a:prstGeom prst="rect">
+            <a:avLst/>
+          </a:prstGeom>
+        </p:spPr>
+        <p:txBody>
+          <a:bodyPr anchorCtr="0" anchor="t" bIns="91425" lIns="91425" spcFirstLastPara="1" rIns="91425" wrap="square" tIns="91425">
+            <a:noAutofit/>
+          </a:bodyPr>
+          <a:lstStyle/>
+          <a:p>
+            <a:pPr indent="0" lvl="0" marL="0" rtl="0" algn="l">
+              <a:spcBef>
+                <a:spcPts val="0"/>
+              </a:spcBef>
+              <a:spcAft>
+                <a:spcPts val="0"/>
+              </a:spcAft>
+              <a:buNone/>
+            </a:pPr>
+            <a:r>
+              <a:t/>
+            </a:r>
+            <a:endParaRPr/>
+          </a:p>
+        </p:txBody>
+      </p:sp>
+    </p:spTree>
+  </p:cSld>
+  <p:clrMapOvr>
+    <a:masterClrMapping/>
+  </p:clrMapOvr>
+</p:notes>
+</file>
+
+<file path=ppt/notesSlides/notesSlide12.xml><?xml version="1.0" encoding="utf-8"?>
+<p:notes xmlns:a="http://schemas.openxmlformats.org/drawingml/2006/main" xmlns:r="http://schemas.openxmlformats.org/officeDocument/2006/relationships" xmlns:mc="http://schemas.openxmlformats.org/markup-compatibility/2006" xmlns:mv="urn:schemas-microsoft-com:mac:vml" xmlns:p="http://schemas.openxmlformats.org/presentationml/2006/main" xmlns:c="http://schemas.openxmlformats.org/drawingml/2006/chart" xmlns:dgm="http://schemas.openxmlformats.org/drawingml/2006/diagram" xmlns:o="urn:schemas-microsoft-com:office:office" xmlns:v="urn:schemas-microsoft-com:vml" xmlns:pvml="urn:schemas-microsoft-com:office:powerpoint" xmlns:com="http://schemas.openxmlformats.org/drawingml/2006/compatibility" xmlns:p14="http://schemas.microsoft.com/office/powerpoint/2010/main" xmlns:p15="http://schemas.microsoft.com/office/powerpoint/2012/main" showMasterPhAnim="0" showMasterSp="0">
+  <p:cSld>
+    <p:spTree>
+      <p:nvGrpSpPr>
+        <p:cNvPr id="129" name="Shape 129"/>
+        <p:cNvGrpSpPr/>
+        <p:nvPr/>
+      </p:nvGrpSpPr>
+      <p:grpSpPr>
+        <a:xfrm>
+          <a:off x="0" y="0"/>
+          <a:ext cx="0" cy="0"/>
+          <a:chOff x="0" y="0"/>
+          <a:chExt cx="0" cy="0"/>
+        </a:xfrm>
+      </p:grpSpPr>
+      <p:sp>
+        <p:nvSpPr>
+          <p:cNvPr id="130" name="Google Shape;130;g5d7ecab40a_0_91:notes"/>
+          <p:cNvSpPr/>
+          <p:nvPr>
+            <p:ph idx="2" type="sldImg"/>
+          </p:nvPr>
+        </p:nvSpPr>
+        <p:spPr>
+          <a:xfrm>
+            <a:off x="381300" y="685800"/>
+            <a:ext cx="6096000" cy="3429000"/>
+          </a:xfrm>
+          <a:custGeom>
+            <a:rect b="b" l="l" r="r" t="t"/>
+            <a:pathLst>
+              <a:path extrusionOk="0" h="120000" w="120000">
+                <a:moveTo>
+                  <a:pt x="0" y="0"/>
+                </a:moveTo>
+                <a:lnTo>
+                  <a:pt x="120000" y="0"/>
+                </a:lnTo>
+                <a:lnTo>
+                  <a:pt x="120000" y="120000"/>
+                </a:lnTo>
+                <a:lnTo>
+                  <a:pt x="0" y="120000"/>
+                </a:lnTo>
+                <a:close/>
+              </a:path>
+            </a:pathLst>
+          </a:custGeom>
+        </p:spPr>
+      </p:sp>
+      <p:sp>
+        <p:nvSpPr>
+          <p:cNvPr id="131" name="Google Shape;131;g5d7ecab40a_0_91:notes"/>
+          <p:cNvSpPr txBox="1"/>
+          <p:nvPr>
+            <p:ph idx="1" type="body"/>
+          </p:nvPr>
+        </p:nvSpPr>
+        <p:spPr>
+          <a:xfrm>
+            <a:off x="685800" y="4343400"/>
+            <a:ext cx="5486400" cy="4114800"/>
+          </a:xfrm>
+          <a:prstGeom prst="rect">
+            <a:avLst/>
+          </a:prstGeom>
+        </p:spPr>
+        <p:txBody>
+          <a:bodyPr anchorCtr="0" anchor="t" bIns="91425" lIns="91425" spcFirstLastPara="1" rIns="91425" wrap="square" tIns="91425">
+            <a:noAutofit/>
+          </a:bodyPr>
+          <a:lstStyle/>
+          <a:p>
+            <a:pPr indent="0" lvl="0" marL="0" rtl="0" algn="l">
+              <a:spcBef>
+                <a:spcPts val="0"/>
+              </a:spcBef>
+              <a:spcAft>
+                <a:spcPts val="0"/>
+              </a:spcAft>
+              <a:buNone/>
+            </a:pPr>
+            <a:r>
+              <a:t/>
+            </a:r>
+            <a:endParaRPr/>
+          </a:p>
+        </p:txBody>
+      </p:sp>
+    </p:spTree>
+  </p:cSld>
+  <p:clrMapOvr>
+    <a:masterClrMapping/>
+  </p:clrMapOvr>
+</p:notes>
+</file>
+
+<file path=ppt/notesSlides/notesSlide13.xml><?xml version="1.0" encoding="utf-8"?>
+<p:notes xmlns:a="http://schemas.openxmlformats.org/drawingml/2006/main" xmlns:r="http://schemas.openxmlformats.org/officeDocument/2006/relationships" xmlns:mc="http://schemas.openxmlformats.org/markup-compatibility/2006" xmlns:mv="urn:schemas-microsoft-com:mac:vml" xmlns:p="http://schemas.openxmlformats.org/presentationml/2006/main" xmlns:c="http://schemas.openxmlformats.org/drawingml/2006/chart" xmlns:dgm="http://schemas.openxmlformats.org/drawingml/2006/diagram" xmlns:o="urn:schemas-microsoft-com:office:office" xmlns:v="urn:schemas-microsoft-com:vml" xmlns:pvml="urn:schemas-microsoft-com:office:powerpoint" xmlns:com="http://schemas.openxmlformats.org/drawingml/2006/compatibility" xmlns:p14="http://schemas.microsoft.com/office/powerpoint/2010/main" xmlns:p15="http://schemas.microsoft.com/office/powerpoint/2012/main" showMasterPhAnim="0" showMasterSp="0">
+  <p:cSld>
+    <p:spTree>
+      <p:nvGrpSpPr>
+        <p:cNvPr id="135" name="Shape 135"/>
+        <p:cNvGrpSpPr/>
+        <p:nvPr/>
+      </p:nvGrpSpPr>
+      <p:grpSpPr>
+        <a:xfrm>
+          <a:off x="0" y="0"/>
+          <a:ext cx="0" cy="0"/>
+          <a:chOff x="0" y="0"/>
+          <a:chExt cx="0" cy="0"/>
+        </a:xfrm>
+      </p:grpSpPr>
+      <p:sp>
+        <p:nvSpPr>
+          <p:cNvPr id="136" name="Google Shape;136;g5d7ecab40a_0_96:notes"/>
+          <p:cNvSpPr/>
+          <p:nvPr>
+            <p:ph idx="2" type="sldImg"/>
+          </p:nvPr>
+        </p:nvSpPr>
+        <p:spPr>
+          <a:xfrm>
+            <a:off x="381300" y="685800"/>
+            <a:ext cx="6096000" cy="3429000"/>
+          </a:xfrm>
+          <a:custGeom>
+            <a:rect b="b" l="l" r="r" t="t"/>
+            <a:pathLst>
+              <a:path extrusionOk="0" h="120000" w="120000">
+                <a:moveTo>
+                  <a:pt x="0" y="0"/>
+                </a:moveTo>
+                <a:lnTo>
+                  <a:pt x="120000" y="0"/>
+                </a:lnTo>
+                <a:lnTo>
+                  <a:pt x="120000" y="120000"/>
+                </a:lnTo>
+                <a:lnTo>
+                  <a:pt x="0" y="120000"/>
+                </a:lnTo>
+                <a:close/>
+              </a:path>
+            </a:pathLst>
+          </a:custGeom>
+        </p:spPr>
+      </p:sp>
+      <p:sp>
+        <p:nvSpPr>
+          <p:cNvPr id="137" name="Google Shape;137;g5d7ecab40a_0_96:notes"/>
+          <p:cNvSpPr txBox="1"/>
+          <p:nvPr>
+            <p:ph idx="1" type="body"/>
+          </p:nvPr>
+        </p:nvSpPr>
+        <p:spPr>
+          <a:xfrm>
+            <a:off x="685800" y="4343400"/>
+            <a:ext cx="5486400" cy="4114800"/>
+          </a:xfrm>
+          <a:prstGeom prst="rect">
+            <a:avLst/>
+          </a:prstGeom>
+        </p:spPr>
+        <p:txBody>
+          <a:bodyPr anchorCtr="0" anchor="t" bIns="91425" lIns="91425" spcFirstLastPara="1" rIns="91425" wrap="square" tIns="91425">
+            <a:noAutofit/>
+          </a:bodyPr>
+          <a:lstStyle/>
+          <a:p>
+            <a:pPr indent="0" lvl="0" marL="0" rtl="0" algn="l">
+              <a:spcBef>
+                <a:spcPts val="0"/>
+              </a:spcBef>
+              <a:spcAft>
+                <a:spcPts val="0"/>
+              </a:spcAft>
+              <a:buNone/>
+            </a:pPr>
+            <a:r>
+              <a:t/>
+            </a:r>
+            <a:endParaRPr/>
+          </a:p>
+        </p:txBody>
+      </p:sp>
+    </p:spTree>
+  </p:cSld>
+  <p:clrMapOvr>
+    <a:masterClrMapping/>
+  </p:clrMapOvr>
+</p:notes>
+</file>
+
+<file path=ppt/notesSlides/notesSlide14.xml><?xml version="1.0" encoding="utf-8"?>
+<p:notes xmlns:a="http://schemas.openxmlformats.org/drawingml/2006/main" xmlns:r="http://schemas.openxmlformats.org/officeDocument/2006/relationships" xmlns:mc="http://schemas.openxmlformats.org/markup-compatibility/2006" xmlns:mv="urn:schemas-microsoft-com:mac:vml" xmlns:p="http://schemas.openxmlformats.org/presentationml/2006/main" xmlns:c="http://schemas.openxmlformats.org/drawingml/2006/chart" xmlns:dgm="http://schemas.openxmlformats.org/drawingml/2006/diagram" xmlns:o="urn:schemas-microsoft-com:office:office" xmlns:v="urn:schemas-microsoft-com:vml" xmlns:pvml="urn:schemas-microsoft-com:office:powerpoint" xmlns:com="http://schemas.openxmlformats.org/drawingml/2006/compatibility" xmlns:p14="http://schemas.microsoft.com/office/powerpoint/2010/main" xmlns:p15="http://schemas.microsoft.com/office/powerpoint/2012/main" showMasterPhAnim="0" showMasterSp="0">
+  <p:cSld>
+    <p:spTree>
+      <p:nvGrpSpPr>
+        <p:cNvPr id="141" name="Shape 141"/>
+        <p:cNvGrpSpPr/>
+        <p:nvPr/>
+      </p:nvGrpSpPr>
+      <p:grpSpPr>
+        <a:xfrm>
+          <a:off x="0" y="0"/>
+          <a:ext cx="0" cy="0"/>
+          <a:chOff x="0" y="0"/>
+          <a:chExt cx="0" cy="0"/>
+        </a:xfrm>
+      </p:grpSpPr>
+      <p:sp>
+        <p:nvSpPr>
+          <p:cNvPr id="142" name="Google Shape;142;g5d7ecab40a_0_101:notes"/>
+          <p:cNvSpPr/>
+          <p:nvPr>
+            <p:ph idx="2" type="sldImg"/>
+          </p:nvPr>
+        </p:nvSpPr>
+        <p:spPr>
+          <a:xfrm>
+            <a:off x="381300" y="685800"/>
+            <a:ext cx="6096000" cy="3429000"/>
+          </a:xfrm>
+          <a:custGeom>
+            <a:rect b="b" l="l" r="r" t="t"/>
+            <a:pathLst>
+              <a:path extrusionOk="0" h="120000" w="120000">
+                <a:moveTo>
+                  <a:pt x="0" y="0"/>
+                </a:moveTo>
+                <a:lnTo>
+                  <a:pt x="120000" y="0"/>
+                </a:lnTo>
+                <a:lnTo>
+                  <a:pt x="120000" y="120000"/>
+                </a:lnTo>
+                <a:lnTo>
+                  <a:pt x="0" y="120000"/>
+                </a:lnTo>
+                <a:close/>
+              </a:path>
+            </a:pathLst>
+          </a:custGeom>
+        </p:spPr>
+      </p:sp>
+      <p:sp>
+        <p:nvSpPr>
+          <p:cNvPr id="143" name="Google Shape;143;g5d7ecab40a_0_101:notes"/>
+          <p:cNvSpPr txBox="1"/>
+          <p:nvPr>
+            <p:ph idx="1" type="body"/>
+          </p:nvPr>
+        </p:nvSpPr>
+        <p:spPr>
+          <a:xfrm>
+            <a:off x="685800" y="4343400"/>
+            <a:ext cx="5486400" cy="4114800"/>
+          </a:xfrm>
+          <a:prstGeom prst="rect">
+            <a:avLst/>
+          </a:prstGeom>
+        </p:spPr>
+        <p:txBody>
+          <a:bodyPr anchorCtr="0" anchor="t" bIns="91425" lIns="91425" spcFirstLastPara="1" rIns="91425" wrap="square" tIns="91425">
+            <a:noAutofit/>
+          </a:bodyPr>
+          <a:lstStyle/>
+          <a:p>
+            <a:pPr indent="0" lvl="0" marL="0" rtl="0" algn="l">
+              <a:spcBef>
+                <a:spcPts val="0"/>
+              </a:spcBef>
+              <a:spcAft>
+                <a:spcPts val="0"/>
+              </a:spcAft>
+              <a:buNone/>
+            </a:pPr>
+            <a:r>
+              <a:t/>
+            </a:r>
+            <a:endParaRPr/>
+          </a:p>
+        </p:txBody>
+      </p:sp>
+    </p:spTree>
+  </p:cSld>
+  <p:clrMapOvr>
+    <a:masterClrMapping/>
+  </p:clrMapOvr>
+</p:notes>
+</file>
+
+<file path=ppt/notesSlides/notesSlide15.xml><?xml version="1.0" encoding="utf-8"?>
+<p:notes xmlns:a="http://schemas.openxmlformats.org/drawingml/2006/main" xmlns:r="http://schemas.openxmlformats.org/officeDocument/2006/relationships" xmlns:mc="http://schemas.openxmlformats.org/markup-compatibility/2006" xmlns:mv="urn:schemas-microsoft-com:mac:vml" xmlns:p="http://schemas.openxmlformats.org/presentationml/2006/main" xmlns:c="http://schemas.openxmlformats.org/drawingml/2006/chart" xmlns:dgm="http://schemas.openxmlformats.org/drawingml/2006/diagram" xmlns:o="urn:schemas-microsoft-com:office:office" xmlns:v="urn:schemas-microsoft-com:vml" xmlns:pvml="urn:schemas-microsoft-com:office:powerpoint" xmlns:com="http://schemas.openxmlformats.org/drawingml/2006/compatibility" xmlns:p14="http://schemas.microsoft.com/office/powerpoint/2010/main" xmlns:p15="http://schemas.microsoft.com/office/powerpoint/2012/main" showMasterPhAnim="0" showMasterSp="0">
+  <p:cSld>
+    <p:spTree>
+      <p:nvGrpSpPr>
+        <p:cNvPr id="147" name="Shape 147"/>
+        <p:cNvGrpSpPr/>
+        <p:nvPr/>
+      </p:nvGrpSpPr>
+      <p:grpSpPr>
+        <a:xfrm>
+          <a:off x="0" y="0"/>
+          <a:ext cx="0" cy="0"/>
+          <a:chOff x="0" y="0"/>
+          <a:chExt cx="0" cy="0"/>
+        </a:xfrm>
+      </p:grpSpPr>
+      <p:sp>
+        <p:nvSpPr>
+          <p:cNvPr id="148" name="Google Shape;148;g5d7ecab40a_0_72:notes"/>
+          <p:cNvSpPr/>
+          <p:nvPr>
+            <p:ph idx="2" type="sldImg"/>
+          </p:nvPr>
+        </p:nvSpPr>
+        <p:spPr>
+          <a:xfrm>
+            <a:off x="381300" y="685800"/>
+            <a:ext cx="6096000" cy="3429000"/>
+          </a:xfrm>
+          <a:custGeom>
+            <a:rect b="b" l="l" r="r" t="t"/>
+            <a:pathLst>
+              <a:path extrusionOk="0" h="120000" w="120000">
+                <a:moveTo>
+                  <a:pt x="0" y="0"/>
+                </a:moveTo>
+                <a:lnTo>
+                  <a:pt x="120000" y="0"/>
+                </a:lnTo>
+                <a:lnTo>
+                  <a:pt x="120000" y="120000"/>
+                </a:lnTo>
+                <a:lnTo>
+                  <a:pt x="0" y="120000"/>
+                </a:lnTo>
+                <a:close/>
+              </a:path>
+            </a:pathLst>
+          </a:custGeom>
+        </p:spPr>
+      </p:sp>
+      <p:sp>
+        <p:nvSpPr>
+          <p:cNvPr id="149" name="Google Shape;149;g5d7ecab40a_0_72:notes"/>
+          <p:cNvSpPr txBox="1"/>
+          <p:nvPr>
+            <p:ph idx="1" type="body"/>
+          </p:nvPr>
+        </p:nvSpPr>
+        <p:spPr>
+          <a:xfrm>
+            <a:off x="685800" y="4343400"/>
+            <a:ext cx="5486400" cy="4114800"/>
+          </a:xfrm>
+          <a:prstGeom prst="rect">
+            <a:avLst/>
+          </a:prstGeom>
+        </p:spPr>
+        <p:txBody>
+          <a:bodyPr anchorCtr="0" anchor="t" bIns="91425" lIns="91425" spcFirstLastPara="1" rIns="91425" wrap="square" tIns="91425">
+            <a:noAutofit/>
+          </a:bodyPr>
+          <a:lstStyle/>
+          <a:p>
+            <a:pPr indent="0" lvl="0" marL="0" rtl="0" algn="l">
+              <a:spcBef>
+                <a:spcPts val="0"/>
+              </a:spcBef>
+              <a:spcAft>
+                <a:spcPts val="0"/>
+              </a:spcAft>
+              <a:buNone/>
+            </a:pPr>
+            <a:r>
+              <a:t/>
+            </a:r>
+            <a:endParaRPr/>
+          </a:p>
+        </p:txBody>
+      </p:sp>
+    </p:spTree>
+  </p:cSld>
+  <p:clrMapOvr>
+    <a:masterClrMapping/>
+  </p:clrMapOvr>
+</p:notes>
+</file>
+
+<file path=ppt/notesSlides/notesSlide16.xml><?xml version="1.0" encoding="utf-8"?>
+<p:notes xmlns:a="http://schemas.openxmlformats.org/drawingml/2006/main" xmlns:r="http://schemas.openxmlformats.org/officeDocument/2006/relationships" xmlns:mc="http://schemas.openxmlformats.org/markup-compatibility/2006" xmlns:mv="urn:schemas-microsoft-com:mac:vml" xmlns:p="http://schemas.openxmlformats.org/presentationml/2006/main" xmlns:c="http://schemas.openxmlformats.org/drawingml/2006/chart" xmlns:dgm="http://schemas.openxmlformats.org/drawingml/2006/diagram" xmlns:o="urn:schemas-microsoft-com:office:office" xmlns:v="urn:schemas-microsoft-com:vml" xmlns:pvml="urn:schemas-microsoft-com:office:powerpoint" xmlns:com="http://schemas.openxmlformats.org/drawingml/2006/compatibility" xmlns:p14="http://schemas.microsoft.com/office/powerpoint/2010/main" xmlns:p15="http://schemas.microsoft.com/office/powerpoint/2012/main" showMasterPhAnim="0" showMasterSp="0">
+  <p:cSld>
+    <p:spTree>
+      <p:nvGrpSpPr>
+        <p:cNvPr id="155" name="Shape 155"/>
+        <p:cNvGrpSpPr/>
+        <p:nvPr/>
+      </p:nvGrpSpPr>
+      <p:grpSpPr>
+        <a:xfrm>
+          <a:off x="0" y="0"/>
+          <a:ext cx="0" cy="0"/>
+          <a:chOff x="0" y="0"/>
+          <a:chExt cx="0" cy="0"/>
+        </a:xfrm>
+      </p:grpSpPr>
+      <p:sp>
+        <p:nvSpPr>
+          <p:cNvPr id="156" name="Google Shape;156;g5d7ecab40a_0_57:notes"/>
+          <p:cNvSpPr/>
+          <p:nvPr>
+            <p:ph idx="2" type="sldImg"/>
+          </p:nvPr>
+        </p:nvSpPr>
+        <p:spPr>
+          <a:xfrm>
+            <a:off x="381300" y="685800"/>
+            <a:ext cx="6096000" cy="3429000"/>
+          </a:xfrm>
+          <a:custGeom>
+            <a:rect b="b" l="l" r="r" t="t"/>
+            <a:pathLst>
+              <a:path extrusionOk="0" h="120000" w="120000">
+                <a:moveTo>
+                  <a:pt x="0" y="0"/>
+                </a:moveTo>
+                <a:lnTo>
+                  <a:pt x="120000" y="0"/>
+                </a:lnTo>
+                <a:lnTo>
+                  <a:pt x="120000" y="120000"/>
+                </a:lnTo>
+                <a:lnTo>
+                  <a:pt x="0" y="120000"/>
+                </a:lnTo>
+                <a:close/>
+              </a:path>
+            </a:pathLst>
+          </a:custGeom>
+        </p:spPr>
+      </p:sp>
+      <p:sp>
+        <p:nvSpPr>
+          <p:cNvPr id="157" name="Google Shape;157;g5d7ecab40a_0_57:notes"/>
+          <p:cNvSpPr txBox="1"/>
+          <p:nvPr>
+            <p:ph idx="1" type="body"/>
+          </p:nvPr>
+        </p:nvSpPr>
+        <p:spPr>
+          <a:xfrm>
+            <a:off x="685800" y="4343400"/>
+            <a:ext cx="5486400" cy="4114800"/>
+          </a:xfrm>
+          <a:prstGeom prst="rect">
+            <a:avLst/>
+          </a:prstGeom>
+        </p:spPr>
+        <p:txBody>
+          <a:bodyPr anchorCtr="0" anchor="t" bIns="91425" lIns="91425" spcFirstLastPara="1" rIns="91425" wrap="square" tIns="91425">
+            <a:noAutofit/>
+          </a:bodyPr>
+          <a:lstStyle/>
+          <a:p>
+            <a:pPr indent="0" lvl="0" marL="0" rtl="0" algn="l">
+              <a:spcBef>
+                <a:spcPts val="0"/>
+              </a:spcBef>
+              <a:spcAft>
+                <a:spcPts val="0"/>
+              </a:spcAft>
+              <a:buNone/>
+            </a:pPr>
+            <a:r>
+              <a:t/>
+            </a:r>
+            <a:endParaRPr/>
+          </a:p>
+        </p:txBody>
+      </p:sp>
+    </p:spTree>
+  </p:cSld>
+  <p:clrMapOvr>
+    <a:masterClrMapping/>
+  </p:clrMapOvr>
+</p:notes>
+</file>
+
 <file path=ppt/notesSlides/notesSlide2.xml><?xml version="1.0" encoding="utf-8"?>
 <p:notes xmlns:a="http://schemas.openxmlformats.org/drawingml/2006/main" xmlns:r="http://schemas.openxmlformats.org/officeDocument/2006/relationships" xmlns:mc="http://schemas.openxmlformats.org/markup-compatibility/2006" xmlns:mv="urn:schemas-microsoft-com:mac:vml" xmlns:p="http://schemas.openxmlformats.org/presentationml/2006/main" xmlns:c="http://schemas.openxmlformats.org/drawingml/2006/chart" xmlns:dgm="http://schemas.openxmlformats.org/drawingml/2006/diagram" xmlns:o="urn:schemas-microsoft-com:office:office" xmlns:v="urn:schemas-microsoft-com:vml" xmlns:pvml="urn:schemas-microsoft-com:office:powerpoint" xmlns:com="http://schemas.openxmlformats.org/drawingml/2006/compatibility" xmlns:p14="http://schemas.microsoft.com/office/powerpoint/2010/main" xmlns:p15="http://schemas.microsoft.com/office/powerpoint/2012/main" showMasterPhAnim="0" showMasterSp="0">
   <p:cSld>
@@ -928,7 +1629,7 @@
       </p:grpSpPr>
       <p:sp>
         <p:nvSpPr>
-          <p:cNvPr id="68" name="Google Shape;68;g5d7ecab40a_0_86:notes"/>
+          <p:cNvPr id="68" name="Google Shape;68;g5d7ecab40a_0_110:notes"/>
           <p:cNvSpPr/>
           <p:nvPr>
             <p:ph idx="2" type="sldImg"/>
@@ -963,7 +1664,7 @@
       </p:sp>
       <p:sp>
         <p:nvSpPr>
-          <p:cNvPr id="69" name="Google Shape;69;g5d7ecab40a_0_86:notes"/>
+          <p:cNvPr id="69" name="Google Shape;69;g5d7ecab40a_0_110:notes"/>
           <p:cNvSpPr txBox="1"/>
           <p:nvPr>
             <p:ph idx="1" type="body"/>
@@ -1013,7 +1714,7 @@
   <p:cSld>
     <p:spTree>
       <p:nvGrpSpPr>
-        <p:cNvPr id="73" name="Shape 73"/>
+        <p:cNvPr id="75" name="Shape 75"/>
         <p:cNvGrpSpPr/>
         <p:nvPr/>
       </p:nvGrpSpPr>
@@ -1027,7 +1728,7 @@
       </p:grpSpPr>
       <p:sp>
         <p:nvSpPr>
-          <p:cNvPr id="74" name="Google Shape;74;g5d7ecab40a_0_91:notes"/>
+          <p:cNvPr id="76" name="Google Shape;76;g5d7ecab40a_0_81:notes"/>
           <p:cNvSpPr/>
           <p:nvPr>
             <p:ph idx="2" type="sldImg"/>
@@ -1062,7 +1763,7 @@
       </p:sp>
       <p:sp>
         <p:nvSpPr>
-          <p:cNvPr id="75" name="Google Shape;75;g5d7ecab40a_0_91:notes"/>
+          <p:cNvPr id="77" name="Google Shape;77;g5d7ecab40a_0_81:notes"/>
           <p:cNvSpPr txBox="1"/>
           <p:nvPr>
             <p:ph idx="1" type="body"/>
@@ -1112,7 +1813,7 @@
   <p:cSld>
     <p:spTree>
       <p:nvGrpSpPr>
-        <p:cNvPr id="79" name="Shape 79"/>
+        <p:cNvPr id="81" name="Shape 81"/>
         <p:cNvGrpSpPr/>
         <p:nvPr/>
       </p:nvGrpSpPr>
@@ -1126,7 +1827,7 @@
       </p:grpSpPr>
       <p:sp>
         <p:nvSpPr>
-          <p:cNvPr id="80" name="Google Shape;80;g5d7ecab40a_0_96:notes"/>
+          <p:cNvPr id="82" name="Google Shape;82;g5d7ecab40a_0_125:notes"/>
           <p:cNvSpPr/>
           <p:nvPr>
             <p:ph idx="2" type="sldImg"/>
@@ -1161,7 +1862,7 @@
       </p:sp>
       <p:sp>
         <p:nvSpPr>
-          <p:cNvPr id="81" name="Google Shape;81;g5d7ecab40a_0_96:notes"/>
+          <p:cNvPr id="83" name="Google Shape;83;g5d7ecab40a_0_125:notes"/>
           <p:cNvSpPr txBox="1"/>
           <p:nvPr>
             <p:ph idx="1" type="body"/>
@@ -1211,7 +1912,7 @@
   <p:cSld>
     <p:spTree>
       <p:nvGrpSpPr>
-        <p:cNvPr id="85" name="Shape 85"/>
+        <p:cNvPr id="87" name="Shape 87"/>
         <p:cNvGrpSpPr/>
         <p:nvPr/>
       </p:nvGrpSpPr>
@@ -1225,7 +1926,7 @@
       </p:grpSpPr>
       <p:sp>
         <p:nvSpPr>
-          <p:cNvPr id="86" name="Google Shape;86;g5d7ecab40a_0_101:notes"/>
+          <p:cNvPr id="88" name="Google Shape;88;g5d7ecab40a_0_141:notes"/>
           <p:cNvSpPr/>
           <p:nvPr>
             <p:ph idx="2" type="sldImg"/>
@@ -1260,7 +1961,7 @@
       </p:sp>
       <p:sp>
         <p:nvSpPr>
-          <p:cNvPr id="87" name="Google Shape;87;g5d7ecab40a_0_101:notes"/>
+          <p:cNvPr id="89" name="Google Shape;89;g5d7ecab40a_0_141:notes"/>
           <p:cNvSpPr txBox="1"/>
           <p:nvPr>
             <p:ph idx="1" type="body"/>
@@ -1310,7 +2011,7 @@
   <p:cSld>
     <p:spTree>
       <p:nvGrpSpPr>
-        <p:cNvPr id="91" name="Shape 91"/>
+        <p:cNvPr id="95" name="Shape 95"/>
         <p:cNvGrpSpPr/>
         <p:nvPr/>
       </p:nvGrpSpPr>
@@ -1324,7 +2025,7 @@
       </p:grpSpPr>
       <p:sp>
         <p:nvSpPr>
-          <p:cNvPr id="92" name="Google Shape;92;g5d7ecab40a_0_72:notes"/>
+          <p:cNvPr id="96" name="Google Shape;96;g5d7ecab40a_0_148:notes"/>
           <p:cNvSpPr/>
           <p:nvPr>
             <p:ph idx="2" type="sldImg"/>
@@ -1359,7 +2060,7 @@
       </p:sp>
       <p:sp>
         <p:nvSpPr>
-          <p:cNvPr id="93" name="Google Shape;93;g5d7ecab40a_0_72:notes"/>
+          <p:cNvPr id="97" name="Google Shape;97;g5d7ecab40a_0_148:notes"/>
           <p:cNvSpPr txBox="1"/>
           <p:nvPr>
             <p:ph idx="1" type="body"/>
@@ -1409,7 +2110,7 @@
   <p:cSld>
     <p:spTree>
       <p:nvGrpSpPr>
-        <p:cNvPr id="99" name="Shape 99"/>
+        <p:cNvPr id="103" name="Shape 103"/>
         <p:cNvGrpSpPr/>
         <p:nvPr/>
       </p:nvGrpSpPr>
@@ -1423,7 +2124,7 @@
       </p:grpSpPr>
       <p:sp>
         <p:nvSpPr>
-          <p:cNvPr id="100" name="Google Shape;100;g5d7ecab40a_0_57:notes"/>
+          <p:cNvPr id="104" name="Google Shape;104;g5d7ecab40a_0_169:notes"/>
           <p:cNvSpPr/>
           <p:nvPr>
             <p:ph idx="2" type="sldImg"/>
@@ -1458,7 +2159,106 @@
       </p:sp>
       <p:sp>
         <p:nvSpPr>
-          <p:cNvPr id="101" name="Google Shape;101;g5d7ecab40a_0_57:notes"/>
+          <p:cNvPr id="105" name="Google Shape;105;g5d7ecab40a_0_169:notes"/>
+          <p:cNvSpPr txBox="1"/>
+          <p:nvPr>
+            <p:ph idx="1" type="body"/>
+          </p:nvPr>
+        </p:nvSpPr>
+        <p:spPr>
+          <a:xfrm>
+            <a:off x="685800" y="4343400"/>
+            <a:ext cx="5486400" cy="4114800"/>
+          </a:xfrm>
+          <a:prstGeom prst="rect">
+            <a:avLst/>
+          </a:prstGeom>
+        </p:spPr>
+        <p:txBody>
+          <a:bodyPr anchorCtr="0" anchor="t" bIns="91425" lIns="91425" spcFirstLastPara="1" rIns="91425" wrap="square" tIns="91425">
+            <a:noAutofit/>
+          </a:bodyPr>
+          <a:lstStyle/>
+          <a:p>
+            <a:pPr indent="0" lvl="0" marL="0" rtl="0" algn="l">
+              <a:spcBef>
+                <a:spcPts val="0"/>
+              </a:spcBef>
+              <a:spcAft>
+                <a:spcPts val="0"/>
+              </a:spcAft>
+              <a:buNone/>
+            </a:pPr>
+            <a:r>
+              <a:t/>
+            </a:r>
+            <a:endParaRPr/>
+          </a:p>
+        </p:txBody>
+      </p:sp>
+    </p:spTree>
+  </p:cSld>
+  <p:clrMapOvr>
+    <a:masterClrMapping/>
+  </p:clrMapOvr>
+</p:notes>
+</file>
+
+<file path=ppt/notesSlides/notesSlide9.xml><?xml version="1.0" encoding="utf-8"?>
+<p:notes xmlns:a="http://schemas.openxmlformats.org/drawingml/2006/main" xmlns:r="http://schemas.openxmlformats.org/officeDocument/2006/relationships" xmlns:mc="http://schemas.openxmlformats.org/markup-compatibility/2006" xmlns:mv="urn:schemas-microsoft-com:mac:vml" xmlns:p="http://schemas.openxmlformats.org/presentationml/2006/main" xmlns:c="http://schemas.openxmlformats.org/drawingml/2006/chart" xmlns:dgm="http://schemas.openxmlformats.org/drawingml/2006/diagram" xmlns:o="urn:schemas-microsoft-com:office:office" xmlns:v="urn:schemas-microsoft-com:vml" xmlns:pvml="urn:schemas-microsoft-com:office:powerpoint" xmlns:com="http://schemas.openxmlformats.org/drawingml/2006/compatibility" xmlns:p14="http://schemas.microsoft.com/office/powerpoint/2010/main" xmlns:p15="http://schemas.microsoft.com/office/powerpoint/2012/main" showMasterPhAnim="0" showMasterSp="0">
+  <p:cSld>
+    <p:spTree>
+      <p:nvGrpSpPr>
+        <p:cNvPr id="109" name="Shape 109"/>
+        <p:cNvGrpSpPr/>
+        <p:nvPr/>
+      </p:nvGrpSpPr>
+      <p:grpSpPr>
+        <a:xfrm>
+          <a:off x="0" y="0"/>
+          <a:ext cx="0" cy="0"/>
+          <a:chOff x="0" y="0"/>
+          <a:chExt cx="0" cy="0"/>
+        </a:xfrm>
+      </p:grpSpPr>
+      <p:sp>
+        <p:nvSpPr>
+          <p:cNvPr id="110" name="Google Shape;110;g5d7ecab40a_0_180:notes"/>
+          <p:cNvSpPr/>
+          <p:nvPr>
+            <p:ph idx="2" type="sldImg"/>
+          </p:nvPr>
+        </p:nvSpPr>
+        <p:spPr>
+          <a:xfrm>
+            <a:off x="381300" y="685800"/>
+            <a:ext cx="6096000" cy="3429000"/>
+          </a:xfrm>
+          <a:custGeom>
+            <a:rect b="b" l="l" r="r" t="t"/>
+            <a:pathLst>
+              <a:path extrusionOk="0" h="120000" w="120000">
+                <a:moveTo>
+                  <a:pt x="0" y="0"/>
+                </a:moveTo>
+                <a:lnTo>
+                  <a:pt x="120000" y="0"/>
+                </a:lnTo>
+                <a:lnTo>
+                  <a:pt x="120000" y="120000"/>
+                </a:lnTo>
+                <a:lnTo>
+                  <a:pt x="0" y="120000"/>
+                </a:lnTo>
+                <a:close/>
+              </a:path>
+            </a:pathLst>
+          </a:custGeom>
+        </p:spPr>
+      </p:sp>
+      <p:sp>
+        <p:nvSpPr>
+          <p:cNvPr id="111" name="Google Shape;111;g5d7ecab40a_0_180:notes"/>
           <p:cNvSpPr txBox="1"/>
           <p:nvPr>
             <p:ph idx="1" type="body"/>
@@ -6934,12 +7734,12 @@
 </p:sld>
 </file>
 
-<file path=ppt/slides/slide2.xml><?xml version="1.0" encoding="utf-8"?>
+<file path=ppt/slides/slide10.xml><?xml version="1.0" encoding="utf-8"?>
 <p:sld xmlns:a="http://schemas.openxmlformats.org/drawingml/2006/main" xmlns:r="http://schemas.openxmlformats.org/officeDocument/2006/relationships" xmlns:mc="http://schemas.openxmlformats.org/markup-compatibility/2006" xmlns:mv="urn:schemas-microsoft-com:mac:vml" xmlns:p="http://schemas.openxmlformats.org/presentationml/2006/main" xmlns:c="http://schemas.openxmlformats.org/drawingml/2006/chart" xmlns:dgm="http://schemas.openxmlformats.org/drawingml/2006/diagram" xmlns:o="urn:schemas-microsoft-com:office:office" xmlns:v="urn:schemas-microsoft-com:vml" xmlns:pvml="urn:schemas-microsoft-com:office:powerpoint" xmlns:com="http://schemas.openxmlformats.org/drawingml/2006/compatibility" xmlns:p14="http://schemas.microsoft.com/office/powerpoint/2010/main" xmlns:p15="http://schemas.microsoft.com/office/powerpoint/2012/main">
   <p:cSld>
     <p:spTree>
       <p:nvGrpSpPr>
-        <p:cNvPr id="64" name="Shape 64"/>
+        <p:cNvPr id="118" name="Shape 118"/>
         <p:cNvGrpSpPr/>
         <p:nvPr/>
       </p:nvGrpSpPr>
@@ -6953,7 +7753,7 @@
       </p:grpSpPr>
       <p:sp>
         <p:nvSpPr>
-          <p:cNvPr id="65" name="Google Shape;65;p14"/>
+          <p:cNvPr id="119" name="Google Shape;119;p22"/>
           <p:cNvSpPr txBox="1"/>
           <p:nvPr>
             <p:ph type="title"/>
@@ -6975,17 +7775,20 @@
           <a:lstStyle/>
           <a:p>
             <a:pPr indent="0" lvl="0" marL="0" rtl="0" algn="l">
-              <a:spcBef>
-                <a:spcPts val="0"/>
-              </a:spcBef>
-              <a:spcAft>
-                <a:spcPts val="0"/>
+              <a:lnSpc>
+                <a:spcPct val="115000"/>
+              </a:lnSpc>
+              <a:spcBef>
+                <a:spcPts val="0"/>
+              </a:spcBef>
+              <a:spcAft>
+                <a:spcPts val="1600"/>
               </a:spcAft>
               <a:buNone/>
             </a:pPr>
             <a:r>
               <a:rPr lang="en-GB"/>
-              <a:t>Why</a:t>
+              <a:t>How do we estimate the probability?</a:t>
             </a:r>
             <a:endParaRPr/>
           </a:p>
@@ -6993,7 +7796,444 @@
       </p:sp>
       <p:sp>
         <p:nvSpPr>
-          <p:cNvPr id="66" name="Google Shape;66;p14"/>
+          <p:cNvPr id="120" name="Google Shape;120;p22"/>
+          <p:cNvSpPr txBox="1"/>
+          <p:nvPr>
+            <p:ph idx="1" type="body"/>
+          </p:nvPr>
+        </p:nvSpPr>
+        <p:spPr>
+          <a:xfrm>
+            <a:off x="311700" y="1178275"/>
+            <a:ext cx="8520600" cy="572700"/>
+          </a:xfrm>
+          <a:prstGeom prst="rect">
+            <a:avLst/>
+          </a:prstGeom>
+        </p:spPr>
+        <p:txBody>
+          <a:bodyPr anchorCtr="0" anchor="t" bIns="91425" lIns="91425" spcFirstLastPara="1" rIns="91425" wrap="square" tIns="91425">
+            <a:noAutofit/>
+          </a:bodyPr>
+          <a:lstStyle/>
+          <a:p>
+            <a:pPr indent="-419100" lvl="0" marL="914400" rtl="0" algn="l">
+              <a:spcBef>
+                <a:spcPts val="0"/>
+              </a:spcBef>
+              <a:spcAft>
+                <a:spcPts val="0"/>
+              </a:spcAft>
+              <a:buClr>
+                <a:schemeClr val="dk1"/>
+              </a:buClr>
+              <a:buSzPts val="3000"/>
+              <a:buFont typeface="Oswald"/>
+              <a:buChar char="●"/>
+            </a:pPr>
+            <a:r>
+              <a:rPr lang="en-GB" sz="3000">
+                <a:solidFill>
+                  <a:schemeClr val="dk1"/>
+                </a:solidFill>
+                <a:latin typeface="Oswald"/>
+                <a:ea typeface="Oswald"/>
+                <a:cs typeface="Oswald"/>
+                <a:sym typeface="Oswald"/>
+              </a:rPr>
+              <a:t>Classical: By considering equal outcomes</a:t>
+            </a:r>
+            <a:endParaRPr sz="3000">
+              <a:solidFill>
+                <a:schemeClr val="dk1"/>
+              </a:solidFill>
+              <a:latin typeface="Oswald"/>
+              <a:ea typeface="Oswald"/>
+              <a:cs typeface="Oswald"/>
+              <a:sym typeface="Oswald"/>
+            </a:endParaRPr>
+          </a:p>
+        </p:txBody>
+      </p:sp>
+      <p:sp>
+        <p:nvSpPr>
+          <p:cNvPr id="121" name="Google Shape;121;p22"/>
+          <p:cNvSpPr txBox="1"/>
+          <p:nvPr>
+            <p:ph idx="1" type="body"/>
+          </p:nvPr>
+        </p:nvSpPr>
+        <p:spPr>
+          <a:xfrm>
+            <a:off x="311700" y="1750975"/>
+            <a:ext cx="8520600" cy="572700"/>
+          </a:xfrm>
+          <a:prstGeom prst="rect">
+            <a:avLst/>
+          </a:prstGeom>
+        </p:spPr>
+        <p:txBody>
+          <a:bodyPr anchorCtr="0" anchor="t" bIns="91425" lIns="91425" spcFirstLastPara="1" rIns="91425" wrap="square" tIns="91425">
+            <a:noAutofit/>
+          </a:bodyPr>
+          <a:lstStyle/>
+          <a:p>
+            <a:pPr indent="-419100" lvl="0" marL="914400" rtl="0" algn="l">
+              <a:spcBef>
+                <a:spcPts val="0"/>
+              </a:spcBef>
+              <a:spcAft>
+                <a:spcPts val="0"/>
+              </a:spcAft>
+              <a:buClr>
+                <a:schemeClr val="dk1"/>
+              </a:buClr>
+              <a:buSzPts val="3000"/>
+              <a:buFont typeface="Oswald"/>
+              <a:buChar char="●"/>
+            </a:pPr>
+            <a:r>
+              <a:rPr lang="en-GB" sz="3000">
+                <a:solidFill>
+                  <a:schemeClr val="dk1"/>
+                </a:solidFill>
+                <a:latin typeface="Oswald"/>
+                <a:ea typeface="Oswald"/>
+                <a:cs typeface="Oswald"/>
+                <a:sym typeface="Oswald"/>
+              </a:rPr>
+              <a:t>Frequentist: Relative Frequency over time</a:t>
+            </a:r>
+            <a:endParaRPr sz="3000">
+              <a:solidFill>
+                <a:schemeClr val="dk1"/>
+              </a:solidFill>
+              <a:latin typeface="Oswald"/>
+              <a:ea typeface="Oswald"/>
+              <a:cs typeface="Oswald"/>
+              <a:sym typeface="Oswald"/>
+            </a:endParaRPr>
+          </a:p>
+        </p:txBody>
+      </p:sp>
+      <p:sp>
+        <p:nvSpPr>
+          <p:cNvPr id="122" name="Google Shape;122;p22"/>
+          <p:cNvSpPr txBox="1"/>
+          <p:nvPr>
+            <p:ph idx="1" type="body"/>
+          </p:nvPr>
+        </p:nvSpPr>
+        <p:spPr>
+          <a:xfrm>
+            <a:off x="311700" y="2323675"/>
+            <a:ext cx="8520600" cy="572700"/>
+          </a:xfrm>
+          <a:prstGeom prst="rect">
+            <a:avLst/>
+          </a:prstGeom>
+        </p:spPr>
+        <p:txBody>
+          <a:bodyPr anchorCtr="0" anchor="t" bIns="91425" lIns="91425" spcFirstLastPara="1" rIns="91425" wrap="square" tIns="91425">
+            <a:noAutofit/>
+          </a:bodyPr>
+          <a:lstStyle/>
+          <a:p>
+            <a:pPr indent="-419100" lvl="0" marL="914400" rtl="0" algn="l">
+              <a:spcBef>
+                <a:spcPts val="0"/>
+              </a:spcBef>
+              <a:spcAft>
+                <a:spcPts val="0"/>
+              </a:spcAft>
+              <a:buClr>
+                <a:schemeClr val="dk1"/>
+              </a:buClr>
+              <a:buSzPts val="3000"/>
+              <a:buFont typeface="Oswald"/>
+              <a:buChar char="●"/>
+            </a:pPr>
+            <a:r>
+              <a:rPr lang="en-GB" sz="3000">
+                <a:solidFill>
+                  <a:schemeClr val="dk1"/>
+                </a:solidFill>
+                <a:latin typeface="Oswald"/>
+                <a:ea typeface="Oswald"/>
+                <a:cs typeface="Oswald"/>
+                <a:sym typeface="Oswald"/>
+              </a:rPr>
+              <a:t>Bayesian: By updating our beliefs for each obs.</a:t>
+            </a:r>
+            <a:endParaRPr sz="3000">
+              <a:solidFill>
+                <a:schemeClr val="dk1"/>
+              </a:solidFill>
+              <a:latin typeface="Oswald"/>
+              <a:ea typeface="Oswald"/>
+              <a:cs typeface="Oswald"/>
+              <a:sym typeface="Oswald"/>
+            </a:endParaRPr>
+          </a:p>
+        </p:txBody>
+      </p:sp>
+    </p:spTree>
+  </p:cSld>
+  <p:clrMapOvr>
+    <a:masterClrMapping/>
+  </p:clrMapOvr>
+  <p:timing>
+    <p:tnLst>
+      <p:par>
+        <p:cTn dur="indefinite" nodeType="tmRoot" restart="never">
+          <p:childTnLst>
+            <p:seq concurrent="1" nextAc="seek">
+              <p:cTn dur="indefinite" id="2" nodeType="mainSeq">
+                <p:childTnLst>
+                  <p:par>
+                    <p:cTn fill="hold">
+                      <p:stCondLst>
+                        <p:cond delay="indefinite"/>
+                      </p:stCondLst>
+                      <p:childTnLst>
+                        <p:par>
+                          <p:cTn fill="hold">
+                            <p:stCondLst>
+                              <p:cond delay="0"/>
+                            </p:stCondLst>
+                            <p:childTnLst>
+                              <p:par>
+                                <p:cTn fill="hold" nodeType="clickEffect" presetClass="entr" presetID="10" presetSubtype="0">
+                                  <p:stCondLst>
+                                    <p:cond delay="0"/>
+                                  </p:stCondLst>
+                                  <p:childTnLst>
+                                    <p:set>
+                                      <p:cBhvr>
+                                        <p:cTn dur="1" fill="hold">
+                                          <p:stCondLst>
+                                            <p:cond delay="0"/>
+                                          </p:stCondLst>
+                                        </p:cTn>
+                                        <p:tgtEl>
+                                          <p:spTgt spid="120"/>
+                                        </p:tgtEl>
+                                        <p:attrNameLst>
+                                          <p:attrName>style.visibility</p:attrName>
+                                        </p:attrNameLst>
+                                      </p:cBhvr>
+                                      <p:to>
+                                        <p:strVal val="visible"/>
+                                      </p:to>
+                                    </p:set>
+                                    <p:animEffect filter="fade" transition="in">
+                                      <p:cBhvr>
+                                        <p:cTn dur="1000"/>
+                                        <p:tgtEl>
+                                          <p:spTgt spid="120"/>
+                                        </p:tgtEl>
+                                      </p:cBhvr>
+                                    </p:animEffect>
+                                  </p:childTnLst>
+                                </p:cTn>
+                              </p:par>
+                            </p:childTnLst>
+                          </p:cTn>
+                        </p:par>
+                      </p:childTnLst>
+                    </p:cTn>
+                  </p:par>
+                  <p:par>
+                    <p:cTn fill="hold">
+                      <p:stCondLst>
+                        <p:cond delay="indefinite"/>
+                      </p:stCondLst>
+                      <p:childTnLst>
+                        <p:par>
+                          <p:cTn fill="hold">
+                            <p:stCondLst>
+                              <p:cond delay="0"/>
+                            </p:stCondLst>
+                            <p:childTnLst>
+                              <p:par>
+                                <p:cTn fill="hold" nodeType="clickEffect" presetClass="entr" presetID="10" presetSubtype="0">
+                                  <p:stCondLst>
+                                    <p:cond delay="0"/>
+                                  </p:stCondLst>
+                                  <p:childTnLst>
+                                    <p:set>
+                                      <p:cBhvr>
+                                        <p:cTn dur="1" fill="hold">
+                                          <p:stCondLst>
+                                            <p:cond delay="0"/>
+                                          </p:stCondLst>
+                                        </p:cTn>
+                                        <p:tgtEl>
+                                          <p:spTgt spid="121"/>
+                                        </p:tgtEl>
+                                        <p:attrNameLst>
+                                          <p:attrName>style.visibility</p:attrName>
+                                        </p:attrNameLst>
+                                      </p:cBhvr>
+                                      <p:to>
+                                        <p:strVal val="visible"/>
+                                      </p:to>
+                                    </p:set>
+                                    <p:animEffect filter="fade" transition="in">
+                                      <p:cBhvr>
+                                        <p:cTn dur="1000"/>
+                                        <p:tgtEl>
+                                          <p:spTgt spid="121"/>
+                                        </p:tgtEl>
+                                      </p:cBhvr>
+                                    </p:animEffect>
+                                  </p:childTnLst>
+                                </p:cTn>
+                              </p:par>
+                            </p:childTnLst>
+                          </p:cTn>
+                        </p:par>
+                      </p:childTnLst>
+                    </p:cTn>
+                  </p:par>
+                  <p:par>
+                    <p:cTn fill="hold">
+                      <p:stCondLst>
+                        <p:cond delay="indefinite"/>
+                      </p:stCondLst>
+                      <p:childTnLst>
+                        <p:par>
+                          <p:cTn fill="hold">
+                            <p:stCondLst>
+                              <p:cond delay="0"/>
+                            </p:stCondLst>
+                            <p:childTnLst>
+                              <p:par>
+                                <p:cTn fill="hold" nodeType="clickEffect" presetClass="entr" presetID="10" presetSubtype="0">
+                                  <p:stCondLst>
+                                    <p:cond delay="0"/>
+                                  </p:stCondLst>
+                                  <p:childTnLst>
+                                    <p:set>
+                                      <p:cBhvr>
+                                        <p:cTn dur="1" fill="hold">
+                                          <p:stCondLst>
+                                            <p:cond delay="0"/>
+                                          </p:stCondLst>
+                                        </p:cTn>
+                                        <p:tgtEl>
+                                          <p:spTgt spid="122"/>
+                                        </p:tgtEl>
+                                        <p:attrNameLst>
+                                          <p:attrName>style.visibility</p:attrName>
+                                        </p:attrNameLst>
+                                      </p:cBhvr>
+                                      <p:to>
+                                        <p:strVal val="visible"/>
+                                      </p:to>
+                                    </p:set>
+                                    <p:animEffect filter="fade" transition="in">
+                                      <p:cBhvr>
+                                        <p:cTn dur="1000"/>
+                                        <p:tgtEl>
+                                          <p:spTgt spid="122"/>
+                                        </p:tgtEl>
+                                      </p:cBhvr>
+                                    </p:animEffect>
+                                  </p:childTnLst>
+                                </p:cTn>
+                              </p:par>
+                            </p:childTnLst>
+                          </p:cTn>
+                        </p:par>
+                      </p:childTnLst>
+                    </p:cTn>
+                  </p:par>
+                </p:childTnLst>
+              </p:cTn>
+              <p:prevCondLst>
+                <p:cond evt="onPrev">
+                  <p:tgtEl>
+                    <p:sldTgt/>
+                  </p:tgtEl>
+                </p:cond>
+              </p:prevCondLst>
+              <p:nextCondLst>
+                <p:cond evt="onNext">
+                  <p:tgtEl>
+                    <p:sldTgt/>
+                  </p:tgtEl>
+                </p:cond>
+              </p:nextCondLst>
+            </p:seq>
+          </p:childTnLst>
+        </p:cTn>
+      </p:par>
+    </p:tnLst>
+  </p:timing>
+</p:sld>
+</file>
+
+<file path=ppt/slides/slide11.xml><?xml version="1.0" encoding="utf-8"?>
+<p:sld xmlns:a="http://schemas.openxmlformats.org/drawingml/2006/main" xmlns:r="http://schemas.openxmlformats.org/officeDocument/2006/relationships" xmlns:mc="http://schemas.openxmlformats.org/markup-compatibility/2006" xmlns:mv="urn:schemas-microsoft-com:mac:vml" xmlns:p="http://schemas.openxmlformats.org/presentationml/2006/main" xmlns:c="http://schemas.openxmlformats.org/drawingml/2006/chart" xmlns:dgm="http://schemas.openxmlformats.org/drawingml/2006/diagram" xmlns:o="urn:schemas-microsoft-com:office:office" xmlns:v="urn:schemas-microsoft-com:vml" xmlns:pvml="urn:schemas-microsoft-com:office:powerpoint" xmlns:com="http://schemas.openxmlformats.org/drawingml/2006/compatibility" xmlns:p14="http://schemas.microsoft.com/office/powerpoint/2010/main" xmlns:p15="http://schemas.microsoft.com/office/powerpoint/2012/main">
+  <p:cSld>
+    <p:spTree>
+      <p:nvGrpSpPr>
+        <p:cNvPr id="126" name="Shape 126"/>
+        <p:cNvGrpSpPr/>
+        <p:nvPr/>
+      </p:nvGrpSpPr>
+      <p:grpSpPr>
+        <a:xfrm>
+          <a:off x="0" y="0"/>
+          <a:ext cx="0" cy="0"/>
+          <a:chOff x="0" y="0"/>
+          <a:chExt cx="0" cy="0"/>
+        </a:xfrm>
+      </p:grpSpPr>
+      <p:sp>
+        <p:nvSpPr>
+          <p:cNvPr id="127" name="Google Shape;127;p23"/>
+          <p:cNvSpPr txBox="1"/>
+          <p:nvPr>
+            <p:ph type="title"/>
+          </p:nvPr>
+        </p:nvSpPr>
+        <p:spPr>
+          <a:xfrm>
+            <a:off x="311700" y="445025"/>
+            <a:ext cx="8520600" cy="572700"/>
+          </a:xfrm>
+          <a:prstGeom prst="rect">
+            <a:avLst/>
+          </a:prstGeom>
+        </p:spPr>
+        <p:txBody>
+          <a:bodyPr anchorCtr="0" anchor="t" bIns="91425" lIns="91425" spcFirstLastPara="1" rIns="91425" wrap="square" tIns="91425">
+            <a:noAutofit/>
+          </a:bodyPr>
+          <a:lstStyle/>
+          <a:p>
+            <a:pPr indent="0" lvl="0" marL="0" rtl="0" algn="l">
+              <a:spcBef>
+                <a:spcPts val="0"/>
+              </a:spcBef>
+              <a:spcAft>
+                <a:spcPts val="0"/>
+              </a:spcAft>
+              <a:buNone/>
+            </a:pPr>
+            <a:r>
+              <a:rPr lang="en-GB"/>
+              <a:t>Bayes Theorem</a:t>
+            </a:r>
+            <a:endParaRPr/>
+          </a:p>
+        </p:txBody>
+      </p:sp>
+      <p:sp>
+        <p:nvSpPr>
+          <p:cNvPr id="128" name="Google Shape;128;p23"/>
           <p:cNvSpPr txBox="1"/>
           <p:nvPr>
             <p:ph idx="1" type="body"/>
@@ -7038,12 +8278,12 @@
 </p:sld>
 </file>
 
-<file path=ppt/slides/slide3.xml><?xml version="1.0" encoding="utf-8"?>
+<file path=ppt/slides/slide12.xml><?xml version="1.0" encoding="utf-8"?>
 <p:sld xmlns:a="http://schemas.openxmlformats.org/drawingml/2006/main" xmlns:r="http://schemas.openxmlformats.org/officeDocument/2006/relationships" xmlns:mc="http://schemas.openxmlformats.org/markup-compatibility/2006" xmlns:mv="urn:schemas-microsoft-com:mac:vml" xmlns:p="http://schemas.openxmlformats.org/presentationml/2006/main" xmlns:c="http://schemas.openxmlformats.org/drawingml/2006/chart" xmlns:dgm="http://schemas.openxmlformats.org/drawingml/2006/diagram" xmlns:o="urn:schemas-microsoft-com:office:office" xmlns:v="urn:schemas-microsoft-com:vml" xmlns:pvml="urn:schemas-microsoft-com:office:powerpoint" xmlns:com="http://schemas.openxmlformats.org/drawingml/2006/compatibility" xmlns:p14="http://schemas.microsoft.com/office/powerpoint/2010/main" xmlns:p15="http://schemas.microsoft.com/office/powerpoint/2012/main">
   <p:cSld>
     <p:spTree>
       <p:nvGrpSpPr>
-        <p:cNvPr id="70" name="Shape 70"/>
+        <p:cNvPr id="132" name="Shape 132"/>
         <p:cNvGrpSpPr/>
         <p:nvPr/>
       </p:nvGrpSpPr>
@@ -7057,7 +8297,7 @@
       </p:grpSpPr>
       <p:sp>
         <p:nvSpPr>
-          <p:cNvPr id="71" name="Google Shape;71;p15"/>
+          <p:cNvPr id="133" name="Google Shape;133;p24"/>
           <p:cNvSpPr txBox="1"/>
           <p:nvPr>
             <p:ph type="title"/>
@@ -7089,7 +8329,7 @@
             </a:pPr>
             <a:r>
               <a:rPr lang="en-GB"/>
-              <a:t>Bayes Theorem</a:t>
+              <a:t>How</a:t>
             </a:r>
             <a:endParaRPr/>
           </a:p>
@@ -7097,7 +8337,7 @@
       </p:sp>
       <p:sp>
         <p:nvSpPr>
-          <p:cNvPr id="72" name="Google Shape;72;p15"/>
+          <p:cNvPr id="134" name="Google Shape;134;p24"/>
           <p:cNvSpPr txBox="1"/>
           <p:nvPr>
             <p:ph idx="1" type="body"/>
@@ -7142,12 +8382,12 @@
 </p:sld>
 </file>
 
-<file path=ppt/slides/slide4.xml><?xml version="1.0" encoding="utf-8"?>
+<file path=ppt/slides/slide13.xml><?xml version="1.0" encoding="utf-8"?>
 <p:sld xmlns:a="http://schemas.openxmlformats.org/drawingml/2006/main" xmlns:r="http://schemas.openxmlformats.org/officeDocument/2006/relationships" xmlns:mc="http://schemas.openxmlformats.org/markup-compatibility/2006" xmlns:mv="urn:schemas-microsoft-com:mac:vml" xmlns:p="http://schemas.openxmlformats.org/presentationml/2006/main" xmlns:c="http://schemas.openxmlformats.org/drawingml/2006/chart" xmlns:dgm="http://schemas.openxmlformats.org/drawingml/2006/diagram" xmlns:o="urn:schemas-microsoft-com:office:office" xmlns:v="urn:schemas-microsoft-com:vml" xmlns:pvml="urn:schemas-microsoft-com:office:powerpoint" xmlns:com="http://schemas.openxmlformats.org/drawingml/2006/compatibility" xmlns:p14="http://schemas.microsoft.com/office/powerpoint/2010/main" xmlns:p15="http://schemas.microsoft.com/office/powerpoint/2012/main">
   <p:cSld>
     <p:spTree>
       <p:nvGrpSpPr>
-        <p:cNvPr id="76" name="Shape 76"/>
+        <p:cNvPr id="138" name="Shape 138"/>
         <p:cNvGrpSpPr/>
         <p:nvPr/>
       </p:nvGrpSpPr>
@@ -7161,7 +8401,7 @@
       </p:grpSpPr>
       <p:sp>
         <p:nvSpPr>
-          <p:cNvPr id="77" name="Google Shape;77;p16"/>
+          <p:cNvPr id="139" name="Google Shape;139;p25"/>
           <p:cNvSpPr txBox="1"/>
           <p:nvPr>
             <p:ph type="title"/>
@@ -7193,7 +8433,7 @@
             </a:pPr>
             <a:r>
               <a:rPr lang="en-GB"/>
-              <a:t>How</a:t>
+              <a:t>Foreshadow MCMC</a:t>
             </a:r>
             <a:endParaRPr/>
           </a:p>
@@ -7201,7 +8441,7 @@
       </p:sp>
       <p:sp>
         <p:nvSpPr>
-          <p:cNvPr id="78" name="Google Shape;78;p16"/>
+          <p:cNvPr id="140" name="Google Shape;140;p25"/>
           <p:cNvSpPr txBox="1"/>
           <p:nvPr>
             <p:ph idx="1" type="body"/>
@@ -7246,12 +8486,12 @@
 </p:sld>
 </file>
 
-<file path=ppt/slides/slide5.xml><?xml version="1.0" encoding="utf-8"?>
+<file path=ppt/slides/slide14.xml><?xml version="1.0" encoding="utf-8"?>
 <p:sld xmlns:a="http://schemas.openxmlformats.org/drawingml/2006/main" xmlns:r="http://schemas.openxmlformats.org/officeDocument/2006/relationships" xmlns:mc="http://schemas.openxmlformats.org/markup-compatibility/2006" xmlns:mv="urn:schemas-microsoft-com:mac:vml" xmlns:p="http://schemas.openxmlformats.org/presentationml/2006/main" xmlns:c="http://schemas.openxmlformats.org/drawingml/2006/chart" xmlns:dgm="http://schemas.openxmlformats.org/drawingml/2006/diagram" xmlns:o="urn:schemas-microsoft-com:office:office" xmlns:v="urn:schemas-microsoft-com:vml" xmlns:pvml="urn:schemas-microsoft-com:office:powerpoint" xmlns:com="http://schemas.openxmlformats.org/drawingml/2006/compatibility" xmlns:p14="http://schemas.microsoft.com/office/powerpoint/2010/main" xmlns:p15="http://schemas.microsoft.com/office/powerpoint/2012/main">
   <p:cSld>
     <p:spTree>
       <p:nvGrpSpPr>
-        <p:cNvPr id="82" name="Shape 82"/>
+        <p:cNvPr id="144" name="Shape 144"/>
         <p:cNvGrpSpPr/>
         <p:nvPr/>
       </p:nvGrpSpPr>
@@ -7265,7 +8505,7 @@
       </p:grpSpPr>
       <p:sp>
         <p:nvSpPr>
-          <p:cNvPr id="83" name="Google Shape;83;p17"/>
+          <p:cNvPr id="145" name="Google Shape;145;p26"/>
           <p:cNvSpPr txBox="1"/>
           <p:nvPr>
             <p:ph type="title"/>
@@ -7297,7 +8537,7 @@
             </a:pPr>
             <a:r>
               <a:rPr lang="en-GB"/>
-              <a:t>Foreshadow MCMC</a:t>
+              <a:t>Conclusion and “Call to Action”</a:t>
             </a:r>
             <a:endParaRPr/>
           </a:p>
@@ -7305,7 +8545,7 @@
       </p:sp>
       <p:sp>
         <p:nvSpPr>
-          <p:cNvPr id="84" name="Google Shape;84;p17"/>
+          <p:cNvPr id="146" name="Google Shape;146;p26"/>
           <p:cNvSpPr txBox="1"/>
           <p:nvPr>
             <p:ph idx="1" type="body"/>
@@ -7350,12 +8590,12 @@
 </p:sld>
 </file>
 
-<file path=ppt/slides/slide6.xml><?xml version="1.0" encoding="utf-8"?>
+<file path=ppt/slides/slide15.xml><?xml version="1.0" encoding="utf-8"?>
 <p:sld xmlns:a="http://schemas.openxmlformats.org/drawingml/2006/main" xmlns:r="http://schemas.openxmlformats.org/officeDocument/2006/relationships" xmlns:mc="http://schemas.openxmlformats.org/markup-compatibility/2006" xmlns:mv="urn:schemas-microsoft-com:mac:vml" xmlns:p="http://schemas.openxmlformats.org/presentationml/2006/main" xmlns:c="http://schemas.openxmlformats.org/drawingml/2006/chart" xmlns:dgm="http://schemas.openxmlformats.org/drawingml/2006/diagram" xmlns:o="urn:schemas-microsoft-com:office:office" xmlns:v="urn:schemas-microsoft-com:vml" xmlns:pvml="urn:schemas-microsoft-com:office:powerpoint" xmlns:com="http://schemas.openxmlformats.org/drawingml/2006/compatibility" xmlns:p14="http://schemas.microsoft.com/office/powerpoint/2010/main" xmlns:p15="http://schemas.microsoft.com/office/powerpoint/2012/main">
   <p:cSld>
     <p:spTree>
       <p:nvGrpSpPr>
-        <p:cNvPr id="88" name="Shape 88"/>
+        <p:cNvPr id="150" name="Shape 150"/>
         <p:cNvGrpSpPr/>
         <p:nvPr/>
       </p:nvGrpSpPr>
@@ -7369,111 +8609,7 @@
       </p:grpSpPr>
       <p:sp>
         <p:nvSpPr>
-          <p:cNvPr id="89" name="Google Shape;89;p18"/>
-          <p:cNvSpPr txBox="1"/>
-          <p:nvPr>
-            <p:ph type="title"/>
-          </p:nvPr>
-        </p:nvSpPr>
-        <p:spPr>
-          <a:xfrm>
-            <a:off x="311700" y="445025"/>
-            <a:ext cx="8520600" cy="572700"/>
-          </a:xfrm>
-          <a:prstGeom prst="rect">
-            <a:avLst/>
-          </a:prstGeom>
-        </p:spPr>
-        <p:txBody>
-          <a:bodyPr anchorCtr="0" anchor="t" bIns="91425" lIns="91425" spcFirstLastPara="1" rIns="91425" wrap="square" tIns="91425">
-            <a:noAutofit/>
-          </a:bodyPr>
-          <a:lstStyle/>
-          <a:p>
-            <a:pPr indent="0" lvl="0" marL="0" rtl="0" algn="l">
-              <a:spcBef>
-                <a:spcPts val="0"/>
-              </a:spcBef>
-              <a:spcAft>
-                <a:spcPts val="0"/>
-              </a:spcAft>
-              <a:buNone/>
-            </a:pPr>
-            <a:r>
-              <a:rPr lang="en-GB"/>
-              <a:t>Conclusion and “Call to Action”</a:t>
-            </a:r>
-            <a:endParaRPr/>
-          </a:p>
-        </p:txBody>
-      </p:sp>
-      <p:sp>
-        <p:nvSpPr>
-          <p:cNvPr id="90" name="Google Shape;90;p18"/>
-          <p:cNvSpPr txBox="1"/>
-          <p:nvPr>
-            <p:ph idx="1" type="body"/>
-          </p:nvPr>
-        </p:nvSpPr>
-        <p:spPr>
-          <a:xfrm>
-            <a:off x="311700" y="1152475"/>
-            <a:ext cx="8520600" cy="3416400"/>
-          </a:xfrm>
-          <a:prstGeom prst="rect">
-            <a:avLst/>
-          </a:prstGeom>
-        </p:spPr>
-        <p:txBody>
-          <a:bodyPr anchorCtr="0" anchor="t" bIns="91425" lIns="91425" spcFirstLastPara="1" rIns="91425" wrap="square" tIns="91425">
-            <a:noAutofit/>
-          </a:bodyPr>
-          <a:lstStyle/>
-          <a:p>
-            <a:pPr indent="0" lvl="0" marL="0" rtl="0" algn="l">
-              <a:spcBef>
-                <a:spcPts val="0"/>
-              </a:spcBef>
-              <a:spcAft>
-                <a:spcPts val="1600"/>
-              </a:spcAft>
-              <a:buNone/>
-            </a:pPr>
-            <a:r>
-              <a:t/>
-            </a:r>
-            <a:endParaRPr/>
-          </a:p>
-        </p:txBody>
-      </p:sp>
-    </p:spTree>
-  </p:cSld>
-  <p:clrMapOvr>
-    <a:masterClrMapping/>
-  </p:clrMapOvr>
-</p:sld>
-</file>
-
-<file path=ppt/slides/slide7.xml><?xml version="1.0" encoding="utf-8"?>
-<p:sld xmlns:a="http://schemas.openxmlformats.org/drawingml/2006/main" xmlns:r="http://schemas.openxmlformats.org/officeDocument/2006/relationships" xmlns:mc="http://schemas.openxmlformats.org/markup-compatibility/2006" xmlns:mv="urn:schemas-microsoft-com:mac:vml" xmlns:p="http://schemas.openxmlformats.org/presentationml/2006/main" xmlns:c="http://schemas.openxmlformats.org/drawingml/2006/chart" xmlns:dgm="http://schemas.openxmlformats.org/drawingml/2006/diagram" xmlns:o="urn:schemas-microsoft-com:office:office" xmlns:v="urn:schemas-microsoft-com:vml" xmlns:pvml="urn:schemas-microsoft-com:office:powerpoint" xmlns:com="http://schemas.openxmlformats.org/drawingml/2006/compatibility" xmlns:p14="http://schemas.microsoft.com/office/powerpoint/2010/main" xmlns:p15="http://schemas.microsoft.com/office/powerpoint/2012/main">
-  <p:cSld>
-    <p:spTree>
-      <p:nvGrpSpPr>
-        <p:cNvPr id="94" name="Shape 94"/>
-        <p:cNvGrpSpPr/>
-        <p:nvPr/>
-      </p:nvGrpSpPr>
-      <p:grpSpPr>
-        <a:xfrm>
-          <a:off x="0" y="0"/>
-          <a:ext cx="0" cy="0"/>
-          <a:chOff x="0" y="0"/>
-          <a:chExt cx="0" cy="0"/>
-        </a:xfrm>
-      </p:grpSpPr>
-      <p:sp>
-        <p:nvSpPr>
-          <p:cNvPr id="95" name="Google Shape;95;p19"/>
+          <p:cNvPr id="151" name="Google Shape;151;p27"/>
           <p:cNvSpPr txBox="1"/>
           <p:nvPr>
             <p:ph type="title"/>
@@ -7513,7 +8649,7 @@
       </p:sp>
       <p:sp>
         <p:nvSpPr>
-          <p:cNvPr id="96" name="Google Shape;96;p19"/>
+          <p:cNvPr id="152" name="Google Shape;152;p27"/>
           <p:cNvSpPr txBox="1"/>
           <p:nvPr>
             <p:ph idx="1" type="body"/>
@@ -7556,7 +8692,7 @@
       </p:sp>
       <p:pic>
         <p:nvPicPr>
-          <p:cNvPr id="97" name="Google Shape;97;p19"/>
+          <p:cNvPr id="153" name="Google Shape;153;p27"/>
           <p:cNvPicPr preferRelativeResize="0"/>
           <p:nvPr/>
         </p:nvPicPr>
@@ -7584,7 +8720,7 @@
       </p:pic>
       <p:pic>
         <p:nvPicPr>
-          <p:cNvPr id="98" name="Google Shape;98;p19"/>
+          <p:cNvPr id="154" name="Google Shape;154;p27"/>
           <p:cNvPicPr preferRelativeResize="0"/>
           <p:nvPr/>
         </p:nvPicPr>
@@ -7618,12 +8754,12 @@
 </p:sld>
 </file>
 
-<file path=ppt/slides/slide8.xml><?xml version="1.0" encoding="utf-8"?>
+<file path=ppt/slides/slide16.xml><?xml version="1.0" encoding="utf-8"?>
 <p:sld xmlns:a="http://schemas.openxmlformats.org/drawingml/2006/main" xmlns:r="http://schemas.openxmlformats.org/officeDocument/2006/relationships" xmlns:mc="http://schemas.openxmlformats.org/markup-compatibility/2006" xmlns:mv="urn:schemas-microsoft-com:mac:vml" xmlns:p="http://schemas.openxmlformats.org/presentationml/2006/main" xmlns:c="http://schemas.openxmlformats.org/drawingml/2006/chart" xmlns:dgm="http://schemas.openxmlformats.org/drawingml/2006/diagram" xmlns:o="urn:schemas-microsoft-com:office:office" xmlns:v="urn:schemas-microsoft-com:vml" xmlns:pvml="urn:schemas-microsoft-com:office:powerpoint" xmlns:com="http://schemas.openxmlformats.org/drawingml/2006/compatibility" xmlns:p14="http://schemas.microsoft.com/office/powerpoint/2010/main" xmlns:p15="http://schemas.microsoft.com/office/powerpoint/2012/main">
   <p:cSld>
     <p:spTree>
       <p:nvGrpSpPr>
-        <p:cNvPr id="102" name="Shape 102"/>
+        <p:cNvPr id="158" name="Shape 158"/>
         <p:cNvGrpSpPr/>
         <p:nvPr/>
       </p:nvGrpSpPr>
@@ -7637,7 +8773,7 @@
       </p:grpSpPr>
       <p:sp>
         <p:nvSpPr>
-          <p:cNvPr id="103" name="Google Shape;103;p20"/>
+          <p:cNvPr id="159" name="Google Shape;159;p28"/>
           <p:cNvSpPr txBox="1"/>
           <p:nvPr>
             <p:ph type="ctrTitle"/>
@@ -7677,7 +8813,7 @@
       </p:sp>
       <p:sp>
         <p:nvSpPr>
-          <p:cNvPr id="104" name="Google Shape;104;p20"/>
+          <p:cNvPr id="160" name="Google Shape;160;p28"/>
           <p:cNvSpPr txBox="1"/>
           <p:nvPr>
             <p:ph idx="1" type="subTitle"/>
@@ -7728,7 +8864,7 @@
       </p:sp>
       <p:sp>
         <p:nvSpPr>
-          <p:cNvPr id="105" name="Google Shape;105;p20">
+          <p:cNvPr id="161" name="Google Shape;161;p28">
             <a:hlinkClick r:id="rId3"/>
           </p:cNvPr>
           <p:cNvSpPr/>
@@ -7942,7 +9078,7 @@
       </p:sp>
       <p:sp>
         <p:nvSpPr>
-          <p:cNvPr id="106" name="Google Shape;106;p20">
+          <p:cNvPr id="162" name="Google Shape;162;p28">
             <a:hlinkClick r:id="rId4"/>
           </p:cNvPr>
           <p:cNvSpPr/>
@@ -8193,7 +9329,7 @@
       </p:sp>
       <p:sp>
         <p:nvSpPr>
-          <p:cNvPr id="107" name="Google Shape;107;p20">
+          <p:cNvPr id="163" name="Google Shape;163;p28">
             <a:hlinkClick r:id="rId5"/>
           </p:cNvPr>
           <p:cNvSpPr/>
@@ -8379,6 +9515,2069 @@
           </a:p>
         </p:txBody>
       </p:sp>
+    </p:spTree>
+  </p:cSld>
+  <p:clrMapOvr>
+    <a:masterClrMapping/>
+  </p:clrMapOvr>
+</p:sld>
+</file>
+
+<file path=ppt/slides/slide2.xml><?xml version="1.0" encoding="utf-8"?>
+<p:sld xmlns:a="http://schemas.openxmlformats.org/drawingml/2006/main" xmlns:r="http://schemas.openxmlformats.org/officeDocument/2006/relationships" xmlns:mc="http://schemas.openxmlformats.org/markup-compatibility/2006" xmlns:mv="urn:schemas-microsoft-com:mac:vml" xmlns:p="http://schemas.openxmlformats.org/presentationml/2006/main" xmlns:c="http://schemas.openxmlformats.org/drawingml/2006/chart" xmlns:dgm="http://schemas.openxmlformats.org/drawingml/2006/diagram" xmlns:o="urn:schemas-microsoft-com:office:office" xmlns:v="urn:schemas-microsoft-com:vml" xmlns:pvml="urn:schemas-microsoft-com:office:powerpoint" xmlns:com="http://schemas.openxmlformats.org/drawingml/2006/compatibility" xmlns:p14="http://schemas.microsoft.com/office/powerpoint/2010/main" xmlns:p15="http://schemas.microsoft.com/office/powerpoint/2012/main">
+  <p:cSld>
+    <p:spTree>
+      <p:nvGrpSpPr>
+        <p:cNvPr id="64" name="Shape 64"/>
+        <p:cNvGrpSpPr/>
+        <p:nvPr/>
+      </p:nvGrpSpPr>
+      <p:grpSpPr>
+        <a:xfrm>
+          <a:off x="0" y="0"/>
+          <a:ext cx="0" cy="0"/>
+          <a:chOff x="0" y="0"/>
+          <a:chExt cx="0" cy="0"/>
+        </a:xfrm>
+      </p:grpSpPr>
+      <p:sp>
+        <p:nvSpPr>
+          <p:cNvPr id="65" name="Google Shape;65;p14"/>
+          <p:cNvSpPr txBox="1"/>
+          <p:nvPr>
+            <p:ph type="title"/>
+          </p:nvPr>
+        </p:nvSpPr>
+        <p:spPr>
+          <a:xfrm>
+            <a:off x="311700" y="445025"/>
+            <a:ext cx="8520600" cy="572700"/>
+          </a:xfrm>
+          <a:prstGeom prst="rect">
+            <a:avLst/>
+          </a:prstGeom>
+        </p:spPr>
+        <p:txBody>
+          <a:bodyPr anchorCtr="0" anchor="t" bIns="91425" lIns="91425" spcFirstLastPara="1" rIns="91425" wrap="square" tIns="91425">
+            <a:noAutofit/>
+          </a:bodyPr>
+          <a:lstStyle/>
+          <a:p>
+            <a:pPr indent="0" lvl="0" marL="0" rtl="0" algn="l">
+              <a:spcBef>
+                <a:spcPts val="0"/>
+              </a:spcBef>
+              <a:spcAft>
+                <a:spcPts val="0"/>
+              </a:spcAft>
+              <a:buNone/>
+            </a:pPr>
+            <a:r>
+              <a:rPr lang="en-GB"/>
+              <a:t>Why</a:t>
+            </a:r>
+            <a:endParaRPr/>
+          </a:p>
+        </p:txBody>
+      </p:sp>
+      <p:sp>
+        <p:nvSpPr>
+          <p:cNvPr id="66" name="Google Shape;66;p14"/>
+          <p:cNvSpPr txBox="1"/>
+          <p:nvPr>
+            <p:ph idx="1" type="body"/>
+          </p:nvPr>
+        </p:nvSpPr>
+        <p:spPr>
+          <a:xfrm>
+            <a:off x="311700" y="1152475"/>
+            <a:ext cx="8520600" cy="3416400"/>
+          </a:xfrm>
+          <a:prstGeom prst="rect">
+            <a:avLst/>
+          </a:prstGeom>
+        </p:spPr>
+        <p:txBody>
+          <a:bodyPr anchorCtr="0" anchor="t" bIns="91425" lIns="91425" spcFirstLastPara="1" rIns="91425" wrap="square" tIns="91425">
+            <a:noAutofit/>
+          </a:bodyPr>
+          <a:lstStyle/>
+          <a:p>
+            <a:pPr indent="0" lvl="0" marL="0" rtl="0" algn="l">
+              <a:spcBef>
+                <a:spcPts val="0"/>
+              </a:spcBef>
+              <a:spcAft>
+                <a:spcPts val="1600"/>
+              </a:spcAft>
+              <a:buNone/>
+            </a:pPr>
+            <a:r>
+              <a:t/>
+            </a:r>
+            <a:endParaRPr/>
+          </a:p>
+        </p:txBody>
+      </p:sp>
+    </p:spTree>
+  </p:cSld>
+  <p:clrMapOvr>
+    <a:masterClrMapping/>
+  </p:clrMapOvr>
+</p:sld>
+</file>
+
+<file path=ppt/slides/slide3.xml><?xml version="1.0" encoding="utf-8"?>
+<p:sld xmlns:a="http://schemas.openxmlformats.org/drawingml/2006/main" xmlns:r="http://schemas.openxmlformats.org/officeDocument/2006/relationships" xmlns:mc="http://schemas.openxmlformats.org/markup-compatibility/2006" xmlns:mv="urn:schemas-microsoft-com:mac:vml" xmlns:p="http://schemas.openxmlformats.org/presentationml/2006/main" xmlns:c="http://schemas.openxmlformats.org/drawingml/2006/chart" xmlns:dgm="http://schemas.openxmlformats.org/drawingml/2006/diagram" xmlns:o="urn:schemas-microsoft-com:office:office" xmlns:v="urn:schemas-microsoft-com:vml" xmlns:pvml="urn:schemas-microsoft-com:office:powerpoint" xmlns:com="http://schemas.openxmlformats.org/drawingml/2006/compatibility" xmlns:p14="http://schemas.microsoft.com/office/powerpoint/2010/main" xmlns:p15="http://schemas.microsoft.com/office/powerpoint/2012/main">
+  <p:cSld>
+    <p:spTree>
+      <p:nvGrpSpPr>
+        <p:cNvPr id="70" name="Shape 70"/>
+        <p:cNvGrpSpPr/>
+        <p:nvPr/>
+      </p:nvGrpSpPr>
+      <p:grpSpPr>
+        <a:xfrm>
+          <a:off x="0" y="0"/>
+          <a:ext cx="0" cy="0"/>
+          <a:chOff x="0" y="0"/>
+          <a:chExt cx="0" cy="0"/>
+        </a:xfrm>
+      </p:grpSpPr>
+      <p:sp>
+        <p:nvSpPr>
+          <p:cNvPr id="71" name="Google Shape;71;p15"/>
+          <p:cNvSpPr txBox="1"/>
+          <p:nvPr>
+            <p:ph type="title"/>
+          </p:nvPr>
+        </p:nvSpPr>
+        <p:spPr>
+          <a:xfrm>
+            <a:off x="311700" y="445025"/>
+            <a:ext cx="8520600" cy="572700"/>
+          </a:xfrm>
+          <a:prstGeom prst="rect">
+            <a:avLst/>
+          </a:prstGeom>
+        </p:spPr>
+        <p:txBody>
+          <a:bodyPr anchorCtr="0" anchor="t" bIns="91425" lIns="91425" spcFirstLastPara="1" rIns="91425" wrap="square" tIns="91425">
+            <a:noAutofit/>
+          </a:bodyPr>
+          <a:lstStyle/>
+          <a:p>
+            <a:pPr indent="0" lvl="0" marL="0" rtl="0" algn="l">
+              <a:lnSpc>
+                <a:spcPct val="115000"/>
+              </a:lnSpc>
+              <a:spcBef>
+                <a:spcPts val="0"/>
+              </a:spcBef>
+              <a:spcAft>
+                <a:spcPts val="1600"/>
+              </a:spcAft>
+              <a:buNone/>
+            </a:pPr>
+            <a:r>
+              <a:rPr lang="en-GB"/>
+              <a:t>How do we estimate the probability?</a:t>
+            </a:r>
+            <a:endParaRPr/>
+          </a:p>
+        </p:txBody>
+      </p:sp>
+      <p:sp>
+        <p:nvSpPr>
+          <p:cNvPr id="72" name="Google Shape;72;p15"/>
+          <p:cNvSpPr txBox="1"/>
+          <p:nvPr>
+            <p:ph idx="1" type="body"/>
+          </p:nvPr>
+        </p:nvSpPr>
+        <p:spPr>
+          <a:xfrm>
+            <a:off x="311700" y="1178275"/>
+            <a:ext cx="8520600" cy="572700"/>
+          </a:xfrm>
+          <a:prstGeom prst="rect">
+            <a:avLst/>
+          </a:prstGeom>
+        </p:spPr>
+        <p:txBody>
+          <a:bodyPr anchorCtr="0" anchor="t" bIns="91425" lIns="91425" spcFirstLastPara="1" rIns="91425" wrap="square" tIns="91425">
+            <a:noAutofit/>
+          </a:bodyPr>
+          <a:lstStyle/>
+          <a:p>
+            <a:pPr indent="-419100" lvl="0" marL="914400" rtl="0" algn="l">
+              <a:spcBef>
+                <a:spcPts val="0"/>
+              </a:spcBef>
+              <a:spcAft>
+                <a:spcPts val="0"/>
+              </a:spcAft>
+              <a:buClr>
+                <a:schemeClr val="dk1"/>
+              </a:buClr>
+              <a:buSzPts val="3000"/>
+              <a:buFont typeface="Oswald"/>
+              <a:buChar char="●"/>
+            </a:pPr>
+            <a:r>
+              <a:rPr lang="en-GB" sz="3000">
+                <a:solidFill>
+                  <a:schemeClr val="dk1"/>
+                </a:solidFill>
+                <a:latin typeface="Oswald"/>
+                <a:ea typeface="Oswald"/>
+                <a:cs typeface="Oswald"/>
+                <a:sym typeface="Oswald"/>
+              </a:rPr>
+              <a:t>Classical: By considering equal outcomes</a:t>
+            </a:r>
+            <a:endParaRPr sz="3000">
+              <a:solidFill>
+                <a:schemeClr val="dk1"/>
+              </a:solidFill>
+              <a:latin typeface="Oswald"/>
+              <a:ea typeface="Oswald"/>
+              <a:cs typeface="Oswald"/>
+              <a:sym typeface="Oswald"/>
+            </a:endParaRPr>
+          </a:p>
+        </p:txBody>
+      </p:sp>
+      <p:sp>
+        <p:nvSpPr>
+          <p:cNvPr id="73" name="Google Shape;73;p15"/>
+          <p:cNvSpPr txBox="1"/>
+          <p:nvPr>
+            <p:ph idx="1" type="body"/>
+          </p:nvPr>
+        </p:nvSpPr>
+        <p:spPr>
+          <a:xfrm>
+            <a:off x="311700" y="1750975"/>
+            <a:ext cx="8520600" cy="572700"/>
+          </a:xfrm>
+          <a:prstGeom prst="rect">
+            <a:avLst/>
+          </a:prstGeom>
+        </p:spPr>
+        <p:txBody>
+          <a:bodyPr anchorCtr="0" anchor="t" bIns="91425" lIns="91425" spcFirstLastPara="1" rIns="91425" wrap="square" tIns="91425">
+            <a:noAutofit/>
+          </a:bodyPr>
+          <a:lstStyle/>
+          <a:p>
+            <a:pPr indent="-419100" lvl="0" marL="914400" rtl="0" algn="l">
+              <a:spcBef>
+                <a:spcPts val="0"/>
+              </a:spcBef>
+              <a:spcAft>
+                <a:spcPts val="0"/>
+              </a:spcAft>
+              <a:buClr>
+                <a:schemeClr val="dk1"/>
+              </a:buClr>
+              <a:buSzPts val="3000"/>
+              <a:buFont typeface="Oswald"/>
+              <a:buChar char="●"/>
+            </a:pPr>
+            <a:r>
+              <a:rPr lang="en-GB" sz="3000">
+                <a:solidFill>
+                  <a:schemeClr val="dk1"/>
+                </a:solidFill>
+                <a:latin typeface="Oswald"/>
+                <a:ea typeface="Oswald"/>
+                <a:cs typeface="Oswald"/>
+                <a:sym typeface="Oswald"/>
+              </a:rPr>
+              <a:t>Frequentist: Relative Frequency over time</a:t>
+            </a:r>
+            <a:endParaRPr sz="3000">
+              <a:solidFill>
+                <a:schemeClr val="dk1"/>
+              </a:solidFill>
+              <a:latin typeface="Oswald"/>
+              <a:ea typeface="Oswald"/>
+              <a:cs typeface="Oswald"/>
+              <a:sym typeface="Oswald"/>
+            </a:endParaRPr>
+          </a:p>
+        </p:txBody>
+      </p:sp>
+      <p:sp>
+        <p:nvSpPr>
+          <p:cNvPr id="74" name="Google Shape;74;p15"/>
+          <p:cNvSpPr txBox="1"/>
+          <p:nvPr>
+            <p:ph idx="1" type="body"/>
+          </p:nvPr>
+        </p:nvSpPr>
+        <p:spPr>
+          <a:xfrm>
+            <a:off x="311700" y="2323675"/>
+            <a:ext cx="8520600" cy="572700"/>
+          </a:xfrm>
+          <a:prstGeom prst="rect">
+            <a:avLst/>
+          </a:prstGeom>
+        </p:spPr>
+        <p:txBody>
+          <a:bodyPr anchorCtr="0" anchor="t" bIns="91425" lIns="91425" spcFirstLastPara="1" rIns="91425" wrap="square" tIns="91425">
+            <a:noAutofit/>
+          </a:bodyPr>
+          <a:lstStyle/>
+          <a:p>
+            <a:pPr indent="-419100" lvl="0" marL="914400" rtl="0" algn="l">
+              <a:spcBef>
+                <a:spcPts val="0"/>
+              </a:spcBef>
+              <a:spcAft>
+                <a:spcPts val="0"/>
+              </a:spcAft>
+              <a:buClr>
+                <a:schemeClr val="dk2"/>
+              </a:buClr>
+              <a:buSzPts val="3000"/>
+              <a:buFont typeface="Oswald"/>
+              <a:buChar char="●"/>
+            </a:pPr>
+            <a:r>
+              <a:rPr lang="en-GB" sz="3000">
+                <a:solidFill>
+                  <a:schemeClr val="dk2"/>
+                </a:solidFill>
+                <a:latin typeface="Oswald"/>
+                <a:ea typeface="Oswald"/>
+                <a:cs typeface="Oswald"/>
+                <a:sym typeface="Oswald"/>
+              </a:rPr>
+              <a:t>Bayesian: By updating our beliefs for each obs.</a:t>
+            </a:r>
+            <a:endParaRPr sz="3000">
+              <a:solidFill>
+                <a:schemeClr val="dk2"/>
+              </a:solidFill>
+              <a:latin typeface="Oswald"/>
+              <a:ea typeface="Oswald"/>
+              <a:cs typeface="Oswald"/>
+              <a:sym typeface="Oswald"/>
+            </a:endParaRPr>
+          </a:p>
+        </p:txBody>
+      </p:sp>
+    </p:spTree>
+  </p:cSld>
+  <p:clrMapOvr>
+    <a:masterClrMapping/>
+  </p:clrMapOvr>
+  <p:timing>
+    <p:tnLst>
+      <p:par>
+        <p:cTn dur="indefinite" nodeType="tmRoot" restart="never">
+          <p:childTnLst>
+            <p:seq concurrent="1" nextAc="seek">
+              <p:cTn dur="indefinite" id="2" nodeType="mainSeq">
+                <p:childTnLst>
+                  <p:par>
+                    <p:cTn fill="hold">
+                      <p:stCondLst>
+                        <p:cond delay="indefinite"/>
+                      </p:stCondLst>
+                      <p:childTnLst>
+                        <p:par>
+                          <p:cTn fill="hold">
+                            <p:stCondLst>
+                              <p:cond delay="0"/>
+                            </p:stCondLst>
+                            <p:childTnLst>
+                              <p:par>
+                                <p:cTn fill="hold" nodeType="clickEffect" presetClass="entr" presetID="10" presetSubtype="0">
+                                  <p:stCondLst>
+                                    <p:cond delay="0"/>
+                                  </p:stCondLst>
+                                  <p:childTnLst>
+                                    <p:set>
+                                      <p:cBhvr>
+                                        <p:cTn dur="1" fill="hold">
+                                          <p:stCondLst>
+                                            <p:cond delay="0"/>
+                                          </p:stCondLst>
+                                        </p:cTn>
+                                        <p:tgtEl>
+                                          <p:spTgt spid="72"/>
+                                        </p:tgtEl>
+                                        <p:attrNameLst>
+                                          <p:attrName>style.visibility</p:attrName>
+                                        </p:attrNameLst>
+                                      </p:cBhvr>
+                                      <p:to>
+                                        <p:strVal val="visible"/>
+                                      </p:to>
+                                    </p:set>
+                                    <p:animEffect filter="fade" transition="in">
+                                      <p:cBhvr>
+                                        <p:cTn dur="1000"/>
+                                        <p:tgtEl>
+                                          <p:spTgt spid="72"/>
+                                        </p:tgtEl>
+                                      </p:cBhvr>
+                                    </p:animEffect>
+                                  </p:childTnLst>
+                                </p:cTn>
+                              </p:par>
+                            </p:childTnLst>
+                          </p:cTn>
+                        </p:par>
+                      </p:childTnLst>
+                    </p:cTn>
+                  </p:par>
+                  <p:par>
+                    <p:cTn fill="hold">
+                      <p:stCondLst>
+                        <p:cond delay="indefinite"/>
+                      </p:stCondLst>
+                      <p:childTnLst>
+                        <p:par>
+                          <p:cTn fill="hold">
+                            <p:stCondLst>
+                              <p:cond delay="0"/>
+                            </p:stCondLst>
+                            <p:childTnLst>
+                              <p:par>
+                                <p:cTn fill="hold" nodeType="clickEffect" presetClass="entr" presetID="10" presetSubtype="0">
+                                  <p:stCondLst>
+                                    <p:cond delay="0"/>
+                                  </p:stCondLst>
+                                  <p:childTnLst>
+                                    <p:set>
+                                      <p:cBhvr>
+                                        <p:cTn dur="1" fill="hold">
+                                          <p:stCondLst>
+                                            <p:cond delay="0"/>
+                                          </p:stCondLst>
+                                        </p:cTn>
+                                        <p:tgtEl>
+                                          <p:spTgt spid="73"/>
+                                        </p:tgtEl>
+                                        <p:attrNameLst>
+                                          <p:attrName>style.visibility</p:attrName>
+                                        </p:attrNameLst>
+                                      </p:cBhvr>
+                                      <p:to>
+                                        <p:strVal val="visible"/>
+                                      </p:to>
+                                    </p:set>
+                                    <p:animEffect filter="fade" transition="in">
+                                      <p:cBhvr>
+                                        <p:cTn dur="1000"/>
+                                        <p:tgtEl>
+                                          <p:spTgt spid="73"/>
+                                        </p:tgtEl>
+                                      </p:cBhvr>
+                                    </p:animEffect>
+                                  </p:childTnLst>
+                                </p:cTn>
+                              </p:par>
+                            </p:childTnLst>
+                          </p:cTn>
+                        </p:par>
+                      </p:childTnLst>
+                    </p:cTn>
+                  </p:par>
+                  <p:par>
+                    <p:cTn fill="hold">
+                      <p:stCondLst>
+                        <p:cond delay="indefinite"/>
+                      </p:stCondLst>
+                      <p:childTnLst>
+                        <p:par>
+                          <p:cTn fill="hold">
+                            <p:stCondLst>
+                              <p:cond delay="0"/>
+                            </p:stCondLst>
+                            <p:childTnLst>
+                              <p:par>
+                                <p:cTn fill="hold" nodeType="clickEffect" presetClass="entr" presetID="10" presetSubtype="0">
+                                  <p:stCondLst>
+                                    <p:cond delay="0"/>
+                                  </p:stCondLst>
+                                  <p:childTnLst>
+                                    <p:set>
+                                      <p:cBhvr>
+                                        <p:cTn dur="1" fill="hold">
+                                          <p:stCondLst>
+                                            <p:cond delay="0"/>
+                                          </p:stCondLst>
+                                        </p:cTn>
+                                        <p:tgtEl>
+                                          <p:spTgt spid="74"/>
+                                        </p:tgtEl>
+                                        <p:attrNameLst>
+                                          <p:attrName>style.visibility</p:attrName>
+                                        </p:attrNameLst>
+                                      </p:cBhvr>
+                                      <p:to>
+                                        <p:strVal val="visible"/>
+                                      </p:to>
+                                    </p:set>
+                                    <p:animEffect filter="fade" transition="in">
+                                      <p:cBhvr>
+                                        <p:cTn dur="1000"/>
+                                        <p:tgtEl>
+                                          <p:spTgt spid="74"/>
+                                        </p:tgtEl>
+                                      </p:cBhvr>
+                                    </p:animEffect>
+                                  </p:childTnLst>
+                                </p:cTn>
+                              </p:par>
+                            </p:childTnLst>
+                          </p:cTn>
+                        </p:par>
+                      </p:childTnLst>
+                    </p:cTn>
+                  </p:par>
+                </p:childTnLst>
+              </p:cTn>
+              <p:prevCondLst>
+                <p:cond evt="onPrev">
+                  <p:tgtEl>
+                    <p:sldTgt/>
+                  </p:tgtEl>
+                </p:cond>
+              </p:prevCondLst>
+              <p:nextCondLst>
+                <p:cond evt="onNext">
+                  <p:tgtEl>
+                    <p:sldTgt/>
+                  </p:tgtEl>
+                </p:cond>
+              </p:nextCondLst>
+            </p:seq>
+          </p:childTnLst>
+        </p:cTn>
+      </p:par>
+    </p:tnLst>
+  </p:timing>
+</p:sld>
+</file>
+
+<file path=ppt/slides/slide4.xml><?xml version="1.0" encoding="utf-8"?>
+<p:sld xmlns:a="http://schemas.openxmlformats.org/drawingml/2006/main" xmlns:r="http://schemas.openxmlformats.org/officeDocument/2006/relationships" xmlns:mc="http://schemas.openxmlformats.org/markup-compatibility/2006" xmlns:mv="urn:schemas-microsoft-com:mac:vml" xmlns:p="http://schemas.openxmlformats.org/presentationml/2006/main" xmlns:c="http://schemas.openxmlformats.org/drawingml/2006/chart" xmlns:dgm="http://schemas.openxmlformats.org/drawingml/2006/diagram" xmlns:o="urn:schemas-microsoft-com:office:office" xmlns:v="urn:schemas-microsoft-com:vml" xmlns:pvml="urn:schemas-microsoft-com:office:powerpoint" xmlns:com="http://schemas.openxmlformats.org/drawingml/2006/compatibility" xmlns:p14="http://schemas.microsoft.com/office/powerpoint/2010/main" xmlns:p15="http://schemas.microsoft.com/office/powerpoint/2012/main">
+  <p:cSld>
+    <p:spTree>
+      <p:nvGrpSpPr>
+        <p:cNvPr id="78" name="Shape 78"/>
+        <p:cNvGrpSpPr/>
+        <p:nvPr/>
+      </p:nvGrpSpPr>
+      <p:grpSpPr>
+        <a:xfrm>
+          <a:off x="0" y="0"/>
+          <a:ext cx="0" cy="0"/>
+          <a:chOff x="0" y="0"/>
+          <a:chExt cx="0" cy="0"/>
+        </a:xfrm>
+      </p:grpSpPr>
+      <p:sp>
+        <p:nvSpPr>
+          <p:cNvPr id="79" name="Google Shape;79;p16"/>
+          <p:cNvSpPr txBox="1"/>
+          <p:nvPr>
+            <p:ph type="title"/>
+          </p:nvPr>
+        </p:nvSpPr>
+        <p:spPr>
+          <a:xfrm>
+            <a:off x="311700" y="445025"/>
+            <a:ext cx="8520600" cy="572700"/>
+          </a:xfrm>
+          <a:prstGeom prst="rect">
+            <a:avLst/>
+          </a:prstGeom>
+        </p:spPr>
+        <p:txBody>
+          <a:bodyPr anchorCtr="0" anchor="t" bIns="91425" lIns="91425" spcFirstLastPara="1" rIns="91425" wrap="square" tIns="91425">
+            <a:noAutofit/>
+          </a:bodyPr>
+          <a:lstStyle/>
+          <a:p>
+            <a:pPr indent="0" lvl="0" marL="0" rtl="0" algn="l">
+              <a:spcBef>
+                <a:spcPts val="0"/>
+              </a:spcBef>
+              <a:spcAft>
+                <a:spcPts val="0"/>
+              </a:spcAft>
+              <a:buNone/>
+            </a:pPr>
+            <a:r>
+              <a:rPr lang="en-GB"/>
+              <a:t>Coin Toss: Classical Est.</a:t>
+            </a:r>
+            <a:endParaRPr/>
+          </a:p>
+        </p:txBody>
+      </p:sp>
+      <p:sp>
+        <p:nvSpPr>
+          <p:cNvPr id="80" name="Google Shape;80;p16"/>
+          <p:cNvSpPr txBox="1"/>
+          <p:nvPr>
+            <p:ph idx="1" type="body"/>
+          </p:nvPr>
+        </p:nvSpPr>
+        <p:spPr>
+          <a:xfrm>
+            <a:off x="311700" y="1152475"/>
+            <a:ext cx="8520600" cy="3416400"/>
+          </a:xfrm>
+          <a:prstGeom prst="rect">
+            <a:avLst/>
+          </a:prstGeom>
+        </p:spPr>
+        <p:txBody>
+          <a:bodyPr anchorCtr="0" anchor="ctr" bIns="91425" lIns="91425" spcFirstLastPara="1" rIns="91425" wrap="square" tIns="91425">
+            <a:noAutofit/>
+          </a:bodyPr>
+          <a:lstStyle/>
+          <a:p>
+            <a:pPr indent="0" lvl="0" marL="0" rtl="0" algn="ctr">
+              <a:lnSpc>
+                <a:spcPct val="100000"/>
+              </a:lnSpc>
+              <a:spcBef>
+                <a:spcPts val="0"/>
+              </a:spcBef>
+              <a:spcAft>
+                <a:spcPts val="0"/>
+              </a:spcAft>
+              <a:buNone/>
+            </a:pPr>
+            <a:r>
+              <a:rPr lang="en-GB" sz="2400">
+                <a:latin typeface="Ubuntu Mono"/>
+                <a:ea typeface="Ubuntu Mono"/>
+                <a:cs typeface="Ubuntu Mono"/>
+                <a:sym typeface="Ubuntu Mono"/>
+              </a:rPr>
+              <a:t>Coin</a:t>
+            </a:r>
+            <a:endParaRPr sz="2400">
+              <a:latin typeface="Ubuntu Mono"/>
+              <a:ea typeface="Ubuntu Mono"/>
+              <a:cs typeface="Ubuntu Mono"/>
+              <a:sym typeface="Ubuntu Mono"/>
+            </a:endParaRPr>
+          </a:p>
+          <a:p>
+            <a:pPr indent="0" lvl="0" marL="0" rtl="0" algn="ctr">
+              <a:lnSpc>
+                <a:spcPct val="100000"/>
+              </a:lnSpc>
+              <a:spcBef>
+                <a:spcPts val="0"/>
+              </a:spcBef>
+              <a:spcAft>
+                <a:spcPts val="0"/>
+              </a:spcAft>
+              <a:buNone/>
+            </a:pPr>
+            <a:r>
+              <a:rPr lang="en-GB" sz="2400">
+                <a:latin typeface="Ubuntu Mono"/>
+                <a:ea typeface="Ubuntu Mono"/>
+                <a:cs typeface="Ubuntu Mono"/>
+                <a:sym typeface="Ubuntu Mono"/>
+              </a:rPr>
+              <a:t>|</a:t>
+            </a:r>
+            <a:endParaRPr sz="2400">
+              <a:latin typeface="Ubuntu Mono"/>
+              <a:ea typeface="Ubuntu Mono"/>
+              <a:cs typeface="Ubuntu Mono"/>
+              <a:sym typeface="Ubuntu Mono"/>
+            </a:endParaRPr>
+          </a:p>
+          <a:p>
+            <a:pPr indent="0" lvl="0" marL="0" rtl="0" algn="ctr">
+              <a:lnSpc>
+                <a:spcPct val="100000"/>
+              </a:lnSpc>
+              <a:spcBef>
+                <a:spcPts val="0"/>
+              </a:spcBef>
+              <a:spcAft>
+                <a:spcPts val="0"/>
+              </a:spcAft>
+              <a:buNone/>
+            </a:pPr>
+            <a:r>
+              <a:rPr lang="en-GB" sz="2400">
+                <a:latin typeface="Ubuntu Mono"/>
+                <a:ea typeface="Ubuntu Mono"/>
+                <a:cs typeface="Ubuntu Mono"/>
+                <a:sym typeface="Ubuntu Mono"/>
+              </a:rPr>
+              <a:t>------</a:t>
+            </a:r>
+            <a:endParaRPr sz="2400">
+              <a:latin typeface="Ubuntu Mono"/>
+              <a:ea typeface="Ubuntu Mono"/>
+              <a:cs typeface="Ubuntu Mono"/>
+              <a:sym typeface="Ubuntu Mono"/>
+            </a:endParaRPr>
+          </a:p>
+          <a:p>
+            <a:pPr indent="0" lvl="0" marL="0" rtl="0" algn="ctr">
+              <a:lnSpc>
+                <a:spcPct val="100000"/>
+              </a:lnSpc>
+              <a:spcBef>
+                <a:spcPts val="0"/>
+              </a:spcBef>
+              <a:spcAft>
+                <a:spcPts val="0"/>
+              </a:spcAft>
+              <a:buNone/>
+            </a:pPr>
+            <a:r>
+              <a:rPr lang="en-GB" sz="2400">
+                <a:latin typeface="Ubuntu Mono"/>
+                <a:ea typeface="Ubuntu Mono"/>
+                <a:cs typeface="Ubuntu Mono"/>
+                <a:sym typeface="Ubuntu Mono"/>
+              </a:rPr>
+              <a:t>|    |</a:t>
+            </a:r>
+            <a:endParaRPr sz="2400">
+              <a:latin typeface="Ubuntu Mono"/>
+              <a:ea typeface="Ubuntu Mono"/>
+              <a:cs typeface="Ubuntu Mono"/>
+              <a:sym typeface="Ubuntu Mono"/>
+            </a:endParaRPr>
+          </a:p>
+          <a:p>
+            <a:pPr indent="0" lvl="0" marL="0" rtl="0" algn="ctr">
+              <a:lnSpc>
+                <a:spcPct val="100000"/>
+              </a:lnSpc>
+              <a:spcBef>
+                <a:spcPts val="0"/>
+              </a:spcBef>
+              <a:spcAft>
+                <a:spcPts val="0"/>
+              </a:spcAft>
+              <a:buNone/>
+            </a:pPr>
+            <a:r>
+              <a:rPr lang="en-GB" sz="2400">
+                <a:latin typeface="Ubuntu Mono"/>
+                <a:ea typeface="Ubuntu Mono"/>
+                <a:cs typeface="Ubuntu Mono"/>
+                <a:sym typeface="Ubuntu Mono"/>
+              </a:rPr>
+              <a:t>H    T</a:t>
+            </a:r>
+            <a:endParaRPr sz="2400">
+              <a:latin typeface="Ubuntu Mono"/>
+              <a:ea typeface="Ubuntu Mono"/>
+              <a:cs typeface="Ubuntu Mono"/>
+              <a:sym typeface="Ubuntu Mono"/>
+            </a:endParaRPr>
+          </a:p>
+          <a:p>
+            <a:pPr indent="0" lvl="0" marL="0" rtl="0" algn="ctr">
+              <a:lnSpc>
+                <a:spcPct val="100000"/>
+              </a:lnSpc>
+              <a:spcBef>
+                <a:spcPts val="0"/>
+              </a:spcBef>
+              <a:spcAft>
+                <a:spcPts val="0"/>
+              </a:spcAft>
+              <a:buNone/>
+            </a:pPr>
+            <a:r>
+              <a:t/>
+            </a:r>
+            <a:endParaRPr sz="2400">
+              <a:latin typeface="Ubuntu Mono"/>
+              <a:ea typeface="Ubuntu Mono"/>
+              <a:cs typeface="Ubuntu Mono"/>
+              <a:sym typeface="Ubuntu Mono"/>
+            </a:endParaRPr>
+          </a:p>
+          <a:p>
+            <a:pPr indent="0" lvl="0" marL="0" rtl="0" algn="ctr">
+              <a:lnSpc>
+                <a:spcPct val="100000"/>
+              </a:lnSpc>
+              <a:spcBef>
+                <a:spcPts val="0"/>
+              </a:spcBef>
+              <a:spcAft>
+                <a:spcPts val="0"/>
+              </a:spcAft>
+              <a:buNone/>
+            </a:pPr>
+            <a:r>
+              <a:rPr lang="en-GB" sz="2400">
+                <a:latin typeface="Ubuntu Mono"/>
+                <a:ea typeface="Ubuntu Mono"/>
+                <a:cs typeface="Ubuntu Mono"/>
+                <a:sym typeface="Ubuntu Mono"/>
+              </a:rPr>
+              <a:t>0.5    0.5</a:t>
+            </a:r>
+            <a:endParaRPr sz="2400">
+              <a:latin typeface="Ubuntu Mono"/>
+              <a:ea typeface="Ubuntu Mono"/>
+              <a:cs typeface="Ubuntu Mono"/>
+              <a:sym typeface="Ubuntu Mono"/>
+            </a:endParaRPr>
+          </a:p>
+        </p:txBody>
+      </p:sp>
+    </p:spTree>
+  </p:cSld>
+  <p:clrMapOvr>
+    <a:masterClrMapping/>
+  </p:clrMapOvr>
+</p:sld>
+</file>
+
+<file path=ppt/slides/slide5.xml><?xml version="1.0" encoding="utf-8"?>
+<p:sld xmlns:a="http://schemas.openxmlformats.org/drawingml/2006/main" xmlns:r="http://schemas.openxmlformats.org/officeDocument/2006/relationships" xmlns:mc="http://schemas.openxmlformats.org/markup-compatibility/2006" xmlns:mv="urn:schemas-microsoft-com:mac:vml" xmlns:p="http://schemas.openxmlformats.org/presentationml/2006/main" xmlns:c="http://schemas.openxmlformats.org/drawingml/2006/chart" xmlns:dgm="http://schemas.openxmlformats.org/drawingml/2006/diagram" xmlns:o="urn:schemas-microsoft-com:office:office" xmlns:v="urn:schemas-microsoft-com:vml" xmlns:pvml="urn:schemas-microsoft-com:office:powerpoint" xmlns:com="http://schemas.openxmlformats.org/drawingml/2006/compatibility" xmlns:p14="http://schemas.microsoft.com/office/powerpoint/2010/main" xmlns:p15="http://schemas.microsoft.com/office/powerpoint/2012/main">
+  <p:cSld>
+    <p:spTree>
+      <p:nvGrpSpPr>
+        <p:cNvPr id="84" name="Shape 84"/>
+        <p:cNvGrpSpPr/>
+        <p:nvPr/>
+      </p:nvGrpSpPr>
+      <p:grpSpPr>
+        <a:xfrm>
+          <a:off x="0" y="0"/>
+          <a:ext cx="0" cy="0"/>
+          <a:chOff x="0" y="0"/>
+          <a:chExt cx="0" cy="0"/>
+        </a:xfrm>
+      </p:grpSpPr>
+      <p:sp>
+        <p:nvSpPr>
+          <p:cNvPr id="85" name="Google Shape;85;p17"/>
+          <p:cNvSpPr txBox="1"/>
+          <p:nvPr>
+            <p:ph type="title"/>
+          </p:nvPr>
+        </p:nvSpPr>
+        <p:spPr>
+          <a:xfrm>
+            <a:off x="311700" y="445025"/>
+            <a:ext cx="8520600" cy="572700"/>
+          </a:xfrm>
+          <a:prstGeom prst="rect">
+            <a:avLst/>
+          </a:prstGeom>
+        </p:spPr>
+        <p:txBody>
+          <a:bodyPr anchorCtr="0" anchor="t" bIns="91425" lIns="91425" spcFirstLastPara="1" rIns="91425" wrap="square" tIns="91425">
+            <a:noAutofit/>
+          </a:bodyPr>
+          <a:lstStyle/>
+          <a:p>
+            <a:pPr indent="0" lvl="0" marL="0" rtl="0" algn="l">
+              <a:spcBef>
+                <a:spcPts val="0"/>
+              </a:spcBef>
+              <a:spcAft>
+                <a:spcPts val="0"/>
+              </a:spcAft>
+              <a:buNone/>
+            </a:pPr>
+            <a:r>
+              <a:rPr lang="en-GB"/>
+              <a:t>Dice: Classical Est.</a:t>
+            </a:r>
+            <a:endParaRPr/>
+          </a:p>
+        </p:txBody>
+      </p:sp>
+      <p:sp>
+        <p:nvSpPr>
+          <p:cNvPr id="86" name="Google Shape;86;p17"/>
+          <p:cNvSpPr txBox="1"/>
+          <p:nvPr>
+            <p:ph idx="1" type="body"/>
+          </p:nvPr>
+        </p:nvSpPr>
+        <p:spPr>
+          <a:xfrm>
+            <a:off x="311700" y="1152475"/>
+            <a:ext cx="8520600" cy="3416400"/>
+          </a:xfrm>
+          <a:prstGeom prst="rect">
+            <a:avLst/>
+          </a:prstGeom>
+        </p:spPr>
+        <p:txBody>
+          <a:bodyPr anchorCtr="0" anchor="ctr" bIns="91425" lIns="91425" spcFirstLastPara="1" rIns="91425" wrap="square" tIns="91425">
+            <a:noAutofit/>
+          </a:bodyPr>
+          <a:lstStyle/>
+          <a:p>
+            <a:pPr indent="0" lvl="0" marL="0" rtl="0" algn="ctr">
+              <a:lnSpc>
+                <a:spcPct val="100000"/>
+              </a:lnSpc>
+              <a:spcBef>
+                <a:spcPts val="0"/>
+              </a:spcBef>
+              <a:spcAft>
+                <a:spcPts val="0"/>
+              </a:spcAft>
+              <a:buNone/>
+            </a:pPr>
+            <a:r>
+              <a:rPr lang="en-GB" sz="2400">
+                <a:latin typeface="Ubuntu Mono"/>
+                <a:ea typeface="Ubuntu Mono"/>
+                <a:cs typeface="Ubuntu Mono"/>
+                <a:sym typeface="Ubuntu Mono"/>
+              </a:rPr>
+              <a:t>Dice</a:t>
+            </a:r>
+            <a:endParaRPr sz="2400">
+              <a:latin typeface="Ubuntu Mono"/>
+              <a:ea typeface="Ubuntu Mono"/>
+              <a:cs typeface="Ubuntu Mono"/>
+              <a:sym typeface="Ubuntu Mono"/>
+            </a:endParaRPr>
+          </a:p>
+          <a:p>
+            <a:pPr indent="0" lvl="0" marL="0" rtl="0" algn="ctr">
+              <a:lnSpc>
+                <a:spcPct val="100000"/>
+              </a:lnSpc>
+              <a:spcBef>
+                <a:spcPts val="0"/>
+              </a:spcBef>
+              <a:spcAft>
+                <a:spcPts val="0"/>
+              </a:spcAft>
+              <a:buNone/>
+            </a:pPr>
+            <a:r>
+              <a:rPr lang="en-GB" sz="2400">
+                <a:latin typeface="Ubuntu Mono"/>
+                <a:ea typeface="Ubuntu Mono"/>
+                <a:cs typeface="Ubuntu Mono"/>
+                <a:sym typeface="Ubuntu Mono"/>
+              </a:rPr>
+              <a:t>|</a:t>
+            </a:r>
+            <a:endParaRPr sz="2400">
+              <a:latin typeface="Ubuntu Mono"/>
+              <a:ea typeface="Ubuntu Mono"/>
+              <a:cs typeface="Ubuntu Mono"/>
+              <a:sym typeface="Ubuntu Mono"/>
+            </a:endParaRPr>
+          </a:p>
+          <a:p>
+            <a:pPr indent="0" lvl="0" marL="0" rtl="0" algn="ctr">
+              <a:lnSpc>
+                <a:spcPct val="100000"/>
+              </a:lnSpc>
+              <a:spcBef>
+                <a:spcPts val="0"/>
+              </a:spcBef>
+              <a:spcAft>
+                <a:spcPts val="0"/>
+              </a:spcAft>
+              <a:buNone/>
+            </a:pPr>
+            <a:r>
+              <a:rPr lang="en-GB" sz="2400">
+                <a:latin typeface="Ubuntu Mono"/>
+                <a:ea typeface="Ubuntu Mono"/>
+                <a:cs typeface="Ubuntu Mono"/>
+                <a:sym typeface="Ubuntu Mono"/>
+              </a:rPr>
+              <a:t>--------------------------</a:t>
+            </a:r>
+            <a:endParaRPr sz="2400">
+              <a:latin typeface="Ubuntu Mono"/>
+              <a:ea typeface="Ubuntu Mono"/>
+              <a:cs typeface="Ubuntu Mono"/>
+              <a:sym typeface="Ubuntu Mono"/>
+            </a:endParaRPr>
+          </a:p>
+          <a:p>
+            <a:pPr indent="0" lvl="0" marL="0" rtl="0" algn="ctr">
+              <a:lnSpc>
+                <a:spcPct val="100000"/>
+              </a:lnSpc>
+              <a:spcBef>
+                <a:spcPts val="0"/>
+              </a:spcBef>
+              <a:spcAft>
+                <a:spcPts val="0"/>
+              </a:spcAft>
+              <a:buNone/>
+            </a:pPr>
+            <a:r>
+              <a:rPr lang="en-GB" sz="2400">
+                <a:latin typeface="Ubuntu Mono"/>
+                <a:ea typeface="Ubuntu Mono"/>
+                <a:cs typeface="Ubuntu Mono"/>
+                <a:sym typeface="Ubuntu Mono"/>
+              </a:rPr>
+              <a:t>|    |    |    |    |    |</a:t>
+            </a:r>
+            <a:endParaRPr sz="2400">
+              <a:latin typeface="Ubuntu Mono"/>
+              <a:ea typeface="Ubuntu Mono"/>
+              <a:cs typeface="Ubuntu Mono"/>
+              <a:sym typeface="Ubuntu Mono"/>
+            </a:endParaRPr>
+          </a:p>
+          <a:p>
+            <a:pPr indent="0" lvl="0" marL="0" rtl="0" algn="ctr">
+              <a:lnSpc>
+                <a:spcPct val="100000"/>
+              </a:lnSpc>
+              <a:spcBef>
+                <a:spcPts val="0"/>
+              </a:spcBef>
+              <a:spcAft>
+                <a:spcPts val="0"/>
+              </a:spcAft>
+              <a:buNone/>
+            </a:pPr>
+            <a:r>
+              <a:rPr lang="en-GB" sz="2400">
+                <a:latin typeface="Ubuntu Mono"/>
+                <a:ea typeface="Ubuntu Mono"/>
+                <a:cs typeface="Ubuntu Mono"/>
+                <a:sym typeface="Ubuntu Mono"/>
+              </a:rPr>
+              <a:t>1    2    3    4    5    6</a:t>
+            </a:r>
+            <a:endParaRPr sz="2400">
+              <a:latin typeface="Ubuntu Mono"/>
+              <a:ea typeface="Ubuntu Mono"/>
+              <a:cs typeface="Ubuntu Mono"/>
+              <a:sym typeface="Ubuntu Mono"/>
+            </a:endParaRPr>
+          </a:p>
+          <a:p>
+            <a:pPr indent="0" lvl="0" marL="0" rtl="0" algn="ctr">
+              <a:lnSpc>
+                <a:spcPct val="100000"/>
+              </a:lnSpc>
+              <a:spcBef>
+                <a:spcPts val="0"/>
+              </a:spcBef>
+              <a:spcAft>
+                <a:spcPts val="0"/>
+              </a:spcAft>
+              <a:buNone/>
+            </a:pPr>
+            <a:r>
+              <a:t/>
+            </a:r>
+            <a:endParaRPr sz="2400">
+              <a:latin typeface="Ubuntu Mono"/>
+              <a:ea typeface="Ubuntu Mono"/>
+              <a:cs typeface="Ubuntu Mono"/>
+              <a:sym typeface="Ubuntu Mono"/>
+            </a:endParaRPr>
+          </a:p>
+          <a:p>
+            <a:pPr indent="0" lvl="0" marL="0" rtl="0" algn="ctr">
+              <a:lnSpc>
+                <a:spcPct val="100000"/>
+              </a:lnSpc>
+              <a:spcBef>
+                <a:spcPts val="0"/>
+              </a:spcBef>
+              <a:spcAft>
+                <a:spcPts val="0"/>
+              </a:spcAft>
+              <a:buNone/>
+            </a:pPr>
+            <a:r>
+              <a:rPr lang="en-GB" sz="2400">
+                <a:latin typeface="Ubuntu Mono"/>
+                <a:ea typeface="Ubuntu Mono"/>
+                <a:cs typeface="Ubuntu Mono"/>
+                <a:sym typeface="Ubuntu Mono"/>
+              </a:rPr>
+              <a:t>0.16 0.16 0.16 0.16 0.16 0.16</a:t>
+            </a:r>
+            <a:endParaRPr sz="2400">
+              <a:latin typeface="Ubuntu Mono"/>
+              <a:ea typeface="Ubuntu Mono"/>
+              <a:cs typeface="Ubuntu Mono"/>
+              <a:sym typeface="Ubuntu Mono"/>
+            </a:endParaRPr>
+          </a:p>
+        </p:txBody>
+      </p:sp>
+    </p:spTree>
+  </p:cSld>
+  <p:clrMapOvr>
+    <a:masterClrMapping/>
+  </p:clrMapOvr>
+</p:sld>
+</file>
+
+<file path=ppt/slides/slide6.xml><?xml version="1.0" encoding="utf-8"?>
+<p:sld xmlns:a="http://schemas.openxmlformats.org/drawingml/2006/main" xmlns:r="http://schemas.openxmlformats.org/officeDocument/2006/relationships" xmlns:mc="http://schemas.openxmlformats.org/markup-compatibility/2006" xmlns:mv="urn:schemas-microsoft-com:mac:vml" xmlns:p="http://schemas.openxmlformats.org/presentationml/2006/main" xmlns:c="http://schemas.openxmlformats.org/drawingml/2006/chart" xmlns:dgm="http://schemas.openxmlformats.org/drawingml/2006/diagram" xmlns:o="urn:schemas-microsoft-com:office:office" xmlns:v="urn:schemas-microsoft-com:vml" xmlns:pvml="urn:schemas-microsoft-com:office:powerpoint" xmlns:com="http://schemas.openxmlformats.org/drawingml/2006/compatibility" xmlns:p14="http://schemas.microsoft.com/office/powerpoint/2010/main" xmlns:p15="http://schemas.microsoft.com/office/powerpoint/2012/main">
+  <p:cSld>
+    <p:spTree>
+      <p:nvGrpSpPr>
+        <p:cNvPr id="90" name="Shape 90"/>
+        <p:cNvGrpSpPr/>
+        <p:nvPr/>
+      </p:nvGrpSpPr>
+      <p:grpSpPr>
+        <a:xfrm>
+          <a:off x="0" y="0"/>
+          <a:ext cx="0" cy="0"/>
+          <a:chOff x="0" y="0"/>
+          <a:chExt cx="0" cy="0"/>
+        </a:xfrm>
+      </p:grpSpPr>
+      <p:sp>
+        <p:nvSpPr>
+          <p:cNvPr id="91" name="Google Shape;91;p18"/>
+          <p:cNvSpPr txBox="1"/>
+          <p:nvPr>
+            <p:ph idx="1" type="body"/>
+          </p:nvPr>
+        </p:nvSpPr>
+        <p:spPr>
+          <a:xfrm>
+            <a:off x="311700" y="3137750"/>
+            <a:ext cx="8520600" cy="1199100"/>
+          </a:xfrm>
+          <a:prstGeom prst="rect">
+            <a:avLst/>
+          </a:prstGeom>
+        </p:spPr>
+        <p:txBody>
+          <a:bodyPr anchorCtr="0" anchor="t" bIns="91425" lIns="91425" spcFirstLastPara="1" rIns="91425" wrap="square" tIns="91425">
+            <a:noAutofit/>
+          </a:bodyPr>
+          <a:lstStyle/>
+          <a:p>
+            <a:pPr indent="-342900" lvl="0" marL="457200" rtl="0" algn="l">
+              <a:spcBef>
+                <a:spcPts val="0"/>
+              </a:spcBef>
+              <a:spcAft>
+                <a:spcPts val="0"/>
+              </a:spcAft>
+              <a:buSzPts val="1800"/>
+              <a:buChar char="●"/>
+            </a:pPr>
+            <a:r>
+              <a:rPr lang="en-GB"/>
+              <a:t>Disadvantages</a:t>
+            </a:r>
+            <a:endParaRPr/>
+          </a:p>
+          <a:p>
+            <a:pPr indent="-317500" lvl="1" marL="914400" rtl="0" algn="l">
+              <a:spcBef>
+                <a:spcPts val="0"/>
+              </a:spcBef>
+              <a:spcAft>
+                <a:spcPts val="0"/>
+              </a:spcAft>
+              <a:buSzPts val="1400"/>
+              <a:buChar char="○"/>
+            </a:pPr>
+            <a:r>
+              <a:rPr lang="en-GB"/>
+              <a:t>High Bias</a:t>
+            </a:r>
+            <a:endParaRPr/>
+          </a:p>
+          <a:p>
+            <a:pPr indent="-317500" lvl="1" marL="914400" rtl="0" algn="l">
+              <a:spcBef>
+                <a:spcPts val="0"/>
+              </a:spcBef>
+              <a:spcAft>
+                <a:spcPts val="0"/>
+              </a:spcAft>
+              <a:buSzPts val="1400"/>
+              <a:buChar char="○"/>
+            </a:pPr>
+            <a:r>
+              <a:rPr lang="en-GB"/>
+              <a:t>Outcomes must be known</a:t>
+            </a:r>
+            <a:endParaRPr/>
+          </a:p>
+          <a:p>
+            <a:pPr indent="-317500" lvl="1" marL="914400" rtl="0" algn="l">
+              <a:spcBef>
+                <a:spcPts val="0"/>
+              </a:spcBef>
+              <a:spcAft>
+                <a:spcPts val="0"/>
+              </a:spcAft>
+              <a:buSzPts val="1400"/>
+              <a:buChar char="○"/>
+            </a:pPr>
+            <a:r>
+              <a:rPr lang="en-GB"/>
+              <a:t>Cannot create sophisticated (high variance) models</a:t>
+            </a:r>
+            <a:endParaRPr/>
+          </a:p>
+        </p:txBody>
+      </p:sp>
+      <p:sp>
+        <p:nvSpPr>
+          <p:cNvPr id="92" name="Google Shape;92;p18"/>
+          <p:cNvSpPr txBox="1"/>
+          <p:nvPr>
+            <p:ph type="title"/>
+          </p:nvPr>
+        </p:nvSpPr>
+        <p:spPr>
+          <a:xfrm>
+            <a:off x="311700" y="445025"/>
+            <a:ext cx="8520600" cy="572700"/>
+          </a:xfrm>
+          <a:prstGeom prst="rect">
+            <a:avLst/>
+          </a:prstGeom>
+        </p:spPr>
+        <p:txBody>
+          <a:bodyPr anchorCtr="0" anchor="t" bIns="91425" lIns="91425" spcFirstLastPara="1" rIns="91425" wrap="square" tIns="91425">
+            <a:noAutofit/>
+          </a:bodyPr>
+          <a:lstStyle/>
+          <a:p>
+            <a:pPr indent="0" lvl="0" marL="0" rtl="0" algn="l">
+              <a:spcBef>
+                <a:spcPts val="0"/>
+              </a:spcBef>
+              <a:spcAft>
+                <a:spcPts val="0"/>
+              </a:spcAft>
+              <a:buNone/>
+            </a:pPr>
+            <a:r>
+              <a:rPr lang="en-GB"/>
+              <a:t>Classical Stats</a:t>
+            </a:r>
+            <a:endParaRPr/>
+          </a:p>
+        </p:txBody>
+      </p:sp>
+      <p:sp>
+        <p:nvSpPr>
+          <p:cNvPr id="93" name="Google Shape;93;p18"/>
+          <p:cNvSpPr txBox="1"/>
+          <p:nvPr>
+            <p:ph idx="1" type="body"/>
+          </p:nvPr>
+        </p:nvSpPr>
+        <p:spPr>
+          <a:xfrm>
+            <a:off x="311700" y="1152475"/>
+            <a:ext cx="8520600" cy="1053000"/>
+          </a:xfrm>
+          <a:prstGeom prst="rect">
+            <a:avLst/>
+          </a:prstGeom>
+        </p:spPr>
+        <p:txBody>
+          <a:bodyPr anchorCtr="0" anchor="t" bIns="91425" lIns="91425" spcFirstLastPara="1" rIns="91425" wrap="square" tIns="91425">
+            <a:noAutofit/>
+          </a:bodyPr>
+          <a:lstStyle/>
+          <a:p>
+            <a:pPr indent="-342900" lvl="0" marL="457200" rtl="0" algn="l">
+              <a:spcBef>
+                <a:spcPts val="0"/>
+              </a:spcBef>
+              <a:spcAft>
+                <a:spcPts val="0"/>
+              </a:spcAft>
+              <a:buSzPts val="1800"/>
+              <a:buChar char="●"/>
+            </a:pPr>
+            <a:r>
+              <a:rPr lang="en-GB"/>
+              <a:t>Requirements</a:t>
+            </a:r>
+            <a:endParaRPr/>
+          </a:p>
+          <a:p>
+            <a:pPr indent="-317500" lvl="1" marL="914400" rtl="0" algn="l">
+              <a:spcBef>
+                <a:spcPts val="0"/>
+              </a:spcBef>
+              <a:spcAft>
+                <a:spcPts val="0"/>
+              </a:spcAft>
+              <a:buSzPts val="1400"/>
+              <a:buChar char="○"/>
+            </a:pPr>
+            <a:r>
+              <a:rPr lang="en-GB"/>
+              <a:t>All Outcomes are known</a:t>
+            </a:r>
+            <a:endParaRPr/>
+          </a:p>
+          <a:p>
+            <a:pPr indent="-317500" lvl="1" marL="914400" rtl="0" algn="l">
+              <a:spcBef>
+                <a:spcPts val="0"/>
+              </a:spcBef>
+              <a:spcAft>
+                <a:spcPts val="0"/>
+              </a:spcAft>
+              <a:buSzPts val="1400"/>
+              <a:buChar char="○"/>
+            </a:pPr>
+            <a:r>
+              <a:rPr lang="en-GB"/>
+              <a:t>Outcomes are assumed to be equally likely</a:t>
+            </a:r>
+            <a:endParaRPr/>
+          </a:p>
+        </p:txBody>
+      </p:sp>
+      <p:sp>
+        <p:nvSpPr>
+          <p:cNvPr id="94" name="Google Shape;94;p18"/>
+          <p:cNvSpPr txBox="1"/>
+          <p:nvPr>
+            <p:ph idx="1" type="body"/>
+          </p:nvPr>
+        </p:nvSpPr>
+        <p:spPr>
+          <a:xfrm>
+            <a:off x="311700" y="2166350"/>
+            <a:ext cx="8520600" cy="971400"/>
+          </a:xfrm>
+          <a:prstGeom prst="rect">
+            <a:avLst/>
+          </a:prstGeom>
+        </p:spPr>
+        <p:txBody>
+          <a:bodyPr anchorCtr="0" anchor="t" bIns="91425" lIns="91425" spcFirstLastPara="1" rIns="91425" wrap="square" tIns="91425">
+            <a:noAutofit/>
+          </a:bodyPr>
+          <a:lstStyle/>
+          <a:p>
+            <a:pPr indent="-342900" lvl="0" marL="457200" rtl="0" algn="l">
+              <a:spcBef>
+                <a:spcPts val="0"/>
+              </a:spcBef>
+              <a:spcAft>
+                <a:spcPts val="0"/>
+              </a:spcAft>
+              <a:buSzPts val="1800"/>
+              <a:buChar char="●"/>
+            </a:pPr>
+            <a:r>
+              <a:rPr lang="en-GB"/>
+              <a:t>Advantages</a:t>
+            </a:r>
+            <a:endParaRPr/>
+          </a:p>
+          <a:p>
+            <a:pPr indent="-317500" lvl="1" marL="914400" rtl="0" algn="l">
+              <a:spcBef>
+                <a:spcPts val="0"/>
+              </a:spcBef>
+              <a:spcAft>
+                <a:spcPts val="0"/>
+              </a:spcAft>
+              <a:buSzPts val="1400"/>
+              <a:buChar char="○"/>
+            </a:pPr>
+            <a:r>
+              <a:rPr lang="en-GB"/>
+              <a:t>Fast Estimation</a:t>
+            </a:r>
+            <a:endParaRPr/>
+          </a:p>
+          <a:p>
+            <a:pPr indent="-317500" lvl="1" marL="914400" rtl="0" algn="l">
+              <a:spcBef>
+                <a:spcPts val="0"/>
+              </a:spcBef>
+              <a:spcAft>
+                <a:spcPts val="0"/>
+              </a:spcAft>
+              <a:buSzPts val="1400"/>
+              <a:buChar char="○"/>
+            </a:pPr>
+            <a:r>
+              <a:rPr lang="en-GB"/>
+              <a:t>Easy to understand</a:t>
+            </a:r>
+            <a:endParaRPr/>
+          </a:p>
+        </p:txBody>
+      </p:sp>
+    </p:spTree>
+  </p:cSld>
+  <p:clrMapOvr>
+    <a:masterClrMapping/>
+  </p:clrMapOvr>
+</p:sld>
+</file>
+
+<file path=ppt/slides/slide7.xml><?xml version="1.0" encoding="utf-8"?>
+<p:sld xmlns:a="http://schemas.openxmlformats.org/drawingml/2006/main" xmlns:r="http://schemas.openxmlformats.org/officeDocument/2006/relationships" xmlns:mc="http://schemas.openxmlformats.org/markup-compatibility/2006" xmlns:mv="urn:schemas-microsoft-com:mac:vml" xmlns:p="http://schemas.openxmlformats.org/presentationml/2006/main" xmlns:c="http://schemas.openxmlformats.org/drawingml/2006/chart" xmlns:dgm="http://schemas.openxmlformats.org/drawingml/2006/diagram" xmlns:o="urn:schemas-microsoft-com:office:office" xmlns:v="urn:schemas-microsoft-com:vml" xmlns:pvml="urn:schemas-microsoft-com:office:powerpoint" xmlns:com="http://schemas.openxmlformats.org/drawingml/2006/compatibility" xmlns:p14="http://schemas.microsoft.com/office/powerpoint/2010/main" xmlns:p15="http://schemas.microsoft.com/office/powerpoint/2012/main">
+  <p:cSld>
+    <p:spTree>
+      <p:nvGrpSpPr>
+        <p:cNvPr id="98" name="Shape 98"/>
+        <p:cNvGrpSpPr/>
+        <p:nvPr/>
+      </p:nvGrpSpPr>
+      <p:grpSpPr>
+        <a:xfrm>
+          <a:off x="0" y="0"/>
+          <a:ext cx="0" cy="0"/>
+          <a:chOff x="0" y="0"/>
+          <a:chExt cx="0" cy="0"/>
+        </a:xfrm>
+      </p:grpSpPr>
+      <p:sp>
+        <p:nvSpPr>
+          <p:cNvPr id="99" name="Google Shape;99;p19"/>
+          <p:cNvSpPr txBox="1"/>
+          <p:nvPr>
+            <p:ph type="title"/>
+          </p:nvPr>
+        </p:nvSpPr>
+        <p:spPr>
+          <a:xfrm>
+            <a:off x="311700" y="445025"/>
+            <a:ext cx="8520600" cy="572700"/>
+          </a:xfrm>
+          <a:prstGeom prst="rect">
+            <a:avLst/>
+          </a:prstGeom>
+        </p:spPr>
+        <p:txBody>
+          <a:bodyPr anchorCtr="0" anchor="t" bIns="91425" lIns="91425" spcFirstLastPara="1" rIns="91425" wrap="square" tIns="91425">
+            <a:noAutofit/>
+          </a:bodyPr>
+          <a:lstStyle/>
+          <a:p>
+            <a:pPr indent="0" lvl="0" marL="0" rtl="0" algn="l">
+              <a:lnSpc>
+                <a:spcPct val="115000"/>
+              </a:lnSpc>
+              <a:spcBef>
+                <a:spcPts val="0"/>
+              </a:spcBef>
+              <a:spcAft>
+                <a:spcPts val="1600"/>
+              </a:spcAft>
+              <a:buNone/>
+            </a:pPr>
+            <a:r>
+              <a:rPr lang="en-GB"/>
+              <a:t>How do we estimate the probability?</a:t>
+            </a:r>
+            <a:endParaRPr/>
+          </a:p>
+        </p:txBody>
+      </p:sp>
+      <p:sp>
+        <p:nvSpPr>
+          <p:cNvPr id="100" name="Google Shape;100;p19"/>
+          <p:cNvSpPr txBox="1"/>
+          <p:nvPr>
+            <p:ph idx="1" type="body"/>
+          </p:nvPr>
+        </p:nvSpPr>
+        <p:spPr>
+          <a:xfrm>
+            <a:off x="311700" y="1178275"/>
+            <a:ext cx="8520600" cy="572700"/>
+          </a:xfrm>
+          <a:prstGeom prst="rect">
+            <a:avLst/>
+          </a:prstGeom>
+        </p:spPr>
+        <p:txBody>
+          <a:bodyPr anchorCtr="0" anchor="t" bIns="91425" lIns="91425" spcFirstLastPara="1" rIns="91425" wrap="square" tIns="91425">
+            <a:noAutofit/>
+          </a:bodyPr>
+          <a:lstStyle/>
+          <a:p>
+            <a:pPr indent="-419100" lvl="0" marL="914400" rtl="0" algn="l">
+              <a:spcBef>
+                <a:spcPts val="0"/>
+              </a:spcBef>
+              <a:spcAft>
+                <a:spcPts val="0"/>
+              </a:spcAft>
+              <a:buClr>
+                <a:schemeClr val="dk1"/>
+              </a:buClr>
+              <a:buSzPts val="3000"/>
+              <a:buFont typeface="Oswald"/>
+              <a:buChar char="●"/>
+            </a:pPr>
+            <a:r>
+              <a:rPr lang="en-GB" sz="3000" strike="sngStrike">
+                <a:solidFill>
+                  <a:schemeClr val="dk1"/>
+                </a:solidFill>
+                <a:latin typeface="Oswald"/>
+                <a:ea typeface="Oswald"/>
+                <a:cs typeface="Oswald"/>
+                <a:sym typeface="Oswald"/>
+              </a:rPr>
+              <a:t>Classical</a:t>
+            </a:r>
+            <a:endParaRPr sz="3000" strike="sngStrike">
+              <a:solidFill>
+                <a:schemeClr val="dk1"/>
+              </a:solidFill>
+              <a:latin typeface="Oswald"/>
+              <a:ea typeface="Oswald"/>
+              <a:cs typeface="Oswald"/>
+              <a:sym typeface="Oswald"/>
+            </a:endParaRPr>
+          </a:p>
+        </p:txBody>
+      </p:sp>
+      <p:sp>
+        <p:nvSpPr>
+          <p:cNvPr id="101" name="Google Shape;101;p19"/>
+          <p:cNvSpPr txBox="1"/>
+          <p:nvPr>
+            <p:ph idx="1" type="body"/>
+          </p:nvPr>
+        </p:nvSpPr>
+        <p:spPr>
+          <a:xfrm>
+            <a:off x="311700" y="1750975"/>
+            <a:ext cx="8520600" cy="572700"/>
+          </a:xfrm>
+          <a:prstGeom prst="rect">
+            <a:avLst/>
+          </a:prstGeom>
+        </p:spPr>
+        <p:txBody>
+          <a:bodyPr anchorCtr="0" anchor="t" bIns="91425" lIns="91425" spcFirstLastPara="1" rIns="91425" wrap="square" tIns="91425">
+            <a:noAutofit/>
+          </a:bodyPr>
+          <a:lstStyle/>
+          <a:p>
+            <a:pPr indent="-419100" lvl="0" marL="914400" rtl="0" algn="l">
+              <a:spcBef>
+                <a:spcPts val="0"/>
+              </a:spcBef>
+              <a:spcAft>
+                <a:spcPts val="0"/>
+              </a:spcAft>
+              <a:buClr>
+                <a:schemeClr val="lt1"/>
+              </a:buClr>
+              <a:buSzPts val="3000"/>
+              <a:buFont typeface="Oswald"/>
+              <a:buChar char="●"/>
+            </a:pPr>
+            <a:r>
+              <a:rPr lang="en-GB" sz="3000">
+                <a:solidFill>
+                  <a:schemeClr val="lt1"/>
+                </a:solidFill>
+                <a:highlight>
+                  <a:schemeClr val="dk1"/>
+                </a:highlight>
+                <a:latin typeface="Oswald"/>
+                <a:ea typeface="Oswald"/>
+                <a:cs typeface="Oswald"/>
+                <a:sym typeface="Oswald"/>
+              </a:rPr>
+              <a:t>Frequentist</a:t>
+            </a:r>
+            <a:endParaRPr sz="3000">
+              <a:solidFill>
+                <a:schemeClr val="lt1"/>
+              </a:solidFill>
+              <a:highlight>
+                <a:schemeClr val="dk1"/>
+              </a:highlight>
+              <a:latin typeface="Oswald"/>
+              <a:ea typeface="Oswald"/>
+              <a:cs typeface="Oswald"/>
+              <a:sym typeface="Oswald"/>
+            </a:endParaRPr>
+          </a:p>
+        </p:txBody>
+      </p:sp>
+      <p:sp>
+        <p:nvSpPr>
+          <p:cNvPr id="102" name="Google Shape;102;p19"/>
+          <p:cNvSpPr txBox="1"/>
+          <p:nvPr>
+            <p:ph idx="1" type="body"/>
+          </p:nvPr>
+        </p:nvSpPr>
+        <p:spPr>
+          <a:xfrm>
+            <a:off x="311700" y="2323675"/>
+            <a:ext cx="8520600" cy="572700"/>
+          </a:xfrm>
+          <a:prstGeom prst="rect">
+            <a:avLst/>
+          </a:prstGeom>
+        </p:spPr>
+        <p:txBody>
+          <a:bodyPr anchorCtr="0" anchor="t" bIns="91425" lIns="91425" spcFirstLastPara="1" rIns="91425" wrap="square" tIns="91425">
+            <a:noAutofit/>
+          </a:bodyPr>
+          <a:lstStyle/>
+          <a:p>
+            <a:pPr indent="-419100" lvl="0" marL="914400" rtl="0" algn="l">
+              <a:spcBef>
+                <a:spcPts val="0"/>
+              </a:spcBef>
+              <a:spcAft>
+                <a:spcPts val="0"/>
+              </a:spcAft>
+              <a:buClr>
+                <a:schemeClr val="dk1"/>
+              </a:buClr>
+              <a:buSzPts val="3000"/>
+              <a:buFont typeface="Oswald"/>
+              <a:buChar char="●"/>
+            </a:pPr>
+            <a:r>
+              <a:rPr lang="en-GB" sz="3000">
+                <a:solidFill>
+                  <a:schemeClr val="dk1"/>
+                </a:solidFill>
+                <a:latin typeface="Oswald"/>
+                <a:ea typeface="Oswald"/>
+                <a:cs typeface="Oswald"/>
+                <a:sym typeface="Oswald"/>
+              </a:rPr>
+              <a:t>Bayesian</a:t>
+            </a:r>
+            <a:endParaRPr sz="3000">
+              <a:solidFill>
+                <a:schemeClr val="dk1"/>
+              </a:solidFill>
+              <a:latin typeface="Oswald"/>
+              <a:ea typeface="Oswald"/>
+              <a:cs typeface="Oswald"/>
+              <a:sym typeface="Oswald"/>
+            </a:endParaRPr>
+          </a:p>
+        </p:txBody>
+      </p:sp>
+    </p:spTree>
+  </p:cSld>
+  <p:clrMapOvr>
+    <a:masterClrMapping/>
+  </p:clrMapOvr>
+  <p:timing>
+    <p:tnLst>
+      <p:par>
+        <p:cTn dur="indefinite" nodeType="tmRoot" restart="never">
+          <p:childTnLst>
+            <p:seq concurrent="1" nextAc="seek">
+              <p:cTn dur="indefinite" id="2" nodeType="mainSeq">
+                <p:childTnLst>
+                  <p:par>
+                    <p:cTn fill="hold">
+                      <p:stCondLst>
+                        <p:cond delay="indefinite"/>
+                      </p:stCondLst>
+                      <p:childTnLst>
+                        <p:par>
+                          <p:cTn fill="hold">
+                            <p:stCondLst>
+                              <p:cond delay="0"/>
+                            </p:stCondLst>
+                            <p:childTnLst>
+                              <p:par>
+                                <p:cTn fill="hold" nodeType="clickEffect" presetClass="entr" presetID="10" presetSubtype="0">
+                                  <p:stCondLst>
+                                    <p:cond delay="0"/>
+                                  </p:stCondLst>
+                                  <p:childTnLst>
+                                    <p:set>
+                                      <p:cBhvr>
+                                        <p:cTn dur="1" fill="hold">
+                                          <p:stCondLst>
+                                            <p:cond delay="0"/>
+                                          </p:stCondLst>
+                                        </p:cTn>
+                                        <p:tgtEl>
+                                          <p:spTgt spid="100"/>
+                                        </p:tgtEl>
+                                        <p:attrNameLst>
+                                          <p:attrName>style.visibility</p:attrName>
+                                        </p:attrNameLst>
+                                      </p:cBhvr>
+                                      <p:to>
+                                        <p:strVal val="visible"/>
+                                      </p:to>
+                                    </p:set>
+                                    <p:animEffect filter="fade" transition="in">
+                                      <p:cBhvr>
+                                        <p:cTn dur="1000"/>
+                                        <p:tgtEl>
+                                          <p:spTgt spid="100"/>
+                                        </p:tgtEl>
+                                      </p:cBhvr>
+                                    </p:animEffect>
+                                  </p:childTnLst>
+                                </p:cTn>
+                              </p:par>
+                            </p:childTnLst>
+                          </p:cTn>
+                        </p:par>
+                      </p:childTnLst>
+                    </p:cTn>
+                  </p:par>
+                  <p:par>
+                    <p:cTn fill="hold">
+                      <p:stCondLst>
+                        <p:cond delay="indefinite"/>
+                      </p:stCondLst>
+                      <p:childTnLst>
+                        <p:par>
+                          <p:cTn fill="hold">
+                            <p:stCondLst>
+                              <p:cond delay="0"/>
+                            </p:stCondLst>
+                            <p:childTnLst>
+                              <p:par>
+                                <p:cTn fill="hold" nodeType="clickEffect" presetClass="entr" presetID="10" presetSubtype="0">
+                                  <p:stCondLst>
+                                    <p:cond delay="0"/>
+                                  </p:stCondLst>
+                                  <p:childTnLst>
+                                    <p:set>
+                                      <p:cBhvr>
+                                        <p:cTn dur="1" fill="hold">
+                                          <p:stCondLst>
+                                            <p:cond delay="0"/>
+                                          </p:stCondLst>
+                                        </p:cTn>
+                                        <p:tgtEl>
+                                          <p:spTgt spid="101"/>
+                                        </p:tgtEl>
+                                        <p:attrNameLst>
+                                          <p:attrName>style.visibility</p:attrName>
+                                        </p:attrNameLst>
+                                      </p:cBhvr>
+                                      <p:to>
+                                        <p:strVal val="visible"/>
+                                      </p:to>
+                                    </p:set>
+                                    <p:animEffect filter="fade" transition="in">
+                                      <p:cBhvr>
+                                        <p:cTn dur="1000"/>
+                                        <p:tgtEl>
+                                          <p:spTgt spid="101"/>
+                                        </p:tgtEl>
+                                      </p:cBhvr>
+                                    </p:animEffect>
+                                  </p:childTnLst>
+                                </p:cTn>
+                              </p:par>
+                            </p:childTnLst>
+                          </p:cTn>
+                        </p:par>
+                      </p:childTnLst>
+                    </p:cTn>
+                  </p:par>
+                  <p:par>
+                    <p:cTn fill="hold">
+                      <p:stCondLst>
+                        <p:cond delay="indefinite"/>
+                      </p:stCondLst>
+                      <p:childTnLst>
+                        <p:par>
+                          <p:cTn fill="hold">
+                            <p:stCondLst>
+                              <p:cond delay="0"/>
+                            </p:stCondLst>
+                            <p:childTnLst>
+                              <p:par>
+                                <p:cTn fill="hold" nodeType="clickEffect" presetClass="entr" presetID="10" presetSubtype="0">
+                                  <p:stCondLst>
+                                    <p:cond delay="0"/>
+                                  </p:stCondLst>
+                                  <p:childTnLst>
+                                    <p:set>
+                                      <p:cBhvr>
+                                        <p:cTn dur="1" fill="hold">
+                                          <p:stCondLst>
+                                            <p:cond delay="0"/>
+                                          </p:stCondLst>
+                                        </p:cTn>
+                                        <p:tgtEl>
+                                          <p:spTgt spid="102"/>
+                                        </p:tgtEl>
+                                        <p:attrNameLst>
+                                          <p:attrName>style.visibility</p:attrName>
+                                        </p:attrNameLst>
+                                      </p:cBhvr>
+                                      <p:to>
+                                        <p:strVal val="visible"/>
+                                      </p:to>
+                                    </p:set>
+                                    <p:animEffect filter="fade" transition="in">
+                                      <p:cBhvr>
+                                        <p:cTn dur="1000"/>
+                                        <p:tgtEl>
+                                          <p:spTgt spid="102"/>
+                                        </p:tgtEl>
+                                      </p:cBhvr>
+                                    </p:animEffect>
+                                  </p:childTnLst>
+                                </p:cTn>
+                              </p:par>
+                            </p:childTnLst>
+                          </p:cTn>
+                        </p:par>
+                      </p:childTnLst>
+                    </p:cTn>
+                  </p:par>
+                </p:childTnLst>
+              </p:cTn>
+              <p:prevCondLst>
+                <p:cond evt="onPrev">
+                  <p:tgtEl>
+                    <p:sldTgt/>
+                  </p:tgtEl>
+                </p:cond>
+              </p:prevCondLst>
+              <p:nextCondLst>
+                <p:cond evt="onNext">
+                  <p:tgtEl>
+                    <p:sldTgt/>
+                  </p:tgtEl>
+                </p:cond>
+              </p:nextCondLst>
+            </p:seq>
+          </p:childTnLst>
+        </p:cTn>
+      </p:par>
+    </p:tnLst>
+  </p:timing>
+</p:sld>
+</file>
+
+<file path=ppt/slides/slide8.xml><?xml version="1.0" encoding="utf-8"?>
+<p:sld xmlns:a="http://schemas.openxmlformats.org/drawingml/2006/main" xmlns:r="http://schemas.openxmlformats.org/officeDocument/2006/relationships" xmlns:mc="http://schemas.openxmlformats.org/markup-compatibility/2006" xmlns:mv="urn:schemas-microsoft-com:mac:vml" xmlns:p="http://schemas.openxmlformats.org/presentationml/2006/main" xmlns:c="http://schemas.openxmlformats.org/drawingml/2006/chart" xmlns:dgm="http://schemas.openxmlformats.org/drawingml/2006/diagram" xmlns:o="urn:schemas-microsoft-com:office:office" xmlns:v="urn:schemas-microsoft-com:vml" xmlns:pvml="urn:schemas-microsoft-com:office:powerpoint" xmlns:com="http://schemas.openxmlformats.org/drawingml/2006/compatibility" xmlns:p14="http://schemas.microsoft.com/office/powerpoint/2010/main" xmlns:p15="http://schemas.microsoft.com/office/powerpoint/2012/main">
+  <p:cSld>
+    <p:spTree>
+      <p:nvGrpSpPr>
+        <p:cNvPr id="106" name="Shape 106"/>
+        <p:cNvGrpSpPr/>
+        <p:nvPr/>
+      </p:nvGrpSpPr>
+      <p:grpSpPr>
+        <a:xfrm>
+          <a:off x="0" y="0"/>
+          <a:ext cx="0" cy="0"/>
+          <a:chOff x="0" y="0"/>
+          <a:chExt cx="0" cy="0"/>
+        </a:xfrm>
+      </p:grpSpPr>
+      <p:sp>
+        <p:nvSpPr>
+          <p:cNvPr id="107" name="Google Shape;107;p20"/>
+          <p:cNvSpPr txBox="1"/>
+          <p:nvPr>
+            <p:ph type="title"/>
+          </p:nvPr>
+        </p:nvSpPr>
+        <p:spPr>
+          <a:xfrm>
+            <a:off x="311700" y="445025"/>
+            <a:ext cx="8520600" cy="572700"/>
+          </a:xfrm>
+          <a:prstGeom prst="rect">
+            <a:avLst/>
+          </a:prstGeom>
+        </p:spPr>
+        <p:txBody>
+          <a:bodyPr anchorCtr="0" anchor="t" bIns="91425" lIns="91425" spcFirstLastPara="1" rIns="91425" wrap="square" tIns="91425">
+            <a:noAutofit/>
+          </a:bodyPr>
+          <a:lstStyle/>
+          <a:p>
+            <a:pPr indent="0" lvl="0" marL="0" rtl="0" algn="l">
+              <a:spcBef>
+                <a:spcPts val="0"/>
+              </a:spcBef>
+              <a:spcAft>
+                <a:spcPts val="0"/>
+              </a:spcAft>
+              <a:buNone/>
+            </a:pPr>
+            <a:r>
+              <a:rPr lang="en-GB"/>
+              <a:t>Probability of Rain: Frequentist Est.</a:t>
+            </a:r>
+            <a:endParaRPr/>
+          </a:p>
+        </p:txBody>
+      </p:sp>
+      <p:pic>
+        <p:nvPicPr>
+          <p:cNvPr id="108" name="Google Shape;108;p20"/>
+          <p:cNvPicPr preferRelativeResize="0"/>
+          <p:nvPr/>
+        </p:nvPicPr>
+        <p:blipFill>
+          <a:blip r:embed="rId3">
+            <a:alphaModFix/>
+          </a:blip>
+          <a:stretch>
+            <a:fillRect/>
+          </a:stretch>
+        </p:blipFill>
+        <p:spPr>
+          <a:xfrm>
+            <a:off x="1387850" y="1017725"/>
+            <a:ext cx="6368292" cy="3820976"/>
+          </a:xfrm>
+          <a:prstGeom prst="rect">
+            <a:avLst/>
+          </a:prstGeom>
+          <a:noFill/>
+          <a:ln>
+            <a:noFill/>
+          </a:ln>
+        </p:spPr>
+      </p:pic>
+    </p:spTree>
+  </p:cSld>
+  <p:clrMapOvr>
+    <a:masterClrMapping/>
+  </p:clrMapOvr>
+</p:sld>
+</file>
+
+<file path=ppt/slides/slide9.xml><?xml version="1.0" encoding="utf-8"?>
+<p:sld xmlns:a="http://schemas.openxmlformats.org/drawingml/2006/main" xmlns:r="http://schemas.openxmlformats.org/officeDocument/2006/relationships" xmlns:mc="http://schemas.openxmlformats.org/markup-compatibility/2006" xmlns:mv="urn:schemas-microsoft-com:mac:vml" xmlns:p="http://schemas.openxmlformats.org/presentationml/2006/main" xmlns:c="http://schemas.openxmlformats.org/drawingml/2006/chart" xmlns:dgm="http://schemas.openxmlformats.org/drawingml/2006/diagram" xmlns:o="urn:schemas-microsoft-com:office:office" xmlns:v="urn:schemas-microsoft-com:vml" xmlns:pvml="urn:schemas-microsoft-com:office:powerpoint" xmlns:com="http://schemas.openxmlformats.org/drawingml/2006/compatibility" xmlns:p14="http://schemas.microsoft.com/office/powerpoint/2010/main" xmlns:p15="http://schemas.microsoft.com/office/powerpoint/2012/main">
+  <p:cSld>
+    <p:spTree>
+      <p:nvGrpSpPr>
+        <p:cNvPr id="112" name="Shape 112"/>
+        <p:cNvGrpSpPr/>
+        <p:nvPr/>
+      </p:nvGrpSpPr>
+      <p:grpSpPr>
+        <a:xfrm>
+          <a:off x="0" y="0"/>
+          <a:ext cx="0" cy="0"/>
+          <a:chOff x="0" y="0"/>
+          <a:chExt cx="0" cy="0"/>
+        </a:xfrm>
+      </p:grpSpPr>
+      <p:sp>
+        <p:nvSpPr>
+          <p:cNvPr id="113" name="Google Shape;113;p21"/>
+          <p:cNvSpPr txBox="1"/>
+          <p:nvPr>
+            <p:ph type="title"/>
+          </p:nvPr>
+        </p:nvSpPr>
+        <p:spPr>
+          <a:xfrm>
+            <a:off x="311700" y="445025"/>
+            <a:ext cx="8520600" cy="572700"/>
+          </a:xfrm>
+          <a:prstGeom prst="rect">
+            <a:avLst/>
+          </a:prstGeom>
+        </p:spPr>
+        <p:txBody>
+          <a:bodyPr anchorCtr="0" anchor="t" bIns="91425" lIns="91425" spcFirstLastPara="1" rIns="91425" wrap="square" tIns="91425">
+            <a:noAutofit/>
+          </a:bodyPr>
+          <a:lstStyle/>
+          <a:p>
+            <a:pPr indent="0" lvl="0" marL="0" rtl="0" algn="l">
+              <a:spcBef>
+                <a:spcPts val="0"/>
+              </a:spcBef>
+              <a:spcAft>
+                <a:spcPts val="0"/>
+              </a:spcAft>
+              <a:buNone/>
+            </a:pPr>
+            <a:r>
+              <a:rPr lang="en-GB"/>
+              <a:t>Probability of </a:t>
+            </a:r>
+            <a:r>
+              <a:rPr lang="en-GB"/>
+              <a:t>Rain</a:t>
+            </a:r>
+            <a:r>
+              <a:rPr lang="en-GB"/>
+              <a:t>: Frequentist Est.</a:t>
+            </a:r>
+            <a:endParaRPr/>
+          </a:p>
+        </p:txBody>
+      </p:sp>
+      <p:pic>
+        <p:nvPicPr>
+          <p:cNvPr id="114" name="Google Shape;114;p21"/>
+          <p:cNvPicPr preferRelativeResize="0"/>
+          <p:nvPr/>
+        </p:nvPicPr>
+        <p:blipFill>
+          <a:blip r:embed="rId3">
+            <a:alphaModFix/>
+          </a:blip>
+          <a:stretch>
+            <a:fillRect/>
+          </a:stretch>
+        </p:blipFill>
+        <p:spPr>
+          <a:xfrm>
+            <a:off x="1387850" y="1017725"/>
+            <a:ext cx="6368300" cy="3820980"/>
+          </a:xfrm>
+          <a:prstGeom prst="rect">
+            <a:avLst/>
+          </a:prstGeom>
+          <a:noFill/>
+          <a:ln>
+            <a:noFill/>
+          </a:ln>
+        </p:spPr>
+      </p:pic>
     </p:spTree>
   </p:cSld>
   <p:clrMapOvr>

</xml_diff>

<commit_message>
Fill in more skeleton slides
</commit_message>
<xml_diff>
--- a/slides/intro_to_bayes_slides.pptx
+++ b/slides/intro_to_bayes_slides.pptx
@@ -51,25 +51,30 @@
     <p:sldId id="296" r:id="rId47"/>
     <p:sldId id="297" r:id="rId48"/>
     <p:sldId id="298" r:id="rId49"/>
+    <p:sldId id="299" r:id="rId50"/>
+    <p:sldId id="300" r:id="rId51"/>
+    <p:sldId id="301" r:id="rId52"/>
+    <p:sldId id="302" r:id="rId53"/>
+    <p:sldId id="303" r:id="rId54"/>
   </p:sldIdLst>
   <p:sldSz cy="5143500" cx="9144000"/>
   <p:notesSz cx="6858000" cy="9144000"/>
   <p:embeddedFontLst>
     <p:embeddedFont>
       <p:font typeface="Average"/>
-      <p:regular r:id="rId50"/>
+      <p:regular r:id="rId55"/>
     </p:embeddedFont>
     <p:embeddedFont>
       <p:font typeface="Ubuntu Mono"/>
-      <p:regular r:id="rId51"/>
-      <p:bold r:id="rId52"/>
-      <p:italic r:id="rId53"/>
-      <p:boldItalic r:id="rId54"/>
+      <p:regular r:id="rId56"/>
+      <p:bold r:id="rId57"/>
+      <p:italic r:id="rId58"/>
+      <p:boldItalic r:id="rId59"/>
     </p:embeddedFont>
     <p:embeddedFont>
       <p:font typeface="Oswald"/>
-      <p:regular r:id="rId55"/>
-      <p:bold r:id="rId56"/>
+      <p:regular r:id="rId60"/>
+      <p:bold r:id="rId61"/>
     </p:embeddedFont>
   </p:embeddedFontLst>
   <p:defaultTextStyle>
@@ -2151,7 +2156,7 @@
       </p:grpSpPr>
       <p:sp>
         <p:nvSpPr>
-          <p:cNvPr id="240" name="Google Shape;240;g5ede5f6fca_0_5:notes"/>
+          <p:cNvPr id="240" name="Google Shape;240;g5da26a1b1c_0_157:notes"/>
           <p:cNvSpPr/>
           <p:nvPr>
             <p:ph idx="2" type="sldImg"/>
@@ -2186,7 +2191,7 @@
       </p:sp>
       <p:sp>
         <p:nvSpPr>
-          <p:cNvPr id="241" name="Google Shape;241;g5ede5f6fca_0_5:notes"/>
+          <p:cNvPr id="241" name="Google Shape;241;g5da26a1b1c_0_157:notes"/>
           <p:cNvSpPr txBox="1"/>
           <p:nvPr>
             <p:ph idx="1" type="body"/>
@@ -2217,7 +2222,39 @@
               <a:buNone/>
             </a:pPr>
             <a:r>
+              <a:rPr lang="en-GB"/>
+              <a:t>Making Biases explicit</a:t>
+            </a:r>
+            <a:endParaRPr/>
+          </a:p>
+          <a:p>
+            <a:pPr indent="0" lvl="0" marL="0" rtl="0" algn="l">
+              <a:spcBef>
+                <a:spcPts val="0"/>
+              </a:spcBef>
+              <a:spcAft>
+                <a:spcPts val="0"/>
+              </a:spcAft>
+              <a:buNone/>
+            </a:pPr>
+            <a:r>
               <a:t/>
+            </a:r>
+            <a:endParaRPr/>
+          </a:p>
+          <a:p>
+            <a:pPr indent="0" lvl="0" marL="0" rtl="0" algn="l">
+              <a:spcBef>
+                <a:spcPts val="0"/>
+              </a:spcBef>
+              <a:spcAft>
+                <a:spcPts val="0"/>
+              </a:spcAft>
+              <a:buNone/>
+            </a:pPr>
+            <a:r>
+              <a:rPr lang="en-GB"/>
+              <a:t>With enough data, bayesian and frequentist likelihoods are equivalent such that priors are “washed out”</a:t>
             </a:r>
             <a:endParaRPr/>
           </a:p>
@@ -2236,7 +2273,7 @@
   <p:cSld>
     <p:spTree>
       <p:nvGrpSpPr>
-        <p:cNvPr id="250" name="Shape 250"/>
+        <p:cNvPr id="245" name="Shape 245"/>
         <p:cNvGrpSpPr/>
         <p:nvPr/>
       </p:nvGrpSpPr>
@@ -2250,7 +2287,7 @@
       </p:grpSpPr>
       <p:sp>
         <p:nvSpPr>
-          <p:cNvPr id="251" name="Google Shape;251;g5d9aeaa2d6_0_74:notes"/>
+          <p:cNvPr id="246" name="Google Shape;246;g5ede5f6fca_0_5:notes"/>
           <p:cNvSpPr/>
           <p:nvPr>
             <p:ph idx="2" type="sldImg"/>
@@ -2285,7 +2322,7 @@
       </p:sp>
       <p:sp>
         <p:nvSpPr>
-          <p:cNvPr id="252" name="Google Shape;252;g5d9aeaa2d6_0_74:notes"/>
+          <p:cNvPr id="247" name="Google Shape;247;g5ede5f6fca_0_5:notes"/>
           <p:cNvSpPr txBox="1"/>
           <p:nvPr>
             <p:ph idx="1" type="body"/>
@@ -2349,7 +2386,7 @@
       </p:grpSpPr>
       <p:sp>
         <p:nvSpPr>
-          <p:cNvPr id="257" name="Google Shape;257;g5ede5f6fca_0_20:notes"/>
+          <p:cNvPr id="257" name="Google Shape;257;g5d9aeaa2d6_0_74:notes"/>
           <p:cNvSpPr/>
           <p:nvPr>
             <p:ph idx="2" type="sldImg"/>
@@ -2384,7 +2421,7 @@
       </p:sp>
       <p:sp>
         <p:nvSpPr>
-          <p:cNvPr id="258" name="Google Shape;258;g5ede5f6fca_0_20:notes"/>
+          <p:cNvPr id="258" name="Google Shape;258;g5d9aeaa2d6_0_74:notes"/>
           <p:cNvSpPr txBox="1"/>
           <p:nvPr>
             <p:ph idx="1" type="body"/>
@@ -2448,7 +2485,7 @@
       </p:grpSpPr>
       <p:sp>
         <p:nvSpPr>
-          <p:cNvPr id="263" name="Google Shape;263;g5ede5f6fca_0_26:notes"/>
+          <p:cNvPr id="263" name="Google Shape;263;g5ede5f6fca_0_20:notes"/>
           <p:cNvSpPr/>
           <p:nvPr>
             <p:ph idx="2" type="sldImg"/>
@@ -2483,7 +2520,7 @@
       </p:sp>
       <p:sp>
         <p:nvSpPr>
-          <p:cNvPr id="264" name="Google Shape;264;g5ede5f6fca_0_26:notes"/>
+          <p:cNvPr id="264" name="Google Shape;264;g5ede5f6fca_0_20:notes"/>
           <p:cNvSpPr txBox="1"/>
           <p:nvPr>
             <p:ph idx="1" type="body"/>
@@ -2533,7 +2570,7 @@
   <p:cSld>
     <p:spTree>
       <p:nvGrpSpPr>
-        <p:cNvPr id="271" name="Shape 271"/>
+        <p:cNvPr id="268" name="Shape 268"/>
         <p:cNvGrpSpPr/>
         <p:nvPr/>
       </p:nvGrpSpPr>
@@ -2547,7 +2584,7 @@
       </p:grpSpPr>
       <p:sp>
         <p:nvSpPr>
-          <p:cNvPr id="272" name="Google Shape;272;g5da26a1b1c_0_14:notes"/>
+          <p:cNvPr id="269" name="Google Shape;269;g5ede5f6fca_0_26:notes"/>
           <p:cNvSpPr/>
           <p:nvPr>
             <p:ph idx="2" type="sldImg"/>
@@ -2582,7 +2619,7 @@
       </p:sp>
       <p:sp>
         <p:nvSpPr>
-          <p:cNvPr id="273" name="Google Shape;273;g5da26a1b1c_0_14:notes"/>
+          <p:cNvPr id="270" name="Google Shape;270;g5ede5f6fca_0_26:notes"/>
           <p:cNvSpPr txBox="1"/>
           <p:nvPr>
             <p:ph idx="1" type="body"/>
@@ -2632,7 +2669,7 @@
   <p:cSld>
     <p:spTree>
       <p:nvGrpSpPr>
-        <p:cNvPr id="280" name="Shape 280"/>
+        <p:cNvPr id="277" name="Shape 277"/>
         <p:cNvGrpSpPr/>
         <p:nvPr/>
       </p:nvGrpSpPr>
@@ -2646,7 +2683,7 @@
       </p:grpSpPr>
       <p:sp>
         <p:nvSpPr>
-          <p:cNvPr id="281" name="Google Shape;281;g5da26a1b1c_0_24:notes"/>
+          <p:cNvPr id="278" name="Google Shape;278;g5da26a1b1c_0_14:notes"/>
           <p:cNvSpPr/>
           <p:nvPr>
             <p:ph idx="2" type="sldImg"/>
@@ -2681,7 +2718,7 @@
       </p:sp>
       <p:sp>
         <p:nvSpPr>
-          <p:cNvPr id="282" name="Google Shape;282;g5da26a1b1c_0_24:notes"/>
+          <p:cNvPr id="279" name="Google Shape;279;g5da26a1b1c_0_14:notes"/>
           <p:cNvSpPr txBox="1"/>
           <p:nvPr>
             <p:ph idx="1" type="body"/>
@@ -2731,7 +2768,7 @@
   <p:cSld>
     <p:spTree>
       <p:nvGrpSpPr>
-        <p:cNvPr id="287" name="Shape 287"/>
+        <p:cNvPr id="286" name="Shape 286"/>
         <p:cNvGrpSpPr/>
         <p:nvPr/>
       </p:nvGrpSpPr>
@@ -2745,7 +2782,7 @@
       </p:grpSpPr>
       <p:sp>
         <p:nvSpPr>
-          <p:cNvPr id="288" name="Google Shape;288;g5ede5f6fca_0_15:notes"/>
+          <p:cNvPr id="287" name="Google Shape;287;g5da26a1b1c_0_24:notes"/>
           <p:cNvSpPr/>
           <p:nvPr>
             <p:ph idx="2" type="sldImg"/>
@@ -2780,7 +2817,7 @@
       </p:sp>
       <p:sp>
         <p:nvSpPr>
-          <p:cNvPr id="289" name="Google Shape;289;g5ede5f6fca_0_15:notes"/>
+          <p:cNvPr id="288" name="Google Shape;288;g5da26a1b1c_0_24:notes"/>
           <p:cNvSpPr txBox="1"/>
           <p:nvPr>
             <p:ph idx="1" type="body"/>
@@ -2830,7 +2867,7 @@
   <p:cSld>
     <p:spTree>
       <p:nvGrpSpPr>
-        <p:cNvPr id="294" name="Shape 294"/>
+        <p:cNvPr id="293" name="Shape 293"/>
         <p:cNvGrpSpPr/>
         <p:nvPr/>
       </p:nvGrpSpPr>
@@ -2844,7 +2881,7 @@
       </p:grpSpPr>
       <p:sp>
         <p:nvSpPr>
-          <p:cNvPr id="295" name="Google Shape;295;g5da26a1b1c_0_41:notes"/>
+          <p:cNvPr id="294" name="Google Shape;294;g5ede5f6fca_0_15:notes"/>
           <p:cNvSpPr/>
           <p:nvPr>
             <p:ph idx="2" type="sldImg"/>
@@ -2879,7 +2916,7 @@
       </p:sp>
       <p:sp>
         <p:nvSpPr>
-          <p:cNvPr id="296" name="Google Shape;296;g5da26a1b1c_0_41:notes"/>
+          <p:cNvPr id="295" name="Google Shape;295;g5ede5f6fca_0_15:notes"/>
           <p:cNvSpPr txBox="1"/>
           <p:nvPr>
             <p:ph idx="1" type="body"/>
@@ -3028,7 +3065,7 @@
   <p:cSld>
     <p:spTree>
       <p:nvGrpSpPr>
-        <p:cNvPr id="301" name="Shape 301"/>
+        <p:cNvPr id="300" name="Shape 300"/>
         <p:cNvGrpSpPr/>
         <p:nvPr/>
       </p:nvGrpSpPr>
@@ -3042,7 +3079,7 @@
       </p:grpSpPr>
       <p:sp>
         <p:nvSpPr>
-          <p:cNvPr id="302" name="Google Shape;302;g5da26a1b1c_0_50:notes"/>
+          <p:cNvPr id="301" name="Google Shape;301;g5da26a1b1c_0_41:notes"/>
           <p:cNvSpPr/>
           <p:nvPr>
             <p:ph idx="2" type="sldImg"/>
@@ -3077,7 +3114,7 @@
       </p:sp>
       <p:sp>
         <p:nvSpPr>
-          <p:cNvPr id="303" name="Google Shape;303;g5da26a1b1c_0_50:notes"/>
+          <p:cNvPr id="302" name="Google Shape;302;g5da26a1b1c_0_41:notes"/>
           <p:cNvSpPr txBox="1"/>
           <p:nvPr>
             <p:ph idx="1" type="body"/>
@@ -3127,7 +3164,7 @@
   <p:cSld>
     <p:spTree>
       <p:nvGrpSpPr>
-        <p:cNvPr id="308" name="Shape 308"/>
+        <p:cNvPr id="307" name="Shape 307"/>
         <p:cNvGrpSpPr/>
         <p:nvPr/>
       </p:nvGrpSpPr>
@@ -3141,7 +3178,7 @@
       </p:grpSpPr>
       <p:sp>
         <p:nvSpPr>
-          <p:cNvPr id="309" name="Google Shape;309;g5da26a1b1c_0_59:notes"/>
+          <p:cNvPr id="308" name="Google Shape;308;g5da26a1b1c_0_50:notes"/>
           <p:cNvSpPr/>
           <p:nvPr>
             <p:ph idx="2" type="sldImg"/>
@@ -3176,7 +3213,7 @@
       </p:sp>
       <p:sp>
         <p:nvSpPr>
-          <p:cNvPr id="310" name="Google Shape;310;g5da26a1b1c_0_59:notes"/>
+          <p:cNvPr id="309" name="Google Shape;309;g5da26a1b1c_0_50:notes"/>
           <p:cNvSpPr txBox="1"/>
           <p:nvPr>
             <p:ph idx="1" type="body"/>
@@ -3207,8 +3244,7 @@
               <a:buNone/>
             </a:pPr>
             <a:r>
-              <a:rPr lang="en-GB"/>
-              <a:t>Quick and Dirty: Multiply Prior by Likelihood</a:t>
+              <a:t/>
             </a:r>
             <a:endParaRPr/>
           </a:p>
@@ -3227,7 +3263,7 @@
   <p:cSld>
     <p:spTree>
       <p:nvGrpSpPr>
-        <p:cNvPr id="314" name="Shape 314"/>
+        <p:cNvPr id="315" name="Shape 315"/>
         <p:cNvGrpSpPr/>
         <p:nvPr/>
       </p:nvGrpSpPr>
@@ -3241,7 +3277,7 @@
       </p:grpSpPr>
       <p:sp>
         <p:nvSpPr>
-          <p:cNvPr id="315" name="Google Shape;315;g5da26a1b1c_0_66:notes"/>
+          <p:cNvPr id="316" name="Google Shape;316;g5da26a1b1c_0_59:notes"/>
           <p:cNvSpPr/>
           <p:nvPr>
             <p:ph idx="2" type="sldImg"/>
@@ -3276,7 +3312,7 @@
       </p:sp>
       <p:sp>
         <p:nvSpPr>
-          <p:cNvPr id="316" name="Google Shape;316;g5da26a1b1c_0_66:notes"/>
+          <p:cNvPr id="317" name="Google Shape;317;g5da26a1b1c_0_59:notes"/>
           <p:cNvSpPr txBox="1"/>
           <p:nvPr>
             <p:ph idx="1" type="body"/>
@@ -3308,38 +3344,7 @@
             </a:pPr>
             <a:r>
               <a:rPr lang="en-GB"/>
-              <a:t>For accurate, divide by the likelihood of the data at each point</a:t>
-            </a:r>
-            <a:endParaRPr/>
-          </a:p>
-          <a:p>
-            <a:pPr indent="0" lvl="0" marL="0" rtl="0" algn="l">
-              <a:spcBef>
-                <a:spcPts val="0"/>
-              </a:spcBef>
-              <a:spcAft>
-                <a:spcPts val="0"/>
-              </a:spcAft>
-              <a:buNone/>
-            </a:pPr>
-            <a:r>
-              <a:t/>
-            </a:r>
-            <a:endParaRPr/>
-          </a:p>
-          <a:p>
-            <a:pPr indent="0" lvl="0" marL="0" rtl="0" algn="l">
-              <a:spcBef>
-                <a:spcPts val="0"/>
-              </a:spcBef>
-              <a:spcAft>
-                <a:spcPts val="0"/>
-              </a:spcAft>
-              <a:buNone/>
-            </a:pPr>
-            <a:r>
-              <a:rPr lang="en-GB"/>
-              <a:t>Integral is gnarly, but we can make it equal to 1 to make it disappear</a:t>
+              <a:t>Quick and Dirty: Multiply Prior by Likelihood</a:t>
             </a:r>
             <a:endParaRPr/>
           </a:p>
@@ -3358,7 +3363,7 @@
   <p:cSld>
     <p:spTree>
       <p:nvGrpSpPr>
-        <p:cNvPr id="320" name="Shape 320"/>
+        <p:cNvPr id="321" name="Shape 321"/>
         <p:cNvGrpSpPr/>
         <p:nvPr/>
       </p:nvGrpSpPr>
@@ -3372,7 +3377,7 @@
       </p:grpSpPr>
       <p:sp>
         <p:nvSpPr>
-          <p:cNvPr id="321" name="Google Shape;321;g5da26a1b1c_0_91:notes"/>
+          <p:cNvPr id="322" name="Google Shape;322;g5da26a1b1c_0_66:notes"/>
           <p:cNvSpPr/>
           <p:nvPr>
             <p:ph idx="2" type="sldImg"/>
@@ -3407,7 +3412,7 @@
       </p:sp>
       <p:sp>
         <p:nvSpPr>
-          <p:cNvPr id="322" name="Google Shape;322;g5da26a1b1c_0_91:notes"/>
+          <p:cNvPr id="323" name="Google Shape;323;g5da26a1b1c_0_66:notes"/>
           <p:cNvSpPr txBox="1"/>
           <p:nvPr>
             <p:ph idx="1" type="body"/>
@@ -3439,7 +3444,38 @@
             </a:pPr>
             <a:r>
               <a:rPr lang="en-GB"/>
-              <a:t>Make integral equal to one by adding A coefficient</a:t>
+              <a:t>For accurate, divide by the likelihood of the data at each point</a:t>
+            </a:r>
+            <a:endParaRPr/>
+          </a:p>
+          <a:p>
+            <a:pPr indent="0" lvl="0" marL="0" rtl="0" algn="l">
+              <a:spcBef>
+                <a:spcPts val="0"/>
+              </a:spcBef>
+              <a:spcAft>
+                <a:spcPts val="0"/>
+              </a:spcAft>
+              <a:buNone/>
+            </a:pPr>
+            <a:r>
+              <a:t/>
+            </a:r>
+            <a:endParaRPr/>
+          </a:p>
+          <a:p>
+            <a:pPr indent="0" lvl="0" marL="0" rtl="0" algn="l">
+              <a:spcBef>
+                <a:spcPts val="0"/>
+              </a:spcBef>
+              <a:spcAft>
+                <a:spcPts val="0"/>
+              </a:spcAft>
+              <a:buNone/>
+            </a:pPr>
+            <a:r>
+              <a:rPr lang="en-GB"/>
+              <a:t>Integral is gnarly, but we can make it equal to 1 to make it disappear</a:t>
             </a:r>
             <a:endParaRPr/>
           </a:p>
@@ -3458,7 +3494,7 @@
   <p:cSld>
     <p:spTree>
       <p:nvGrpSpPr>
-        <p:cNvPr id="329" name="Shape 329"/>
+        <p:cNvPr id="327" name="Shape 327"/>
         <p:cNvGrpSpPr/>
         <p:nvPr/>
       </p:nvGrpSpPr>
@@ -3472,7 +3508,7 @@
       </p:grpSpPr>
       <p:sp>
         <p:nvSpPr>
-          <p:cNvPr id="330" name="Google Shape;330;g5da26a1b1c_0_101:notes"/>
+          <p:cNvPr id="328" name="Google Shape;328;g5da26a1b1c_0_91:notes"/>
           <p:cNvSpPr/>
           <p:nvPr>
             <p:ph idx="2" type="sldImg"/>
@@ -3507,7 +3543,7 @@
       </p:sp>
       <p:sp>
         <p:nvSpPr>
-          <p:cNvPr id="331" name="Google Shape;331;g5da26a1b1c_0_101:notes"/>
+          <p:cNvPr id="329" name="Google Shape;329;g5da26a1b1c_0_91:notes"/>
           <p:cNvSpPr txBox="1"/>
           <p:nvPr>
             <p:ph idx="1" type="body"/>
@@ -3539,7 +3575,7 @@
             </a:pPr>
             <a:r>
               <a:rPr lang="en-GB"/>
-              <a:t>Equation simplifies massively</a:t>
+              <a:t>Make integral equal to one by adding A coefficient</a:t>
             </a:r>
             <a:endParaRPr/>
           </a:p>
@@ -3572,7 +3608,7 @@
       </p:grpSpPr>
       <p:sp>
         <p:nvSpPr>
-          <p:cNvPr id="337" name="Google Shape;337;g5da26a1b1c_0_114:notes"/>
+          <p:cNvPr id="337" name="Google Shape;337;g5da26a1b1c_0_101:notes"/>
           <p:cNvSpPr/>
           <p:nvPr>
             <p:ph idx="2" type="sldImg"/>
@@ -3607,7 +3643,7 @@
       </p:sp>
       <p:sp>
         <p:nvSpPr>
-          <p:cNvPr id="338" name="Google Shape;338;g5da26a1b1c_0_114:notes"/>
+          <p:cNvPr id="338" name="Google Shape;338;g5da26a1b1c_0_101:notes"/>
           <p:cNvSpPr txBox="1"/>
           <p:nvPr>
             <p:ph idx="1" type="body"/>
@@ -3639,7 +3675,7 @@
             </a:pPr>
             <a:r>
               <a:rPr lang="en-GB"/>
-              <a:t>Et Voila. A function that is easy to import from numpy</a:t>
+              <a:t>Equation simplifies massively</a:t>
             </a:r>
             <a:endParaRPr/>
           </a:p>
@@ -3658,7 +3694,7 @@
   <p:cSld>
     <p:spTree>
       <p:nvGrpSpPr>
-        <p:cNvPr id="344" name="Shape 344"/>
+        <p:cNvPr id="343" name="Shape 343"/>
         <p:cNvGrpSpPr/>
         <p:nvPr/>
       </p:nvGrpSpPr>
@@ -3672,7 +3708,7 @@
       </p:grpSpPr>
       <p:sp>
         <p:nvSpPr>
-          <p:cNvPr id="345" name="Google Shape;345;g5da26a1b1c_0_130:notes"/>
+          <p:cNvPr id="344" name="Google Shape;344;g5da26a1b1c_0_114:notes"/>
           <p:cNvSpPr/>
           <p:nvPr>
             <p:ph idx="2" type="sldImg"/>
@@ -3707,7 +3743,7 @@
       </p:sp>
       <p:sp>
         <p:nvSpPr>
-          <p:cNvPr id="346" name="Google Shape;346;g5da26a1b1c_0_130:notes"/>
+          <p:cNvPr id="345" name="Google Shape;345;g5da26a1b1c_0_114:notes"/>
           <p:cNvSpPr txBox="1"/>
           <p:nvPr>
             <p:ph idx="1" type="body"/>
@@ -3738,7 +3774,8 @@
               <a:buNone/>
             </a:pPr>
             <a:r>
-              <a:t/>
+              <a:rPr lang="en-GB"/>
+              <a:t>Et Voila. A function that is easy to import from numpy</a:t>
             </a:r>
             <a:endParaRPr/>
           </a:p>
@@ -3771,7 +3808,7 @@
       </p:grpSpPr>
       <p:sp>
         <p:nvSpPr>
-          <p:cNvPr id="352" name="Google Shape;352;g5da26a1b1c_0_137:notes"/>
+          <p:cNvPr id="352" name="Google Shape;352;g5da26a1b1c_0_130:notes"/>
           <p:cNvSpPr/>
           <p:nvPr>
             <p:ph idx="2" type="sldImg"/>
@@ -3806,7 +3843,7 @@
       </p:sp>
       <p:sp>
         <p:nvSpPr>
-          <p:cNvPr id="353" name="Google Shape;353;g5da26a1b1c_0_137:notes"/>
+          <p:cNvPr id="353" name="Google Shape;353;g5da26a1b1c_0_130:notes"/>
           <p:cNvSpPr txBox="1"/>
           <p:nvPr>
             <p:ph idx="1" type="body"/>
@@ -3870,7 +3907,7 @@
       </p:grpSpPr>
       <p:sp>
         <p:nvSpPr>
-          <p:cNvPr id="359" name="Google Shape;359;g5da26a1b1c_0_148:notes"/>
+          <p:cNvPr id="359" name="Google Shape;359;g5da26a1b1c_0_137:notes"/>
           <p:cNvSpPr/>
           <p:nvPr>
             <p:ph idx="2" type="sldImg"/>
@@ -3905,7 +3942,7 @@
       </p:sp>
       <p:sp>
         <p:nvSpPr>
-          <p:cNvPr id="360" name="Google Shape;360;g5da26a1b1c_0_148:notes"/>
+          <p:cNvPr id="360" name="Google Shape;360;g5da26a1b1c_0_137:notes"/>
           <p:cNvSpPr txBox="1"/>
           <p:nvPr>
             <p:ph idx="1" type="body"/>
@@ -3955,7 +3992,7 @@
   <p:cSld>
     <p:spTree>
       <p:nvGrpSpPr>
-        <p:cNvPr id="367" name="Shape 367"/>
+        <p:cNvPr id="365" name="Shape 365"/>
         <p:cNvGrpSpPr/>
         <p:nvPr/>
       </p:nvGrpSpPr>
@@ -3969,7 +4006,7 @@
       </p:grpSpPr>
       <p:sp>
         <p:nvSpPr>
-          <p:cNvPr id="368" name="Google Shape;368;g5d9aeaa2d6_0_84:notes"/>
+          <p:cNvPr id="366" name="Google Shape;366;g5da26a1b1c_0_148:notes"/>
           <p:cNvSpPr/>
           <p:nvPr>
             <p:ph idx="2" type="sldImg"/>
@@ -4004,7 +4041,7 @@
       </p:sp>
       <p:sp>
         <p:nvSpPr>
-          <p:cNvPr id="369" name="Google Shape;369;g5d9aeaa2d6_0_84:notes"/>
+          <p:cNvPr id="367" name="Google Shape;367;g5da26a1b1c_0_148:notes"/>
           <p:cNvSpPr txBox="1"/>
           <p:nvPr>
             <p:ph idx="1" type="body"/>
@@ -4153,7 +4190,7 @@
   <p:cSld>
     <p:spTree>
       <p:nvGrpSpPr>
-        <p:cNvPr id="372" name="Shape 372"/>
+        <p:cNvPr id="374" name="Shape 374"/>
         <p:cNvGrpSpPr/>
         <p:nvPr/>
       </p:nvGrpSpPr>
@@ -4167,7 +4204,7 @@
       </p:grpSpPr>
       <p:sp>
         <p:nvSpPr>
-          <p:cNvPr id="373" name="Google Shape;373;g5d9aeaa2d6_0_92:notes"/>
+          <p:cNvPr id="375" name="Google Shape;375;g5da9461da5_0_23:notes"/>
           <p:cNvSpPr/>
           <p:nvPr>
             <p:ph idx="2" type="sldImg"/>
@@ -4202,7 +4239,7 @@
       </p:sp>
       <p:sp>
         <p:nvSpPr>
-          <p:cNvPr id="374" name="Google Shape;374;g5d9aeaa2d6_0_92:notes"/>
+          <p:cNvPr id="376" name="Google Shape;376;g5da9461da5_0_23:notes"/>
           <p:cNvSpPr txBox="1"/>
           <p:nvPr>
             <p:ph idx="1" type="body"/>
@@ -4252,7 +4289,7 @@
   <p:cSld>
     <p:spTree>
       <p:nvGrpSpPr>
-        <p:cNvPr id="378" name="Shape 378"/>
+        <p:cNvPr id="381" name="Shape 381"/>
         <p:cNvGrpSpPr/>
         <p:nvPr/>
       </p:nvGrpSpPr>
@@ -4266,7 +4303,7 @@
       </p:grpSpPr>
       <p:sp>
         <p:nvSpPr>
-          <p:cNvPr id="379" name="Google Shape;379;g5d7ecab40a_0_101:notes"/>
+          <p:cNvPr id="382" name="Google Shape;382;g5d9aeaa2d6_0_84:notes"/>
           <p:cNvSpPr/>
           <p:nvPr>
             <p:ph idx="2" type="sldImg"/>
@@ -4301,7 +4338,7 @@
       </p:sp>
       <p:sp>
         <p:nvSpPr>
-          <p:cNvPr id="380" name="Google Shape;380;g5d7ecab40a_0_101:notes"/>
+          <p:cNvPr id="383" name="Google Shape;383;g5d9aeaa2d6_0_84:notes"/>
           <p:cNvSpPr txBox="1"/>
           <p:nvPr>
             <p:ph idx="1" type="body"/>
@@ -4351,7 +4388,7 @@
   <p:cSld>
     <p:spTree>
       <p:nvGrpSpPr>
-        <p:cNvPr id="384" name="Shape 384"/>
+        <p:cNvPr id="386" name="Shape 386"/>
         <p:cNvGrpSpPr/>
         <p:nvPr/>
       </p:nvGrpSpPr>
@@ -4365,7 +4402,7 @@
       </p:grpSpPr>
       <p:sp>
         <p:nvSpPr>
-          <p:cNvPr id="385" name="Google Shape;385;g5d7ecab40a_0_72:notes"/>
+          <p:cNvPr id="387" name="Google Shape;387;g5d9aeaa2d6_0_92:notes"/>
           <p:cNvSpPr/>
           <p:nvPr>
             <p:ph idx="2" type="sldImg"/>
@@ -4400,7 +4437,7 @@
       </p:sp>
       <p:sp>
         <p:nvSpPr>
-          <p:cNvPr id="386" name="Google Shape;386;g5d7ecab40a_0_72:notes"/>
+          <p:cNvPr id="388" name="Google Shape;388;g5d9aeaa2d6_0_92:notes"/>
           <p:cNvSpPr txBox="1"/>
           <p:nvPr>
             <p:ph idx="1" type="body"/>
@@ -4464,7 +4501,7 @@
       </p:grpSpPr>
       <p:sp>
         <p:nvSpPr>
-          <p:cNvPr id="393" name="Google Shape;393;g5d7ecab40a_0_57:notes"/>
+          <p:cNvPr id="393" name="Google Shape;393;g5da9461da5_0_0:notes"/>
           <p:cNvSpPr/>
           <p:nvPr>
             <p:ph idx="2" type="sldImg"/>
@@ -4499,7 +4536,502 @@
       </p:sp>
       <p:sp>
         <p:nvSpPr>
-          <p:cNvPr id="394" name="Google Shape;394;g5d7ecab40a_0_57:notes"/>
+          <p:cNvPr id="394" name="Google Shape;394;g5da9461da5_0_0:notes"/>
+          <p:cNvSpPr txBox="1"/>
+          <p:nvPr>
+            <p:ph idx="1" type="body"/>
+          </p:nvPr>
+        </p:nvSpPr>
+        <p:spPr>
+          <a:xfrm>
+            <a:off x="685800" y="4343400"/>
+            <a:ext cx="5486400" cy="4114800"/>
+          </a:xfrm>
+          <a:prstGeom prst="rect">
+            <a:avLst/>
+          </a:prstGeom>
+        </p:spPr>
+        <p:txBody>
+          <a:bodyPr anchorCtr="0" anchor="t" bIns="91425" lIns="91425" spcFirstLastPara="1" rIns="91425" wrap="square" tIns="91425">
+            <a:noAutofit/>
+          </a:bodyPr>
+          <a:lstStyle/>
+          <a:p>
+            <a:pPr indent="0" lvl="0" marL="0" rtl="0" algn="l">
+              <a:spcBef>
+                <a:spcPts val="0"/>
+              </a:spcBef>
+              <a:spcAft>
+                <a:spcPts val="0"/>
+              </a:spcAft>
+              <a:buNone/>
+            </a:pPr>
+            <a:r>
+              <a:t/>
+            </a:r>
+            <a:endParaRPr/>
+          </a:p>
+        </p:txBody>
+      </p:sp>
+    </p:spTree>
+  </p:cSld>
+  <p:clrMapOvr>
+    <a:masterClrMapping/>
+  </p:clrMapOvr>
+</p:notes>
+</file>
+
+<file path=ppt/notesSlides/notesSlide44.xml><?xml version="1.0" encoding="utf-8"?>
+<p:notes xmlns:a="http://schemas.openxmlformats.org/drawingml/2006/main" xmlns:r="http://schemas.openxmlformats.org/officeDocument/2006/relationships" xmlns:mc="http://schemas.openxmlformats.org/markup-compatibility/2006" xmlns:mv="urn:schemas-microsoft-com:mac:vml" xmlns:p="http://schemas.openxmlformats.org/presentationml/2006/main" xmlns:c="http://schemas.openxmlformats.org/drawingml/2006/chart" xmlns:dgm="http://schemas.openxmlformats.org/drawingml/2006/diagram" xmlns:o="urn:schemas-microsoft-com:office:office" xmlns:v="urn:schemas-microsoft-com:vml" xmlns:pvml="urn:schemas-microsoft-com:office:powerpoint" xmlns:com="http://schemas.openxmlformats.org/drawingml/2006/compatibility" xmlns:p14="http://schemas.microsoft.com/office/powerpoint/2010/main" xmlns:p15="http://schemas.microsoft.com/office/powerpoint/2012/main" showMasterPhAnim="0" showMasterSp="0">
+  <p:cSld>
+    <p:spTree>
+      <p:nvGrpSpPr>
+        <p:cNvPr id="399" name="Shape 399"/>
+        <p:cNvGrpSpPr/>
+        <p:nvPr/>
+      </p:nvGrpSpPr>
+      <p:grpSpPr>
+        <a:xfrm>
+          <a:off x="0" y="0"/>
+          <a:ext cx="0" cy="0"/>
+          <a:chOff x="0" y="0"/>
+          <a:chExt cx="0" cy="0"/>
+        </a:xfrm>
+      </p:grpSpPr>
+      <p:sp>
+        <p:nvSpPr>
+          <p:cNvPr id="400" name="Google Shape;400;g5d7ecab40a_0_101:notes"/>
+          <p:cNvSpPr/>
+          <p:nvPr>
+            <p:ph idx="2" type="sldImg"/>
+          </p:nvPr>
+        </p:nvSpPr>
+        <p:spPr>
+          <a:xfrm>
+            <a:off x="381300" y="685800"/>
+            <a:ext cx="6096000" cy="3429000"/>
+          </a:xfrm>
+          <a:custGeom>
+            <a:rect b="b" l="l" r="r" t="t"/>
+            <a:pathLst>
+              <a:path extrusionOk="0" h="120000" w="120000">
+                <a:moveTo>
+                  <a:pt x="0" y="0"/>
+                </a:moveTo>
+                <a:lnTo>
+                  <a:pt x="120000" y="0"/>
+                </a:lnTo>
+                <a:lnTo>
+                  <a:pt x="120000" y="120000"/>
+                </a:lnTo>
+                <a:lnTo>
+                  <a:pt x="0" y="120000"/>
+                </a:lnTo>
+                <a:close/>
+              </a:path>
+            </a:pathLst>
+          </a:custGeom>
+        </p:spPr>
+      </p:sp>
+      <p:sp>
+        <p:nvSpPr>
+          <p:cNvPr id="401" name="Google Shape;401;g5d7ecab40a_0_101:notes"/>
+          <p:cNvSpPr txBox="1"/>
+          <p:nvPr>
+            <p:ph idx="1" type="body"/>
+          </p:nvPr>
+        </p:nvSpPr>
+        <p:spPr>
+          <a:xfrm>
+            <a:off x="685800" y="4343400"/>
+            <a:ext cx="5486400" cy="4114800"/>
+          </a:xfrm>
+          <a:prstGeom prst="rect">
+            <a:avLst/>
+          </a:prstGeom>
+        </p:spPr>
+        <p:txBody>
+          <a:bodyPr anchorCtr="0" anchor="t" bIns="91425" lIns="91425" spcFirstLastPara="1" rIns="91425" wrap="square" tIns="91425">
+            <a:noAutofit/>
+          </a:bodyPr>
+          <a:lstStyle/>
+          <a:p>
+            <a:pPr indent="0" lvl="0" marL="0" rtl="0" algn="l">
+              <a:spcBef>
+                <a:spcPts val="0"/>
+              </a:spcBef>
+              <a:spcAft>
+                <a:spcPts val="0"/>
+              </a:spcAft>
+              <a:buNone/>
+            </a:pPr>
+            <a:r>
+              <a:t/>
+            </a:r>
+            <a:endParaRPr/>
+          </a:p>
+        </p:txBody>
+      </p:sp>
+    </p:spTree>
+  </p:cSld>
+  <p:clrMapOvr>
+    <a:masterClrMapping/>
+  </p:clrMapOvr>
+</p:notes>
+</file>
+
+<file path=ppt/notesSlides/notesSlide45.xml><?xml version="1.0" encoding="utf-8"?>
+<p:notes xmlns:a="http://schemas.openxmlformats.org/drawingml/2006/main" xmlns:r="http://schemas.openxmlformats.org/officeDocument/2006/relationships" xmlns:mc="http://schemas.openxmlformats.org/markup-compatibility/2006" xmlns:mv="urn:schemas-microsoft-com:mac:vml" xmlns:p="http://schemas.openxmlformats.org/presentationml/2006/main" xmlns:c="http://schemas.openxmlformats.org/drawingml/2006/chart" xmlns:dgm="http://schemas.openxmlformats.org/drawingml/2006/diagram" xmlns:o="urn:schemas-microsoft-com:office:office" xmlns:v="urn:schemas-microsoft-com:vml" xmlns:pvml="urn:schemas-microsoft-com:office:powerpoint" xmlns:com="http://schemas.openxmlformats.org/drawingml/2006/compatibility" xmlns:p14="http://schemas.microsoft.com/office/powerpoint/2010/main" xmlns:p15="http://schemas.microsoft.com/office/powerpoint/2012/main" showMasterPhAnim="0" showMasterSp="0">
+  <p:cSld>
+    <p:spTree>
+      <p:nvGrpSpPr>
+        <p:cNvPr id="405" name="Shape 405"/>
+        <p:cNvGrpSpPr/>
+        <p:nvPr/>
+      </p:nvGrpSpPr>
+      <p:grpSpPr>
+        <a:xfrm>
+          <a:off x="0" y="0"/>
+          <a:ext cx="0" cy="0"/>
+          <a:chOff x="0" y="0"/>
+          <a:chExt cx="0" cy="0"/>
+        </a:xfrm>
+      </p:grpSpPr>
+      <p:sp>
+        <p:nvSpPr>
+          <p:cNvPr id="406" name="Google Shape;406;g5da9461da5_0_7:notes"/>
+          <p:cNvSpPr/>
+          <p:nvPr>
+            <p:ph idx="2" type="sldImg"/>
+          </p:nvPr>
+        </p:nvSpPr>
+        <p:spPr>
+          <a:xfrm>
+            <a:off x="381300" y="685800"/>
+            <a:ext cx="6096000" cy="3429000"/>
+          </a:xfrm>
+          <a:custGeom>
+            <a:rect b="b" l="l" r="r" t="t"/>
+            <a:pathLst>
+              <a:path extrusionOk="0" h="120000" w="120000">
+                <a:moveTo>
+                  <a:pt x="0" y="0"/>
+                </a:moveTo>
+                <a:lnTo>
+                  <a:pt x="120000" y="0"/>
+                </a:lnTo>
+                <a:lnTo>
+                  <a:pt x="120000" y="120000"/>
+                </a:lnTo>
+                <a:lnTo>
+                  <a:pt x="0" y="120000"/>
+                </a:lnTo>
+                <a:close/>
+              </a:path>
+            </a:pathLst>
+          </a:custGeom>
+        </p:spPr>
+      </p:sp>
+      <p:sp>
+        <p:nvSpPr>
+          <p:cNvPr id="407" name="Google Shape;407;g5da9461da5_0_7:notes"/>
+          <p:cNvSpPr txBox="1"/>
+          <p:nvPr>
+            <p:ph idx="1" type="body"/>
+          </p:nvPr>
+        </p:nvSpPr>
+        <p:spPr>
+          <a:xfrm>
+            <a:off x="685800" y="4343400"/>
+            <a:ext cx="5486400" cy="4114800"/>
+          </a:xfrm>
+          <a:prstGeom prst="rect">
+            <a:avLst/>
+          </a:prstGeom>
+        </p:spPr>
+        <p:txBody>
+          <a:bodyPr anchorCtr="0" anchor="t" bIns="91425" lIns="91425" spcFirstLastPara="1" rIns="91425" wrap="square" tIns="91425">
+            <a:noAutofit/>
+          </a:bodyPr>
+          <a:lstStyle/>
+          <a:p>
+            <a:pPr indent="0" lvl="0" marL="0" rtl="0" algn="l">
+              <a:spcBef>
+                <a:spcPts val="0"/>
+              </a:spcBef>
+              <a:spcAft>
+                <a:spcPts val="0"/>
+              </a:spcAft>
+              <a:buNone/>
+            </a:pPr>
+            <a:r>
+              <a:t/>
+            </a:r>
+            <a:endParaRPr/>
+          </a:p>
+        </p:txBody>
+      </p:sp>
+    </p:spTree>
+  </p:cSld>
+  <p:clrMapOvr>
+    <a:masterClrMapping/>
+  </p:clrMapOvr>
+</p:notes>
+</file>
+
+<file path=ppt/notesSlides/notesSlide46.xml><?xml version="1.0" encoding="utf-8"?>
+<p:notes xmlns:a="http://schemas.openxmlformats.org/drawingml/2006/main" xmlns:r="http://schemas.openxmlformats.org/officeDocument/2006/relationships" xmlns:mc="http://schemas.openxmlformats.org/markup-compatibility/2006" xmlns:mv="urn:schemas-microsoft-com:mac:vml" xmlns:p="http://schemas.openxmlformats.org/presentationml/2006/main" xmlns:c="http://schemas.openxmlformats.org/drawingml/2006/chart" xmlns:dgm="http://schemas.openxmlformats.org/drawingml/2006/diagram" xmlns:o="urn:schemas-microsoft-com:office:office" xmlns:v="urn:schemas-microsoft-com:vml" xmlns:pvml="urn:schemas-microsoft-com:office:powerpoint" xmlns:com="http://schemas.openxmlformats.org/drawingml/2006/compatibility" xmlns:p14="http://schemas.microsoft.com/office/powerpoint/2010/main" xmlns:p15="http://schemas.microsoft.com/office/powerpoint/2012/main" showMasterPhAnim="0" showMasterSp="0">
+  <p:cSld>
+    <p:spTree>
+      <p:nvGrpSpPr>
+        <p:cNvPr id="411" name="Shape 411"/>
+        <p:cNvGrpSpPr/>
+        <p:nvPr/>
+      </p:nvGrpSpPr>
+      <p:grpSpPr>
+        <a:xfrm>
+          <a:off x="0" y="0"/>
+          <a:ext cx="0" cy="0"/>
+          <a:chOff x="0" y="0"/>
+          <a:chExt cx="0" cy="0"/>
+        </a:xfrm>
+      </p:grpSpPr>
+      <p:sp>
+        <p:nvSpPr>
+          <p:cNvPr id="412" name="Google Shape;412;g5da9461da5_0_18:notes"/>
+          <p:cNvSpPr/>
+          <p:nvPr>
+            <p:ph idx="2" type="sldImg"/>
+          </p:nvPr>
+        </p:nvSpPr>
+        <p:spPr>
+          <a:xfrm>
+            <a:off x="381300" y="685800"/>
+            <a:ext cx="6096000" cy="3429000"/>
+          </a:xfrm>
+          <a:custGeom>
+            <a:rect b="b" l="l" r="r" t="t"/>
+            <a:pathLst>
+              <a:path extrusionOk="0" h="120000" w="120000">
+                <a:moveTo>
+                  <a:pt x="0" y="0"/>
+                </a:moveTo>
+                <a:lnTo>
+                  <a:pt x="120000" y="0"/>
+                </a:lnTo>
+                <a:lnTo>
+                  <a:pt x="120000" y="120000"/>
+                </a:lnTo>
+                <a:lnTo>
+                  <a:pt x="0" y="120000"/>
+                </a:lnTo>
+                <a:close/>
+              </a:path>
+            </a:pathLst>
+          </a:custGeom>
+        </p:spPr>
+      </p:sp>
+      <p:sp>
+        <p:nvSpPr>
+          <p:cNvPr id="413" name="Google Shape;413;g5da9461da5_0_18:notes"/>
+          <p:cNvSpPr txBox="1"/>
+          <p:nvPr>
+            <p:ph idx="1" type="body"/>
+          </p:nvPr>
+        </p:nvSpPr>
+        <p:spPr>
+          <a:xfrm>
+            <a:off x="685800" y="4343400"/>
+            <a:ext cx="5486400" cy="4114800"/>
+          </a:xfrm>
+          <a:prstGeom prst="rect">
+            <a:avLst/>
+          </a:prstGeom>
+        </p:spPr>
+        <p:txBody>
+          <a:bodyPr anchorCtr="0" anchor="t" bIns="91425" lIns="91425" spcFirstLastPara="1" rIns="91425" wrap="square" tIns="91425">
+            <a:noAutofit/>
+          </a:bodyPr>
+          <a:lstStyle/>
+          <a:p>
+            <a:pPr indent="0" lvl="0" marL="0" rtl="0" algn="l">
+              <a:spcBef>
+                <a:spcPts val="0"/>
+              </a:spcBef>
+              <a:spcAft>
+                <a:spcPts val="0"/>
+              </a:spcAft>
+              <a:buNone/>
+            </a:pPr>
+            <a:r>
+              <a:t/>
+            </a:r>
+            <a:endParaRPr/>
+          </a:p>
+        </p:txBody>
+      </p:sp>
+    </p:spTree>
+  </p:cSld>
+  <p:clrMapOvr>
+    <a:masterClrMapping/>
+  </p:clrMapOvr>
+</p:notes>
+</file>
+
+<file path=ppt/notesSlides/notesSlide47.xml><?xml version="1.0" encoding="utf-8"?>
+<p:notes xmlns:a="http://schemas.openxmlformats.org/drawingml/2006/main" xmlns:r="http://schemas.openxmlformats.org/officeDocument/2006/relationships" xmlns:mc="http://schemas.openxmlformats.org/markup-compatibility/2006" xmlns:mv="urn:schemas-microsoft-com:mac:vml" xmlns:p="http://schemas.openxmlformats.org/presentationml/2006/main" xmlns:c="http://schemas.openxmlformats.org/drawingml/2006/chart" xmlns:dgm="http://schemas.openxmlformats.org/drawingml/2006/diagram" xmlns:o="urn:schemas-microsoft-com:office:office" xmlns:v="urn:schemas-microsoft-com:vml" xmlns:pvml="urn:schemas-microsoft-com:office:powerpoint" xmlns:com="http://schemas.openxmlformats.org/drawingml/2006/compatibility" xmlns:p14="http://schemas.microsoft.com/office/powerpoint/2010/main" xmlns:p15="http://schemas.microsoft.com/office/powerpoint/2012/main" showMasterPhAnim="0" showMasterSp="0">
+  <p:cSld>
+    <p:spTree>
+      <p:nvGrpSpPr>
+        <p:cNvPr id="417" name="Shape 417"/>
+        <p:cNvGrpSpPr/>
+        <p:nvPr/>
+      </p:nvGrpSpPr>
+      <p:grpSpPr>
+        <a:xfrm>
+          <a:off x="0" y="0"/>
+          <a:ext cx="0" cy="0"/>
+          <a:chOff x="0" y="0"/>
+          <a:chExt cx="0" cy="0"/>
+        </a:xfrm>
+      </p:grpSpPr>
+      <p:sp>
+        <p:nvSpPr>
+          <p:cNvPr id="418" name="Google Shape;418;g5d7ecab40a_0_72:notes"/>
+          <p:cNvSpPr/>
+          <p:nvPr>
+            <p:ph idx="2" type="sldImg"/>
+          </p:nvPr>
+        </p:nvSpPr>
+        <p:spPr>
+          <a:xfrm>
+            <a:off x="381300" y="685800"/>
+            <a:ext cx="6096000" cy="3429000"/>
+          </a:xfrm>
+          <a:custGeom>
+            <a:rect b="b" l="l" r="r" t="t"/>
+            <a:pathLst>
+              <a:path extrusionOk="0" h="120000" w="120000">
+                <a:moveTo>
+                  <a:pt x="0" y="0"/>
+                </a:moveTo>
+                <a:lnTo>
+                  <a:pt x="120000" y="0"/>
+                </a:lnTo>
+                <a:lnTo>
+                  <a:pt x="120000" y="120000"/>
+                </a:lnTo>
+                <a:lnTo>
+                  <a:pt x="0" y="120000"/>
+                </a:lnTo>
+                <a:close/>
+              </a:path>
+            </a:pathLst>
+          </a:custGeom>
+        </p:spPr>
+      </p:sp>
+      <p:sp>
+        <p:nvSpPr>
+          <p:cNvPr id="419" name="Google Shape;419;g5d7ecab40a_0_72:notes"/>
+          <p:cNvSpPr txBox="1"/>
+          <p:nvPr>
+            <p:ph idx="1" type="body"/>
+          </p:nvPr>
+        </p:nvSpPr>
+        <p:spPr>
+          <a:xfrm>
+            <a:off x="685800" y="4343400"/>
+            <a:ext cx="5486400" cy="4114800"/>
+          </a:xfrm>
+          <a:prstGeom prst="rect">
+            <a:avLst/>
+          </a:prstGeom>
+        </p:spPr>
+        <p:txBody>
+          <a:bodyPr anchorCtr="0" anchor="t" bIns="91425" lIns="91425" spcFirstLastPara="1" rIns="91425" wrap="square" tIns="91425">
+            <a:noAutofit/>
+          </a:bodyPr>
+          <a:lstStyle/>
+          <a:p>
+            <a:pPr indent="0" lvl="0" marL="0" rtl="0" algn="l">
+              <a:spcBef>
+                <a:spcPts val="0"/>
+              </a:spcBef>
+              <a:spcAft>
+                <a:spcPts val="0"/>
+              </a:spcAft>
+              <a:buNone/>
+            </a:pPr>
+            <a:r>
+              <a:t/>
+            </a:r>
+            <a:endParaRPr/>
+          </a:p>
+        </p:txBody>
+      </p:sp>
+    </p:spTree>
+  </p:cSld>
+  <p:clrMapOvr>
+    <a:masterClrMapping/>
+  </p:clrMapOvr>
+</p:notes>
+</file>
+
+<file path=ppt/notesSlides/notesSlide48.xml><?xml version="1.0" encoding="utf-8"?>
+<p:notes xmlns:a="http://schemas.openxmlformats.org/drawingml/2006/main" xmlns:r="http://schemas.openxmlformats.org/officeDocument/2006/relationships" xmlns:mc="http://schemas.openxmlformats.org/markup-compatibility/2006" xmlns:mv="urn:schemas-microsoft-com:mac:vml" xmlns:p="http://schemas.openxmlformats.org/presentationml/2006/main" xmlns:c="http://schemas.openxmlformats.org/drawingml/2006/chart" xmlns:dgm="http://schemas.openxmlformats.org/drawingml/2006/diagram" xmlns:o="urn:schemas-microsoft-com:office:office" xmlns:v="urn:schemas-microsoft-com:vml" xmlns:pvml="urn:schemas-microsoft-com:office:powerpoint" xmlns:com="http://schemas.openxmlformats.org/drawingml/2006/compatibility" xmlns:p14="http://schemas.microsoft.com/office/powerpoint/2010/main" xmlns:p15="http://schemas.microsoft.com/office/powerpoint/2012/main" showMasterPhAnim="0" showMasterSp="0">
+  <p:cSld>
+    <p:spTree>
+      <p:nvGrpSpPr>
+        <p:cNvPr id="425" name="Shape 425"/>
+        <p:cNvGrpSpPr/>
+        <p:nvPr/>
+      </p:nvGrpSpPr>
+      <p:grpSpPr>
+        <a:xfrm>
+          <a:off x="0" y="0"/>
+          <a:ext cx="0" cy="0"/>
+          <a:chOff x="0" y="0"/>
+          <a:chExt cx="0" cy="0"/>
+        </a:xfrm>
+      </p:grpSpPr>
+      <p:sp>
+        <p:nvSpPr>
+          <p:cNvPr id="426" name="Google Shape;426;g5d7ecab40a_0_57:notes"/>
+          <p:cNvSpPr/>
+          <p:nvPr>
+            <p:ph idx="2" type="sldImg"/>
+          </p:nvPr>
+        </p:nvSpPr>
+        <p:spPr>
+          <a:xfrm>
+            <a:off x="381300" y="685800"/>
+            <a:ext cx="6096000" cy="3429000"/>
+          </a:xfrm>
+          <a:custGeom>
+            <a:rect b="b" l="l" r="r" t="t"/>
+            <a:pathLst>
+              <a:path extrusionOk="0" h="120000" w="120000">
+                <a:moveTo>
+                  <a:pt x="0" y="0"/>
+                </a:moveTo>
+                <a:lnTo>
+                  <a:pt x="120000" y="0"/>
+                </a:lnTo>
+                <a:lnTo>
+                  <a:pt x="120000" y="120000"/>
+                </a:lnTo>
+                <a:lnTo>
+                  <a:pt x="0" y="120000"/>
+                </a:lnTo>
+                <a:close/>
+              </a:path>
+            </a:pathLst>
+          </a:custGeom>
+        </p:spPr>
+      </p:sp>
+      <p:sp>
+        <p:nvSpPr>
+          <p:cNvPr id="427" name="Google Shape;427;g5d7ecab40a_0_57:notes"/>
           <p:cNvSpPr txBox="1"/>
           <p:nvPr>
             <p:ph idx="1" type="body"/>
@@ -16847,7 +17379,7 @@
         </p:nvSpPr>
         <p:spPr>
           <a:xfrm>
-            <a:off x="311700" y="445025"/>
+            <a:off x="259900" y="437625"/>
             <a:ext cx="8520600" cy="572700"/>
           </a:xfrm>
           <a:prstGeom prst="rect">
@@ -16871,7 +17403,7 @@
             </a:pPr>
             <a:r>
               <a:rPr lang="en-GB"/>
-              <a:t>How!?: Part 1 - Discrete Case</a:t>
+              <a:t>Bayes Theorem: How to Calculate P(𝜃)?</a:t>
             </a:r>
             <a:endParaRPr/>
           </a:p>
@@ -16888,7 +17420,7 @@
         <p:spPr>
           <a:xfrm>
             <a:off x="311700" y="1152475"/>
-            <a:ext cx="3999900" cy="3416400"/>
+            <a:ext cx="8468700" cy="3416400"/>
           </a:xfrm>
           <a:prstGeom prst="rect">
             <a:avLst/>
@@ -16900,6 +17432,115 @@
           </a:bodyPr>
           <a:lstStyle/>
           <a:p>
+            <a:pPr indent="-381000" lvl="0" marL="457200" rtl="0" algn="ctr">
+              <a:lnSpc>
+                <a:spcPct val="200000"/>
+              </a:lnSpc>
+              <a:spcBef>
+                <a:spcPts val="0"/>
+              </a:spcBef>
+              <a:spcAft>
+                <a:spcPts val="0"/>
+              </a:spcAft>
+              <a:buSzPts val="2400"/>
+              <a:buAutoNum type="arabicPeriod"/>
+            </a:pPr>
+            <a:r>
+              <a:rPr lang="en-GB" sz="2400"/>
+              <a:t>Are you Baking your biases into your model?</a:t>
+            </a:r>
+            <a:endParaRPr sz="2400"/>
+          </a:p>
+        </p:txBody>
+      </p:sp>
+    </p:spTree>
+  </p:cSld>
+  <p:clrMapOvr>
+    <a:masterClrMapping/>
+  </p:clrMapOvr>
+</p:sld>
+</file>
+
+<file path=ppt/slides/slide23.xml><?xml version="1.0" encoding="utf-8"?>
+<p:sld xmlns:a="http://schemas.openxmlformats.org/drawingml/2006/main" xmlns:r="http://schemas.openxmlformats.org/officeDocument/2006/relationships" xmlns:mc="http://schemas.openxmlformats.org/markup-compatibility/2006" xmlns:mv="urn:schemas-microsoft-com:mac:vml" xmlns:p="http://schemas.openxmlformats.org/presentationml/2006/main" xmlns:c="http://schemas.openxmlformats.org/drawingml/2006/chart" xmlns:dgm="http://schemas.openxmlformats.org/drawingml/2006/diagram" xmlns:o="urn:schemas-microsoft-com:office:office" xmlns:v="urn:schemas-microsoft-com:vml" xmlns:pvml="urn:schemas-microsoft-com:office:powerpoint" xmlns:com="http://schemas.openxmlformats.org/drawingml/2006/compatibility" xmlns:p14="http://schemas.microsoft.com/office/powerpoint/2010/main" xmlns:p15="http://schemas.microsoft.com/office/powerpoint/2012/main">
+  <p:cSld>
+    <p:spTree>
+      <p:nvGrpSpPr>
+        <p:cNvPr id="248" name="Shape 248"/>
+        <p:cNvGrpSpPr/>
+        <p:nvPr/>
+      </p:nvGrpSpPr>
+      <p:grpSpPr>
+        <a:xfrm>
+          <a:off x="0" y="0"/>
+          <a:ext cx="0" cy="0"/>
+          <a:chOff x="0" y="0"/>
+          <a:chExt cx="0" cy="0"/>
+        </a:xfrm>
+      </p:grpSpPr>
+      <p:sp>
+        <p:nvSpPr>
+          <p:cNvPr id="249" name="Google Shape;249;p35"/>
+          <p:cNvSpPr txBox="1"/>
+          <p:nvPr>
+            <p:ph type="title"/>
+          </p:nvPr>
+        </p:nvSpPr>
+        <p:spPr>
+          <a:xfrm>
+            <a:off x="311700" y="445025"/>
+            <a:ext cx="8520600" cy="572700"/>
+          </a:xfrm>
+          <a:prstGeom prst="rect">
+            <a:avLst/>
+          </a:prstGeom>
+        </p:spPr>
+        <p:txBody>
+          <a:bodyPr anchorCtr="0" anchor="t" bIns="91425" lIns="91425" spcFirstLastPara="1" rIns="91425" wrap="square" tIns="91425">
+            <a:noAutofit/>
+          </a:bodyPr>
+          <a:lstStyle/>
+          <a:p>
+            <a:pPr indent="0" lvl="0" marL="0" rtl="0" algn="l">
+              <a:spcBef>
+                <a:spcPts val="0"/>
+              </a:spcBef>
+              <a:spcAft>
+                <a:spcPts val="0"/>
+              </a:spcAft>
+              <a:buNone/>
+            </a:pPr>
+            <a:r>
+              <a:rPr lang="en-GB"/>
+              <a:t>How!?: Part 1 - Discrete Case</a:t>
+            </a:r>
+            <a:endParaRPr/>
+          </a:p>
+        </p:txBody>
+      </p:sp>
+      <p:sp>
+        <p:nvSpPr>
+          <p:cNvPr id="250" name="Google Shape;250;p35"/>
+          <p:cNvSpPr txBox="1"/>
+          <p:nvPr>
+            <p:ph idx="1" type="body"/>
+          </p:nvPr>
+        </p:nvSpPr>
+        <p:spPr>
+          <a:xfrm>
+            <a:off x="311700" y="1152475"/>
+            <a:ext cx="3999900" cy="3416400"/>
+          </a:xfrm>
+          <a:prstGeom prst="rect">
+            <a:avLst/>
+          </a:prstGeom>
+        </p:spPr>
+        <p:txBody>
+          <a:bodyPr anchorCtr="0" anchor="ctr" bIns="91425" lIns="91425" spcFirstLastPara="1" rIns="91425" wrap="square" tIns="91425">
+            <a:noAutofit/>
+          </a:bodyPr>
+          <a:lstStyle/>
+          <a:p>
             <a:pPr indent="-342900" lvl="0" marL="457200" rtl="0" algn="l">
               <a:lnSpc>
                 <a:spcPct val="150000"/>
@@ -16991,7 +17632,7 @@
       </p:sp>
       <p:pic>
         <p:nvPicPr>
-          <p:cNvPr id="245" name="Google Shape;245;p34"/>
+          <p:cNvPr id="251" name="Google Shape;251;p35"/>
           <p:cNvPicPr preferRelativeResize="0"/>
           <p:nvPr/>
         </p:nvPicPr>
@@ -17018,7 +17659,7 @@
       </p:pic>
       <p:pic>
         <p:nvPicPr>
-          <p:cNvPr id="246" name="Google Shape;246;p34"/>
+          <p:cNvPr id="252" name="Google Shape;252;p35"/>
           <p:cNvPicPr preferRelativeResize="0"/>
           <p:nvPr/>
         </p:nvPicPr>
@@ -17045,7 +17686,7 @@
       </p:pic>
       <p:sp>
         <p:nvSpPr>
-          <p:cNvPr id="247" name="Google Shape;247;p34"/>
+          <p:cNvPr id="253" name="Google Shape;253;p35"/>
           <p:cNvSpPr/>
           <p:nvPr/>
         </p:nvSpPr>
@@ -17097,7 +17738,7 @@
       </p:sp>
       <p:sp>
         <p:nvSpPr>
-          <p:cNvPr id="248" name="Google Shape;248;p34"/>
+          <p:cNvPr id="254" name="Google Shape;254;p35"/>
           <p:cNvSpPr/>
           <p:nvPr/>
         </p:nvSpPr>
@@ -17140,7 +17781,7 @@
       </p:sp>
       <p:sp>
         <p:nvSpPr>
-          <p:cNvPr id="249" name="Google Shape;249;p34"/>
+          <p:cNvPr id="255" name="Google Shape;255;p35"/>
           <p:cNvSpPr/>
           <p:nvPr/>
         </p:nvSpPr>
@@ -17390,12 +18031,12 @@
 </p:sld>
 </file>
 
-<file path=ppt/slides/slide23.xml><?xml version="1.0" encoding="utf-8"?>
+<file path=ppt/slides/slide24.xml><?xml version="1.0" encoding="utf-8"?>
 <p:sld xmlns:a="http://schemas.openxmlformats.org/drawingml/2006/main" xmlns:r="http://schemas.openxmlformats.org/officeDocument/2006/relationships" xmlns:mc="http://schemas.openxmlformats.org/markup-compatibility/2006" xmlns:mv="urn:schemas-microsoft-com:mac:vml" xmlns:p="http://schemas.openxmlformats.org/presentationml/2006/main" xmlns:c="http://schemas.openxmlformats.org/drawingml/2006/chart" xmlns:dgm="http://schemas.openxmlformats.org/drawingml/2006/diagram" xmlns:o="urn:schemas-microsoft-com:office:office" xmlns:v="urn:schemas-microsoft-com:vml" xmlns:pvml="urn:schemas-microsoft-com:office:powerpoint" xmlns:com="http://schemas.openxmlformats.org/drawingml/2006/compatibility" xmlns:p14="http://schemas.microsoft.com/office/powerpoint/2010/main" xmlns:p15="http://schemas.microsoft.com/office/powerpoint/2012/main">
   <p:cSld>
     <p:spTree>
       <p:nvGrpSpPr>
-        <p:cNvPr id="253" name="Shape 253"/>
+        <p:cNvPr id="259" name="Shape 259"/>
         <p:cNvGrpSpPr/>
         <p:nvPr/>
       </p:nvGrpSpPr>
@@ -17409,7 +18050,7 @@
       </p:grpSpPr>
       <p:sp>
         <p:nvSpPr>
-          <p:cNvPr id="254" name="Google Shape;254;p35"/>
+          <p:cNvPr id="260" name="Google Shape;260;p36"/>
           <p:cNvSpPr txBox="1"/>
           <p:nvPr>
             <p:ph type="title"/>
@@ -17449,7 +18090,7 @@
       </p:sp>
       <p:graphicFrame>
         <p:nvGraphicFramePr>
-          <p:cNvPr id="255" name="Google Shape;255;p35"/>
+          <p:cNvPr id="261" name="Google Shape;261;p36"/>
           <p:cNvGraphicFramePr/>
           <p:nvPr/>
         </p:nvGraphicFramePr>
@@ -17462,7 +18103,7 @@
             <a:tbl>
               <a:tblPr>
                 <a:noFill/>
-                <a:tableStyleId>{BC5E74A6-B762-457D-B112-18F1546CEA8E}</a:tableStyleId>
+                <a:tableStyleId>{986F7BEE-4656-4680-8EFA-844DF24C8D60}</a:tableStyleId>
               </a:tblPr>
               <a:tblGrid>
                 <a:gridCol w="1447800"/>
@@ -17969,12 +18610,12 @@
 </p:sld>
 </file>
 
-<file path=ppt/slides/slide24.xml><?xml version="1.0" encoding="utf-8"?>
+<file path=ppt/slides/slide25.xml><?xml version="1.0" encoding="utf-8"?>
 <p:sld xmlns:a="http://schemas.openxmlformats.org/drawingml/2006/main" xmlns:r="http://schemas.openxmlformats.org/officeDocument/2006/relationships" xmlns:mc="http://schemas.openxmlformats.org/markup-compatibility/2006" xmlns:mv="urn:schemas-microsoft-com:mac:vml" xmlns:p="http://schemas.openxmlformats.org/presentationml/2006/main" xmlns:c="http://schemas.openxmlformats.org/drawingml/2006/chart" xmlns:dgm="http://schemas.openxmlformats.org/drawingml/2006/diagram" xmlns:o="urn:schemas-microsoft-com:office:office" xmlns:v="urn:schemas-microsoft-com:vml" xmlns:pvml="urn:schemas-microsoft-com:office:powerpoint" xmlns:com="http://schemas.openxmlformats.org/drawingml/2006/compatibility" xmlns:p14="http://schemas.microsoft.com/office/powerpoint/2010/main" xmlns:p15="http://schemas.microsoft.com/office/powerpoint/2012/main">
   <p:cSld>
     <p:spTree>
       <p:nvGrpSpPr>
-        <p:cNvPr id="259" name="Shape 259"/>
+        <p:cNvPr id="265" name="Shape 265"/>
         <p:cNvGrpSpPr/>
         <p:nvPr/>
       </p:nvGrpSpPr>
@@ -17988,7 +18629,7 @@
       </p:grpSpPr>
       <p:sp>
         <p:nvSpPr>
-          <p:cNvPr id="260" name="Google Shape;260;p36"/>
+          <p:cNvPr id="266" name="Google Shape;266;p37"/>
           <p:cNvSpPr txBox="1"/>
           <p:nvPr>
             <p:ph type="title"/>
@@ -18028,7 +18669,7 @@
       </p:sp>
       <p:graphicFrame>
         <p:nvGraphicFramePr>
-          <p:cNvPr id="261" name="Google Shape;261;p36"/>
+          <p:cNvPr id="267" name="Google Shape;267;p37"/>
           <p:cNvGraphicFramePr/>
           <p:nvPr/>
         </p:nvGraphicFramePr>
@@ -18041,7 +18682,7 @@
             <a:tbl>
               <a:tblPr>
                 <a:noFill/>
-                <a:tableStyleId>{BC5E74A6-B762-457D-B112-18F1546CEA8E}</a:tableStyleId>
+                <a:tableStyleId>{986F7BEE-4656-4680-8EFA-844DF24C8D60}</a:tableStyleId>
               </a:tblPr>
               <a:tblGrid>
                 <a:gridCol w="1447800"/>
@@ -18850,12 +19491,12 @@
 </p:sld>
 </file>
 
-<file path=ppt/slides/slide25.xml><?xml version="1.0" encoding="utf-8"?>
+<file path=ppt/slides/slide26.xml><?xml version="1.0" encoding="utf-8"?>
 <p:sld xmlns:a="http://schemas.openxmlformats.org/drawingml/2006/main" xmlns:r="http://schemas.openxmlformats.org/officeDocument/2006/relationships" xmlns:mc="http://schemas.openxmlformats.org/markup-compatibility/2006" xmlns:mv="urn:schemas-microsoft-com:mac:vml" xmlns:p="http://schemas.openxmlformats.org/presentationml/2006/main" xmlns:c="http://schemas.openxmlformats.org/drawingml/2006/chart" xmlns:dgm="http://schemas.openxmlformats.org/drawingml/2006/diagram" xmlns:o="urn:schemas-microsoft-com:office:office" xmlns:v="urn:schemas-microsoft-com:vml" xmlns:pvml="urn:schemas-microsoft-com:office:powerpoint" xmlns:com="http://schemas.openxmlformats.org/drawingml/2006/compatibility" xmlns:p14="http://schemas.microsoft.com/office/powerpoint/2010/main" xmlns:p15="http://schemas.microsoft.com/office/powerpoint/2012/main">
   <p:cSld>
     <p:spTree>
       <p:nvGrpSpPr>
-        <p:cNvPr id="265" name="Shape 265"/>
+        <p:cNvPr id="271" name="Shape 271"/>
         <p:cNvGrpSpPr/>
         <p:nvPr/>
       </p:nvGrpSpPr>
@@ -18869,7 +19510,7 @@
       </p:grpSpPr>
       <p:graphicFrame>
         <p:nvGraphicFramePr>
-          <p:cNvPr id="266" name="Google Shape;266;p37"/>
+          <p:cNvPr id="272" name="Google Shape;272;p38"/>
           <p:cNvGraphicFramePr/>
           <p:nvPr/>
         </p:nvGraphicFramePr>
@@ -18882,7 +19523,7 @@
             <a:tbl>
               <a:tblPr>
                 <a:noFill/>
-                <a:tableStyleId>{BC5E74A6-B762-457D-B112-18F1546CEA8E}</a:tableStyleId>
+                <a:tableStyleId>{986F7BEE-4656-4680-8EFA-844DF24C8D60}</a:tableStyleId>
               </a:tblPr>
               <a:tblGrid>
                 <a:gridCol w="1447800"/>
@@ -19963,7 +20604,7 @@
       </p:graphicFrame>
       <p:sp>
         <p:nvSpPr>
-          <p:cNvPr id="267" name="Google Shape;267;p37"/>
+          <p:cNvPr id="273" name="Google Shape;273;p38"/>
           <p:cNvSpPr txBox="1"/>
           <p:nvPr>
             <p:ph type="title"/>
@@ -20003,7 +20644,7 @@
       </p:sp>
       <p:sp>
         <p:nvSpPr>
-          <p:cNvPr id="268" name="Google Shape;268;p37"/>
+          <p:cNvPr id="274" name="Google Shape;274;p38"/>
           <p:cNvSpPr txBox="1"/>
           <p:nvPr/>
         </p:nvSpPr>
@@ -20115,7 +20756,7 @@
       </p:sp>
       <p:pic>
         <p:nvPicPr>
-          <p:cNvPr id="269" name="Google Shape;269;p37"/>
+          <p:cNvPr id="275" name="Google Shape;275;p38"/>
           <p:cNvPicPr preferRelativeResize="0"/>
           <p:nvPr/>
         </p:nvPicPr>
@@ -20143,7 +20784,7 @@
       </p:pic>
       <p:sp>
         <p:nvSpPr>
-          <p:cNvPr id="270" name="Google Shape;270;p37"/>
+          <p:cNvPr id="276" name="Google Shape;276;p38"/>
           <p:cNvSpPr txBox="1"/>
           <p:nvPr/>
         </p:nvSpPr>
@@ -20295,12 +20936,12 @@
 </p:sld>
 </file>
 
-<file path=ppt/slides/slide26.xml><?xml version="1.0" encoding="utf-8"?>
+<file path=ppt/slides/slide27.xml><?xml version="1.0" encoding="utf-8"?>
 <p:sld xmlns:a="http://schemas.openxmlformats.org/drawingml/2006/main" xmlns:r="http://schemas.openxmlformats.org/officeDocument/2006/relationships" xmlns:mc="http://schemas.openxmlformats.org/markup-compatibility/2006" xmlns:mv="urn:schemas-microsoft-com:mac:vml" xmlns:p="http://schemas.openxmlformats.org/presentationml/2006/main" xmlns:c="http://schemas.openxmlformats.org/drawingml/2006/chart" xmlns:dgm="http://schemas.openxmlformats.org/drawingml/2006/diagram" xmlns:o="urn:schemas-microsoft-com:office:office" xmlns:v="urn:schemas-microsoft-com:vml" xmlns:pvml="urn:schemas-microsoft-com:office:powerpoint" xmlns:com="http://schemas.openxmlformats.org/drawingml/2006/compatibility" xmlns:p14="http://schemas.microsoft.com/office/powerpoint/2010/main" xmlns:p15="http://schemas.microsoft.com/office/powerpoint/2012/main">
   <p:cSld>
     <p:spTree>
       <p:nvGrpSpPr>
-        <p:cNvPr id="274" name="Shape 274"/>
+        <p:cNvPr id="280" name="Shape 280"/>
         <p:cNvGrpSpPr/>
         <p:nvPr/>
       </p:nvGrpSpPr>
@@ -20314,7 +20955,7 @@
       </p:grpSpPr>
       <p:sp>
         <p:nvSpPr>
-          <p:cNvPr id="275" name="Google Shape;275;p38"/>
+          <p:cNvPr id="281" name="Google Shape;281;p39"/>
           <p:cNvSpPr txBox="1"/>
           <p:nvPr>
             <p:ph type="title"/>
@@ -20354,7 +20995,7 @@
       </p:sp>
       <p:sp>
         <p:nvSpPr>
-          <p:cNvPr id="276" name="Google Shape;276;p38"/>
+          <p:cNvPr id="282" name="Google Shape;282;p39"/>
           <p:cNvSpPr txBox="1"/>
           <p:nvPr/>
         </p:nvSpPr>
@@ -20476,7 +21117,7 @@
       </p:sp>
       <p:sp>
         <p:nvSpPr>
-          <p:cNvPr id="277" name="Google Shape;277;p38"/>
+          <p:cNvPr id="283" name="Google Shape;283;p39"/>
           <p:cNvSpPr txBox="1"/>
           <p:nvPr/>
         </p:nvSpPr>
@@ -20588,7 +21229,7 @@
       </p:sp>
       <p:pic>
         <p:nvPicPr>
-          <p:cNvPr id="278" name="Google Shape;278;p38"/>
+          <p:cNvPr id="284" name="Google Shape;284;p39"/>
           <p:cNvPicPr preferRelativeResize="0"/>
           <p:nvPr/>
         </p:nvPicPr>
@@ -20616,7 +21257,7 @@
       </p:pic>
       <p:graphicFrame>
         <p:nvGraphicFramePr>
-          <p:cNvPr id="279" name="Google Shape;279;p38"/>
+          <p:cNvPr id="285" name="Google Shape;285;p39"/>
           <p:cNvGraphicFramePr/>
           <p:nvPr/>
         </p:nvGraphicFramePr>
@@ -20629,7 +21270,7 @@
             <a:tbl>
               <a:tblPr>
                 <a:noFill/>
-                <a:tableStyleId>{BC5E74A6-B762-457D-B112-18F1546CEA8E}</a:tableStyleId>
+                <a:tableStyleId>{986F7BEE-4656-4680-8EFA-844DF24C8D60}</a:tableStyleId>
               </a:tblPr>
               <a:tblGrid>
                 <a:gridCol w="1446200"/>
@@ -21480,12 +22121,12 @@
 </p:sld>
 </file>
 
-<file path=ppt/slides/slide27.xml><?xml version="1.0" encoding="utf-8"?>
+<file path=ppt/slides/slide28.xml><?xml version="1.0" encoding="utf-8"?>
 <p:sld xmlns:a="http://schemas.openxmlformats.org/drawingml/2006/main" xmlns:r="http://schemas.openxmlformats.org/officeDocument/2006/relationships" xmlns:mc="http://schemas.openxmlformats.org/markup-compatibility/2006" xmlns:mv="urn:schemas-microsoft-com:mac:vml" xmlns:p="http://schemas.openxmlformats.org/presentationml/2006/main" xmlns:c="http://schemas.openxmlformats.org/drawingml/2006/chart" xmlns:dgm="http://schemas.openxmlformats.org/drawingml/2006/diagram" xmlns:o="urn:schemas-microsoft-com:office:office" xmlns:v="urn:schemas-microsoft-com:vml" xmlns:pvml="urn:schemas-microsoft-com:office:powerpoint" xmlns:com="http://schemas.openxmlformats.org/drawingml/2006/compatibility" xmlns:p14="http://schemas.microsoft.com/office/powerpoint/2010/main" xmlns:p15="http://schemas.microsoft.com/office/powerpoint/2012/main">
   <p:cSld>
     <p:spTree>
       <p:nvGrpSpPr>
-        <p:cNvPr id="283" name="Shape 283"/>
+        <p:cNvPr id="289" name="Shape 289"/>
         <p:cNvGrpSpPr/>
         <p:nvPr/>
       </p:nvGrpSpPr>
@@ -21499,7 +22140,7 @@
       </p:grpSpPr>
       <p:sp>
         <p:nvSpPr>
-          <p:cNvPr id="284" name="Google Shape;284;p39"/>
+          <p:cNvPr id="290" name="Google Shape;290;p40"/>
           <p:cNvSpPr txBox="1"/>
           <p:nvPr>
             <p:ph type="title"/>
@@ -21539,7 +22180,7 @@
       </p:sp>
       <p:sp>
         <p:nvSpPr>
-          <p:cNvPr id="285" name="Google Shape;285;p39"/>
+          <p:cNvPr id="291" name="Google Shape;291;p40"/>
           <p:cNvSpPr txBox="1"/>
           <p:nvPr>
             <p:ph idx="1" type="body"/>
@@ -21647,7 +22288,7 @@
       </p:sp>
       <p:pic>
         <p:nvPicPr>
-          <p:cNvPr id="286" name="Google Shape;286;p39"/>
+          <p:cNvPr id="292" name="Google Shape;292;p40"/>
           <p:cNvPicPr preferRelativeResize="0"/>
           <p:nvPr/>
         </p:nvPicPr>
@@ -21663,218 +22304,6 @@
           <a:xfrm>
             <a:off x="4572000" y="2431113"/>
             <a:ext cx="4090074" cy="859125"/>
-          </a:xfrm>
-          <a:prstGeom prst="rect">
-            <a:avLst/>
-          </a:prstGeom>
-          <a:noFill/>
-          <a:ln>
-            <a:noFill/>
-          </a:ln>
-        </p:spPr>
-      </p:pic>
-    </p:spTree>
-  </p:cSld>
-  <p:clrMapOvr>
-    <a:masterClrMapping/>
-  </p:clrMapOvr>
-</p:sld>
-</file>
-
-<file path=ppt/slides/slide28.xml><?xml version="1.0" encoding="utf-8"?>
-<p:sld xmlns:a="http://schemas.openxmlformats.org/drawingml/2006/main" xmlns:r="http://schemas.openxmlformats.org/officeDocument/2006/relationships" xmlns:mc="http://schemas.openxmlformats.org/markup-compatibility/2006" xmlns:mv="urn:schemas-microsoft-com:mac:vml" xmlns:p="http://schemas.openxmlformats.org/presentationml/2006/main" xmlns:c="http://schemas.openxmlformats.org/drawingml/2006/chart" xmlns:dgm="http://schemas.openxmlformats.org/drawingml/2006/diagram" xmlns:o="urn:schemas-microsoft-com:office:office" xmlns:v="urn:schemas-microsoft-com:vml" xmlns:pvml="urn:schemas-microsoft-com:office:powerpoint" xmlns:com="http://schemas.openxmlformats.org/drawingml/2006/compatibility" xmlns:p14="http://schemas.microsoft.com/office/powerpoint/2010/main" xmlns:p15="http://schemas.microsoft.com/office/powerpoint/2012/main">
-  <p:cSld>
-    <p:spTree>
-      <p:nvGrpSpPr>
-        <p:cNvPr id="290" name="Shape 290"/>
-        <p:cNvGrpSpPr/>
-        <p:nvPr/>
-      </p:nvGrpSpPr>
-      <p:grpSpPr>
-        <a:xfrm>
-          <a:off x="0" y="0"/>
-          <a:ext cx="0" cy="0"/>
-          <a:chOff x="0" y="0"/>
-          <a:chExt cx="0" cy="0"/>
-        </a:xfrm>
-      </p:grpSpPr>
-      <p:sp>
-        <p:nvSpPr>
-          <p:cNvPr id="291" name="Google Shape;291;p40"/>
-          <p:cNvSpPr txBox="1"/>
-          <p:nvPr>
-            <p:ph type="title"/>
-          </p:nvPr>
-        </p:nvSpPr>
-        <p:spPr>
-          <a:xfrm>
-            <a:off x="311700" y="445025"/>
-            <a:ext cx="8520600" cy="572700"/>
-          </a:xfrm>
-          <a:prstGeom prst="rect">
-            <a:avLst/>
-          </a:prstGeom>
-        </p:spPr>
-        <p:txBody>
-          <a:bodyPr anchorCtr="0" anchor="t" bIns="91425" lIns="91425" spcFirstLastPara="1" rIns="91425" wrap="square" tIns="91425">
-            <a:noAutofit/>
-          </a:bodyPr>
-          <a:lstStyle/>
-          <a:p>
-            <a:pPr indent="0" lvl="0" marL="0" rtl="0" algn="l">
-              <a:spcBef>
-                <a:spcPts val="0"/>
-              </a:spcBef>
-              <a:spcAft>
-                <a:spcPts val="0"/>
-              </a:spcAft>
-              <a:buNone/>
-            </a:pPr>
-            <a:r>
-              <a:rPr lang="en-GB"/>
-              <a:t>How!?: Part 2 - Continuous Case</a:t>
-            </a:r>
-            <a:endParaRPr/>
-          </a:p>
-          <a:p>
-            <a:pPr indent="0" lvl="0" marL="0" rtl="0" algn="l">
-              <a:spcBef>
-                <a:spcPts val="0"/>
-              </a:spcBef>
-              <a:spcAft>
-                <a:spcPts val="0"/>
-              </a:spcAft>
-              <a:buNone/>
-            </a:pPr>
-            <a:r>
-              <a:t/>
-            </a:r>
-            <a:endParaRPr/>
-          </a:p>
-        </p:txBody>
-      </p:sp>
-      <p:sp>
-        <p:nvSpPr>
-          <p:cNvPr id="292" name="Google Shape;292;p40"/>
-          <p:cNvSpPr txBox="1"/>
-          <p:nvPr>
-            <p:ph idx="1" type="body"/>
-          </p:nvPr>
-        </p:nvSpPr>
-        <p:spPr>
-          <a:xfrm>
-            <a:off x="311700" y="1152475"/>
-            <a:ext cx="4260300" cy="3416400"/>
-          </a:xfrm>
-          <a:prstGeom prst="rect">
-            <a:avLst/>
-          </a:prstGeom>
-        </p:spPr>
-        <p:txBody>
-          <a:bodyPr anchorCtr="0" anchor="ctr" bIns="91425" lIns="91425" spcFirstLastPara="1" rIns="91425" wrap="square" tIns="91425">
-            <a:noAutofit/>
-          </a:bodyPr>
-          <a:lstStyle/>
-          <a:p>
-            <a:pPr indent="-342900" lvl="0" marL="457200" rtl="0" algn="l">
-              <a:lnSpc>
-                <a:spcPct val="150000"/>
-              </a:lnSpc>
-              <a:spcBef>
-                <a:spcPts val="0"/>
-              </a:spcBef>
-              <a:spcAft>
-                <a:spcPts val="0"/>
-              </a:spcAft>
-              <a:buSzPts val="1800"/>
-              <a:buAutoNum type="arabicPeriod"/>
-            </a:pPr>
-            <a:r>
-              <a:rPr lang="en-GB"/>
-              <a:t>AB Testing Revisited:</a:t>
-            </a:r>
-            <a:endParaRPr/>
-          </a:p>
-          <a:p>
-            <a:pPr indent="-317500" lvl="1" marL="914400" rtl="0" algn="l">
-              <a:lnSpc>
-                <a:spcPct val="150000"/>
-              </a:lnSpc>
-              <a:spcBef>
-                <a:spcPts val="0"/>
-              </a:spcBef>
-              <a:spcAft>
-                <a:spcPts val="0"/>
-              </a:spcAft>
-              <a:buSzPts val="1400"/>
-              <a:buAutoNum type="alphaLcPeriod"/>
-            </a:pPr>
-            <a:r>
-              <a:rPr lang="en-GB"/>
-              <a:t>Two variants</a:t>
-            </a:r>
-            <a:endParaRPr/>
-          </a:p>
-          <a:p>
-            <a:pPr indent="-317500" lvl="1" marL="914400" rtl="0" algn="l">
-              <a:lnSpc>
-                <a:spcPct val="150000"/>
-              </a:lnSpc>
-              <a:spcBef>
-                <a:spcPts val="0"/>
-              </a:spcBef>
-              <a:spcAft>
-                <a:spcPts val="0"/>
-              </a:spcAft>
-              <a:buSzPts val="1400"/>
-              <a:buAutoNum type="alphaLcPeriod"/>
-            </a:pPr>
-            <a:r>
-              <a:rPr lang="en-GB"/>
-              <a:t>What is the probability of the parameters for each variant given the data?</a:t>
-            </a:r>
-            <a:endParaRPr/>
-          </a:p>
-          <a:p>
-            <a:pPr indent="-342900" lvl="0" marL="457200" rtl="0" algn="l">
-              <a:lnSpc>
-                <a:spcPct val="150000"/>
-              </a:lnSpc>
-              <a:spcBef>
-                <a:spcPts val="0"/>
-              </a:spcBef>
-              <a:spcAft>
-                <a:spcPts val="0"/>
-              </a:spcAft>
-              <a:buSzPts val="1800"/>
-              <a:buAutoNum type="arabicPeriod"/>
-            </a:pPr>
-            <a:r>
-              <a:rPr lang="en-GB"/>
-              <a:t>Time for Bayesian Statistics!</a:t>
-            </a:r>
-            <a:endParaRPr/>
-          </a:p>
-        </p:txBody>
-      </p:sp>
-      <p:pic>
-        <p:nvPicPr>
-          <p:cNvPr id="293" name="Google Shape;293;p40"/>
-          <p:cNvPicPr preferRelativeResize="0"/>
-          <p:nvPr/>
-        </p:nvPicPr>
-        <p:blipFill>
-          <a:blip r:embed="rId3">
-            <a:alphaModFix/>
-          </a:blip>
-          <a:stretch>
-            <a:fillRect/>
-          </a:stretch>
-        </p:blipFill>
-        <p:spPr>
-          <a:xfrm>
-            <a:off x="4951122" y="1354750"/>
-            <a:ext cx="2882251" cy="2685649"/>
           </a:xfrm>
           <a:prstGeom prst="rect">
             <a:avLst/>
@@ -21898,7 +22327,7 @@
   <p:cSld>
     <p:spTree>
       <p:nvGrpSpPr>
-        <p:cNvPr id="297" name="Shape 297"/>
+        <p:cNvPr id="296" name="Shape 296"/>
         <p:cNvGrpSpPr/>
         <p:nvPr/>
       </p:nvGrpSpPr>
@@ -21912,7 +22341,7 @@
       </p:grpSpPr>
       <p:sp>
         <p:nvSpPr>
-          <p:cNvPr id="298" name="Google Shape;298;p41"/>
+          <p:cNvPr id="297" name="Google Shape;297;p41"/>
           <p:cNvSpPr txBox="1"/>
           <p:nvPr>
             <p:ph type="title"/>
@@ -21967,7 +22396,7 @@
       </p:sp>
       <p:sp>
         <p:nvSpPr>
-          <p:cNvPr id="299" name="Google Shape;299;p41"/>
+          <p:cNvPr id="298" name="Google Shape;298;p41"/>
           <p:cNvSpPr txBox="1"/>
           <p:nvPr>
             <p:ph idx="1" type="body"/>
@@ -21976,7 +22405,7 @@
         <p:spPr>
           <a:xfrm>
             <a:off x="311700" y="1152475"/>
-            <a:ext cx="3999900" cy="3416400"/>
+            <a:ext cx="4260300" cy="3416400"/>
           </a:xfrm>
           <a:prstGeom prst="rect">
             <a:avLst/>
@@ -21988,45 +22417,62 @@
           </a:bodyPr>
           <a:lstStyle/>
           <a:p>
-            <a:pPr indent="0" lvl="0" marL="0" rtl="0" algn="l">
-              <a:lnSpc>
-                <a:spcPct val="150000"/>
-              </a:lnSpc>
-              <a:spcBef>
-                <a:spcPts val="0"/>
-              </a:spcBef>
-              <a:spcAft>
-                <a:spcPts val="0"/>
-              </a:spcAft>
-              <a:buNone/>
-            </a:pPr>
-            <a:r>
-              <a:rPr lang="en-GB" u="sng"/>
-              <a:t>AB Test</a:t>
-            </a:r>
-            <a:r>
-              <a:rPr lang="en-GB" sz="1800"/>
-              <a:t>:</a:t>
-            </a:r>
-            <a:endParaRPr sz="1400"/>
-          </a:p>
-          <a:p>
             <a:pPr indent="-342900" lvl="0" marL="457200" rtl="0" algn="l">
               <a:lnSpc>
                 <a:spcPct val="150000"/>
               </a:lnSpc>
               <a:spcBef>
-                <a:spcPts val="1600"/>
+                <a:spcPts val="0"/>
               </a:spcBef>
               <a:spcAft>
                 <a:spcPts val="0"/>
               </a:spcAft>
               <a:buSzPts val="1800"/>
-              <a:buChar char="●"/>
+              <a:buAutoNum type="arabicPeriod"/>
             </a:pPr>
             <a:r>
               <a:rPr lang="en-GB"/>
-              <a:t>For people randomly placed in control/test</a:t>
+              <a:t>AB Testing Revisited:</a:t>
+            </a:r>
+            <a:endParaRPr/>
+          </a:p>
+          <a:p>
+            <a:pPr indent="-317500" lvl="1" marL="914400" rtl="0" algn="l">
+              <a:lnSpc>
+                <a:spcPct val="150000"/>
+              </a:lnSpc>
+              <a:spcBef>
+                <a:spcPts val="0"/>
+              </a:spcBef>
+              <a:spcAft>
+                <a:spcPts val="0"/>
+              </a:spcAft>
+              <a:buSzPts val="1400"/>
+              <a:buAutoNum type="alphaLcPeriod"/>
+            </a:pPr>
+            <a:r>
+              <a:rPr lang="en-GB"/>
+              <a:t>Two variants</a:t>
+            </a:r>
+            <a:endParaRPr/>
+          </a:p>
+          <a:p>
+            <a:pPr indent="-317500" lvl="1" marL="914400" rtl="0" algn="l">
+              <a:lnSpc>
+                <a:spcPct val="150000"/>
+              </a:lnSpc>
+              <a:spcBef>
+                <a:spcPts val="0"/>
+              </a:spcBef>
+              <a:spcAft>
+                <a:spcPts val="0"/>
+              </a:spcAft>
+              <a:buSzPts val="1400"/>
+              <a:buAutoNum type="alphaLcPeriod"/>
+            </a:pPr>
+            <a:r>
+              <a:rPr lang="en-GB"/>
+              <a:t>What is the probability of the parameters for each variant given the data?</a:t>
             </a:r>
             <a:endParaRPr/>
           </a:p>
@@ -22042,51 +22488,11 @@
                 <a:spcPts val="0"/>
               </a:spcAft>
               <a:buSzPts val="1800"/>
-              <a:buChar char="●"/>
+              <a:buAutoNum type="arabicPeriod"/>
             </a:pPr>
             <a:r>
               <a:rPr lang="en-GB"/>
-              <a:t>Track conversions (1/0)</a:t>
-            </a:r>
-            <a:endParaRPr/>
-          </a:p>
-          <a:p>
-            <a:pPr indent="-342900" lvl="0" marL="457200" rtl="0" algn="l">
-              <a:lnSpc>
-                <a:spcPct val="150000"/>
-              </a:lnSpc>
-              <a:spcBef>
-                <a:spcPts val="0"/>
-              </a:spcBef>
-              <a:spcAft>
-                <a:spcPts val="0"/>
-              </a:spcAft>
-              <a:buSzPts val="1800"/>
-              <a:buChar char="●"/>
-            </a:pPr>
-            <a:r>
-              <a:rPr lang="en-GB"/>
-              <a:t>What is our Likelihood?</a:t>
-            </a:r>
-            <a:endParaRPr/>
-          </a:p>
-          <a:p>
-            <a:pPr indent="-317500" lvl="1" marL="1371600" rtl="0" algn="l">
-              <a:lnSpc>
-                <a:spcPct val="150000"/>
-              </a:lnSpc>
-              <a:spcBef>
-                <a:spcPts val="0"/>
-              </a:spcBef>
-              <a:spcAft>
-                <a:spcPts val="0"/>
-              </a:spcAft>
-              <a:buSzPts val="1400"/>
-              <a:buChar char="○"/>
-            </a:pPr>
-            <a:r>
-              <a:rPr lang="en-GB"/>
-              <a:t>Bernoulli</a:t>
+              <a:t>Time for Bayesian Statistics!</a:t>
             </a:r>
             <a:endParaRPr/>
           </a:p>
@@ -22094,7 +22500,7 @@
       </p:sp>
       <p:pic>
         <p:nvPicPr>
-          <p:cNvPr id="300" name="Google Shape;300;p41"/>
+          <p:cNvPr id="299" name="Google Shape;299;p41"/>
           <p:cNvPicPr preferRelativeResize="0"/>
           <p:nvPr/>
         </p:nvPicPr>
@@ -22108,8 +22514,8 @@
         </p:blipFill>
         <p:spPr>
           <a:xfrm>
-            <a:off x="4536650" y="2610775"/>
-            <a:ext cx="4295649" cy="444850"/>
+            <a:off x="4951122" y="1354750"/>
+            <a:ext cx="2882251" cy="2685649"/>
           </a:xfrm>
           <a:prstGeom prst="rect">
             <a:avLst/>
@@ -22419,7 +22825,7 @@
   <p:cSld>
     <p:spTree>
       <p:nvGrpSpPr>
-        <p:cNvPr id="304" name="Shape 304"/>
+        <p:cNvPr id="303" name="Shape 303"/>
         <p:cNvGrpSpPr/>
         <p:nvPr/>
       </p:nvGrpSpPr>
@@ -22433,7 +22839,7 @@
       </p:grpSpPr>
       <p:sp>
         <p:nvSpPr>
-          <p:cNvPr id="305" name="Google Shape;305;p42"/>
+          <p:cNvPr id="304" name="Google Shape;304;p42"/>
           <p:cNvSpPr txBox="1"/>
           <p:nvPr>
             <p:ph type="title"/>
@@ -22488,7 +22894,7 @@
       </p:sp>
       <p:sp>
         <p:nvSpPr>
-          <p:cNvPr id="306" name="Google Shape;306;p42"/>
+          <p:cNvPr id="305" name="Google Shape;305;p42"/>
           <p:cNvSpPr txBox="1"/>
           <p:nvPr>
             <p:ph idx="1" type="body"/>
@@ -22523,7 +22929,7 @@
             </a:pPr>
             <a:r>
               <a:rPr lang="en-GB" u="sng"/>
-              <a:t>Prior?</a:t>
+              <a:t>AB Test</a:t>
             </a:r>
             <a:r>
               <a:rPr lang="en-GB" sz="1800"/>
@@ -22532,7 +22938,7 @@
             <a:endParaRPr sz="1400"/>
           </a:p>
           <a:p>
-            <a:pPr indent="-342900" lvl="0" marL="457200" marR="0" rtl="0" algn="l">
+            <a:pPr indent="-342900" lvl="0" marL="457200" rtl="0" algn="l">
               <a:lnSpc>
                 <a:spcPct val="150000"/>
               </a:lnSpc>
@@ -22542,21 +22948,17 @@
               <a:spcAft>
                 <a:spcPts val="0"/>
               </a:spcAft>
-              <a:buClr>
-                <a:schemeClr val="accent3"/>
-              </a:buClr>
               <a:buSzPts val="1800"/>
-              <a:buFont typeface="Average"/>
               <a:buChar char="●"/>
             </a:pPr>
             <a:r>
               <a:rPr lang="en-GB"/>
-              <a:t>Uninformed Prior</a:t>
+              <a:t>For people randomly placed in control/test</a:t>
             </a:r>
             <a:endParaRPr/>
           </a:p>
           <a:p>
-            <a:pPr indent="-342900" lvl="0" marL="457200" marR="0" rtl="0" algn="l">
+            <a:pPr indent="-342900" lvl="0" marL="457200" rtl="0" algn="l">
               <a:lnSpc>
                 <a:spcPct val="150000"/>
               </a:lnSpc>
@@ -22571,7 +22973,47 @@
             </a:pPr>
             <a:r>
               <a:rPr lang="en-GB"/>
-              <a:t>Indicator Function</a:t>
+              <a:t>Track conversions (1/0)</a:t>
+            </a:r>
+            <a:endParaRPr/>
+          </a:p>
+          <a:p>
+            <a:pPr indent="-342900" lvl="0" marL="457200" rtl="0" algn="l">
+              <a:lnSpc>
+                <a:spcPct val="150000"/>
+              </a:lnSpc>
+              <a:spcBef>
+                <a:spcPts val="0"/>
+              </a:spcBef>
+              <a:spcAft>
+                <a:spcPts val="0"/>
+              </a:spcAft>
+              <a:buSzPts val="1800"/>
+              <a:buChar char="●"/>
+            </a:pPr>
+            <a:r>
+              <a:rPr lang="en-GB"/>
+              <a:t>What is our Likelihood?</a:t>
+            </a:r>
+            <a:endParaRPr/>
+          </a:p>
+          <a:p>
+            <a:pPr indent="-317500" lvl="1" marL="1371600" rtl="0" algn="l">
+              <a:lnSpc>
+                <a:spcPct val="150000"/>
+              </a:lnSpc>
+              <a:spcBef>
+                <a:spcPts val="0"/>
+              </a:spcBef>
+              <a:spcAft>
+                <a:spcPts val="0"/>
+              </a:spcAft>
+              <a:buSzPts val="1400"/>
+              <a:buChar char="○"/>
+            </a:pPr>
+            <a:r>
+              <a:rPr lang="en-GB"/>
+              <a:t>Bernoulli</a:t>
             </a:r>
             <a:endParaRPr/>
           </a:p>
@@ -22579,7 +23021,7 @@
       </p:sp>
       <p:pic>
         <p:nvPicPr>
-          <p:cNvPr id="307" name="Google Shape;307;p42"/>
+          <p:cNvPr id="306" name="Google Shape;306;p42"/>
           <p:cNvPicPr preferRelativeResize="0"/>
           <p:nvPr/>
         </p:nvPicPr>
@@ -22593,8 +23035,8 @@
         </p:blipFill>
         <p:spPr>
           <a:xfrm>
-            <a:off x="4536648" y="2483725"/>
-            <a:ext cx="4295650" cy="753898"/>
+            <a:off x="4536650" y="2610775"/>
+            <a:ext cx="4295649" cy="444850"/>
           </a:xfrm>
           <a:prstGeom prst="rect">
             <a:avLst/>
@@ -22618,7 +23060,7 @@
   <p:cSld>
     <p:spTree>
       <p:nvGrpSpPr>
-        <p:cNvPr id="311" name="Shape 311"/>
+        <p:cNvPr id="310" name="Shape 310"/>
         <p:cNvGrpSpPr/>
         <p:nvPr/>
       </p:nvGrpSpPr>
@@ -22632,7 +23074,7 @@
       </p:grpSpPr>
       <p:sp>
         <p:nvSpPr>
-          <p:cNvPr id="312" name="Google Shape;312;p43"/>
+          <p:cNvPr id="311" name="Google Shape;311;p43"/>
           <p:cNvSpPr txBox="1"/>
           <p:nvPr>
             <p:ph type="title"/>
@@ -22680,6 +23122,124 @@
             </a:pPr>
             <a:r>
               <a:t/>
+            </a:r>
+            <a:endParaRPr/>
+          </a:p>
+        </p:txBody>
+      </p:sp>
+      <p:sp>
+        <p:nvSpPr>
+          <p:cNvPr id="312" name="Google Shape;312;p43"/>
+          <p:cNvSpPr txBox="1"/>
+          <p:nvPr>
+            <p:ph idx="1" type="body"/>
+          </p:nvPr>
+        </p:nvSpPr>
+        <p:spPr>
+          <a:xfrm>
+            <a:off x="311700" y="1152475"/>
+            <a:ext cx="3999900" cy="3416400"/>
+          </a:xfrm>
+          <a:prstGeom prst="rect">
+            <a:avLst/>
+          </a:prstGeom>
+        </p:spPr>
+        <p:txBody>
+          <a:bodyPr anchorCtr="0" anchor="ctr" bIns="91425" lIns="91425" spcFirstLastPara="1" rIns="91425" wrap="square" tIns="91425">
+            <a:noAutofit/>
+          </a:bodyPr>
+          <a:lstStyle/>
+          <a:p>
+            <a:pPr indent="0" lvl="0" marL="0" rtl="0" algn="l">
+              <a:lnSpc>
+                <a:spcPct val="150000"/>
+              </a:lnSpc>
+              <a:spcBef>
+                <a:spcPts val="0"/>
+              </a:spcBef>
+              <a:spcAft>
+                <a:spcPts val="0"/>
+              </a:spcAft>
+              <a:buNone/>
+            </a:pPr>
+            <a:r>
+              <a:rPr lang="en-GB" u="sng"/>
+              <a:t>Prior?</a:t>
+            </a:r>
+            <a:r>
+              <a:rPr lang="en-GB" sz="1800"/>
+              <a:t>:</a:t>
+            </a:r>
+            <a:endParaRPr sz="1400"/>
+          </a:p>
+          <a:p>
+            <a:pPr indent="-342900" lvl="0" marL="457200" marR="0" rtl="0" algn="l">
+              <a:lnSpc>
+                <a:spcPct val="150000"/>
+              </a:lnSpc>
+              <a:spcBef>
+                <a:spcPts val="1600"/>
+              </a:spcBef>
+              <a:spcAft>
+                <a:spcPts val="0"/>
+              </a:spcAft>
+              <a:buClr>
+                <a:schemeClr val="accent3"/>
+              </a:buClr>
+              <a:buSzPts val="1800"/>
+              <a:buFont typeface="Average"/>
+              <a:buChar char="●"/>
+            </a:pPr>
+            <a:r>
+              <a:rPr lang="en-GB"/>
+              <a:t>Uninformed Prior</a:t>
+            </a:r>
+            <a:endParaRPr/>
+          </a:p>
+          <a:p>
+            <a:pPr indent="-342900" lvl="0" marL="457200" marR="0" rtl="0" algn="l">
+              <a:lnSpc>
+                <a:spcPct val="150000"/>
+              </a:lnSpc>
+              <a:spcBef>
+                <a:spcPts val="0"/>
+              </a:spcBef>
+              <a:spcAft>
+                <a:spcPts val="0"/>
+              </a:spcAft>
+              <a:buSzPts val="1800"/>
+              <a:buChar char="●"/>
+            </a:pPr>
+            <a:r>
+              <a:rPr lang="en-GB"/>
+              <a:t>Uniform distribution</a:t>
+            </a:r>
+            <a:endParaRPr/>
+          </a:p>
+          <a:p>
+            <a:pPr indent="-342900" lvl="0" marL="457200" marR="0" rtl="0" algn="l">
+              <a:lnSpc>
+                <a:spcPct val="150000"/>
+              </a:lnSpc>
+              <a:spcBef>
+                <a:spcPts val="0"/>
+              </a:spcBef>
+              <a:spcAft>
+                <a:spcPts val="0"/>
+              </a:spcAft>
+              <a:buSzPts val="1800"/>
+              <a:buChar char="●"/>
+            </a:pPr>
+            <a:r>
+              <a:rPr lang="en-GB"/>
+              <a:t>Represented by </a:t>
+            </a:r>
+            <a:br>
+              <a:rPr lang="en-GB"/>
+            </a:br>
+            <a:r>
+              <a:rPr lang="en-GB"/>
+              <a:t>Indicator Function</a:t>
             </a:r>
             <a:endParaRPr/>
           </a:p>
@@ -22701,8 +23261,36 @@
         </p:blipFill>
         <p:spPr>
           <a:xfrm>
-            <a:off x="152400" y="2211225"/>
-            <a:ext cx="8839202" cy="721042"/>
+            <a:off x="4311598" y="1169268"/>
+            <a:ext cx="4295650" cy="753898"/>
+          </a:xfrm>
+          <a:prstGeom prst="rect">
+            <a:avLst/>
+          </a:prstGeom>
+          <a:noFill/>
+          <a:ln>
+            <a:noFill/>
+          </a:ln>
+        </p:spPr>
+      </p:pic>
+      <p:pic>
+        <p:nvPicPr>
+          <p:cNvPr id="314" name="Google Shape;314;p43"/>
+          <p:cNvPicPr preferRelativeResize="0"/>
+          <p:nvPr/>
+        </p:nvPicPr>
+        <p:blipFill>
+          <a:blip r:embed="rId4">
+            <a:alphaModFix/>
+          </a:blip>
+          <a:stretch>
+            <a:fillRect/>
+          </a:stretch>
+        </p:blipFill>
+        <p:spPr>
+          <a:xfrm>
+            <a:off x="4311600" y="2035749"/>
+            <a:ext cx="4295650" cy="2577381"/>
           </a:xfrm>
           <a:prstGeom prst="rect">
             <a:avLst/>
@@ -22726,7 +23314,7 @@
   <p:cSld>
     <p:spTree>
       <p:nvGrpSpPr>
-        <p:cNvPr id="317" name="Shape 317"/>
+        <p:cNvPr id="318" name="Shape 318"/>
         <p:cNvGrpSpPr/>
         <p:nvPr/>
       </p:nvGrpSpPr>
@@ -22740,7 +23328,7 @@
       </p:grpSpPr>
       <p:sp>
         <p:nvSpPr>
-          <p:cNvPr id="318" name="Google Shape;318;p44"/>
+          <p:cNvPr id="319" name="Google Shape;319;p44"/>
           <p:cNvSpPr txBox="1"/>
           <p:nvPr>
             <p:ph type="title"/>
@@ -22795,7 +23383,7 @@
       </p:sp>
       <p:pic>
         <p:nvPicPr>
-          <p:cNvPr id="319" name="Google Shape;319;p44"/>
+          <p:cNvPr id="320" name="Google Shape;320;p44"/>
           <p:cNvPicPr preferRelativeResize="0"/>
           <p:nvPr/>
         </p:nvPicPr>
@@ -22809,8 +23397,8 @@
         </p:blipFill>
         <p:spPr>
           <a:xfrm>
-            <a:off x="219000" y="1870488"/>
-            <a:ext cx="8839200" cy="1491313"/>
+            <a:off x="152400" y="2211225"/>
+            <a:ext cx="8839202" cy="721042"/>
           </a:xfrm>
           <a:prstGeom prst="rect">
             <a:avLst/>
@@ -22834,7 +23422,7 @@
   <p:cSld>
     <p:spTree>
       <p:nvGrpSpPr>
-        <p:cNvPr id="323" name="Shape 323"/>
+        <p:cNvPr id="324" name="Shape 324"/>
         <p:cNvGrpSpPr/>
         <p:nvPr/>
       </p:nvGrpSpPr>
@@ -22848,7 +23436,7 @@
       </p:grpSpPr>
       <p:sp>
         <p:nvSpPr>
-          <p:cNvPr id="324" name="Google Shape;324;p45"/>
+          <p:cNvPr id="325" name="Google Shape;325;p45"/>
           <p:cNvSpPr txBox="1"/>
           <p:nvPr>
             <p:ph type="title"/>
@@ -22884,11 +23472,26 @@
             </a:r>
             <a:endParaRPr/>
           </a:p>
+          <a:p>
+            <a:pPr indent="0" lvl="0" marL="0" rtl="0" algn="l">
+              <a:spcBef>
+                <a:spcPts val="0"/>
+              </a:spcBef>
+              <a:spcAft>
+                <a:spcPts val="0"/>
+              </a:spcAft>
+              <a:buNone/>
+            </a:pPr>
+            <a:r>
+              <a:t/>
+            </a:r>
+            <a:endParaRPr/>
+          </a:p>
         </p:txBody>
       </p:sp>
       <p:pic>
         <p:nvPicPr>
-          <p:cNvPr id="325" name="Google Shape;325;p45"/>
+          <p:cNvPr id="326" name="Google Shape;326;p45"/>
           <p:cNvPicPr preferRelativeResize="0"/>
           <p:nvPr/>
         </p:nvPicPr>
@@ -22902,130 +23505,8 @@
         </p:blipFill>
         <p:spPr>
           <a:xfrm>
-            <a:off x="152400" y="1967125"/>
-            <a:ext cx="8839200" cy="1298028"/>
-          </a:xfrm>
-          <a:prstGeom prst="rect">
-            <a:avLst/>
-          </a:prstGeom>
-          <a:noFill/>
-          <a:ln>
-            <a:noFill/>
-          </a:ln>
-        </p:spPr>
-      </p:pic>
-      <p:sp>
-        <p:nvSpPr>
-          <p:cNvPr id="326" name="Google Shape;326;p45"/>
-          <p:cNvSpPr/>
-          <p:nvPr/>
-        </p:nvSpPr>
-        <p:spPr>
-          <a:xfrm>
-            <a:off x="2124000" y="2656850"/>
-            <a:ext cx="769800" cy="572700"/>
-          </a:xfrm>
-          <a:prstGeom prst="rect">
-            <a:avLst/>
-          </a:prstGeom>
-          <a:noFill/>
-          <a:ln cap="flat" cmpd="sng" w="9525">
-            <a:solidFill>
-              <a:schemeClr val="accent5"/>
-            </a:solidFill>
-            <a:prstDash val="solid"/>
-            <a:round/>
-            <a:headEnd len="sm" w="sm" type="none"/>
-            <a:tailEnd len="sm" w="sm" type="none"/>
-          </a:ln>
-        </p:spPr>
-        <p:txBody>
-          <a:bodyPr anchorCtr="0" anchor="ctr" bIns="91425" lIns="91425" spcFirstLastPara="1" rIns="91425" wrap="square" tIns="91425">
-            <a:noAutofit/>
-          </a:bodyPr>
-          <a:lstStyle/>
-          <a:p>
-            <a:pPr indent="0" lvl="0" marL="0" rtl="0" algn="l">
-              <a:spcBef>
-                <a:spcPts val="0"/>
-              </a:spcBef>
-              <a:spcAft>
-                <a:spcPts val="0"/>
-              </a:spcAft>
-              <a:buNone/>
-            </a:pPr>
-            <a:r>
-              <a:t/>
-            </a:r>
-            <a:endParaRPr/>
-          </a:p>
-        </p:txBody>
-      </p:sp>
-      <p:sp>
-        <p:nvSpPr>
-          <p:cNvPr id="327" name="Google Shape;327;p45"/>
-          <p:cNvSpPr/>
-          <p:nvPr/>
-        </p:nvSpPr>
-        <p:spPr>
-          <a:xfrm>
-            <a:off x="3485725" y="2656850"/>
-            <a:ext cx="392400" cy="572700"/>
-          </a:xfrm>
-          <a:prstGeom prst="rect">
-            <a:avLst/>
-          </a:prstGeom>
-          <a:noFill/>
-          <a:ln cap="flat" cmpd="sng" w="9525">
-            <a:solidFill>
-              <a:schemeClr val="accent5"/>
-            </a:solidFill>
-            <a:prstDash val="solid"/>
-            <a:round/>
-            <a:headEnd len="sm" w="sm" type="none"/>
-            <a:tailEnd len="sm" w="sm" type="none"/>
-          </a:ln>
-        </p:spPr>
-        <p:txBody>
-          <a:bodyPr anchorCtr="0" anchor="ctr" bIns="91425" lIns="91425" spcFirstLastPara="1" rIns="91425" wrap="square" tIns="91425">
-            <a:noAutofit/>
-          </a:bodyPr>
-          <a:lstStyle/>
-          <a:p>
-            <a:pPr indent="0" lvl="0" marL="0" rtl="0" algn="l">
-              <a:spcBef>
-                <a:spcPts val="0"/>
-              </a:spcBef>
-              <a:spcAft>
-                <a:spcPts val="0"/>
-              </a:spcAft>
-              <a:buNone/>
-            </a:pPr>
-            <a:r>
-              <a:t/>
-            </a:r>
-            <a:endParaRPr/>
-          </a:p>
-        </p:txBody>
-      </p:sp>
-      <p:pic>
-        <p:nvPicPr>
-          <p:cNvPr id="328" name="Google Shape;328;p45"/>
-          <p:cNvPicPr preferRelativeResize="0"/>
-          <p:nvPr/>
-        </p:nvPicPr>
-        <p:blipFill>
-          <a:blip r:embed="rId4">
-            <a:alphaModFix amt="51000"/>
-          </a:blip>
-          <a:stretch>
-            <a:fillRect/>
-          </a:stretch>
-        </p:blipFill>
-        <p:spPr>
-          <a:xfrm>
-            <a:off x="152400" y="4386244"/>
-            <a:ext cx="3473844" cy="603250"/>
+            <a:off x="219000" y="1870488"/>
+            <a:ext cx="8839200" cy="1491313"/>
           </a:xfrm>
           <a:prstGeom prst="rect">
             <a:avLst/>
@@ -23049,7 +23530,7 @@
   <p:cSld>
     <p:spTree>
       <p:nvGrpSpPr>
-        <p:cNvPr id="332" name="Shape 332"/>
+        <p:cNvPr id="330" name="Shape 330"/>
         <p:cNvGrpSpPr/>
         <p:nvPr/>
       </p:nvGrpSpPr>
@@ -23063,7 +23544,7 @@
       </p:grpSpPr>
       <p:sp>
         <p:nvSpPr>
-          <p:cNvPr id="333" name="Google Shape;333;p46"/>
+          <p:cNvPr id="331" name="Google Shape;331;p46"/>
           <p:cNvSpPr txBox="1"/>
           <p:nvPr>
             <p:ph type="title"/>
@@ -23103,7 +23584,7 @@
       </p:sp>
       <p:pic>
         <p:nvPicPr>
-          <p:cNvPr id="334" name="Google Shape;334;p46"/>
+          <p:cNvPr id="332" name="Google Shape;332;p46"/>
           <p:cNvPicPr preferRelativeResize="0"/>
           <p:nvPr/>
         </p:nvPicPr>
@@ -23117,8 +23598,8 @@
         </p:blipFill>
         <p:spPr>
           <a:xfrm>
-            <a:off x="248600" y="1917600"/>
-            <a:ext cx="8839201" cy="714279"/>
+            <a:off x="152400" y="1967125"/>
+            <a:ext cx="8839200" cy="1298028"/>
           </a:xfrm>
           <a:prstGeom prst="rect">
             <a:avLst/>
@@ -23129,23 +23610,118 @@
           </a:ln>
         </p:spPr>
       </p:pic>
+      <p:sp>
+        <p:nvSpPr>
+          <p:cNvPr id="333" name="Google Shape;333;p46"/>
+          <p:cNvSpPr/>
+          <p:nvPr/>
+        </p:nvSpPr>
+        <p:spPr>
+          <a:xfrm>
+            <a:off x="2124000" y="2656850"/>
+            <a:ext cx="769800" cy="572700"/>
+          </a:xfrm>
+          <a:prstGeom prst="rect">
+            <a:avLst/>
+          </a:prstGeom>
+          <a:noFill/>
+          <a:ln cap="flat" cmpd="sng" w="9525">
+            <a:solidFill>
+              <a:schemeClr val="accent5"/>
+            </a:solidFill>
+            <a:prstDash val="solid"/>
+            <a:round/>
+            <a:headEnd len="sm" w="sm" type="none"/>
+            <a:tailEnd len="sm" w="sm" type="none"/>
+          </a:ln>
+        </p:spPr>
+        <p:txBody>
+          <a:bodyPr anchorCtr="0" anchor="ctr" bIns="91425" lIns="91425" spcFirstLastPara="1" rIns="91425" wrap="square" tIns="91425">
+            <a:noAutofit/>
+          </a:bodyPr>
+          <a:lstStyle/>
+          <a:p>
+            <a:pPr indent="0" lvl="0" marL="0" rtl="0" algn="l">
+              <a:spcBef>
+                <a:spcPts val="0"/>
+              </a:spcBef>
+              <a:spcAft>
+                <a:spcPts val="0"/>
+              </a:spcAft>
+              <a:buNone/>
+            </a:pPr>
+            <a:r>
+              <a:t/>
+            </a:r>
+            <a:endParaRPr/>
+          </a:p>
+        </p:txBody>
+      </p:sp>
+      <p:sp>
+        <p:nvSpPr>
+          <p:cNvPr id="334" name="Google Shape;334;p46"/>
+          <p:cNvSpPr/>
+          <p:nvPr/>
+        </p:nvSpPr>
+        <p:spPr>
+          <a:xfrm>
+            <a:off x="3485725" y="2656850"/>
+            <a:ext cx="392400" cy="572700"/>
+          </a:xfrm>
+          <a:prstGeom prst="rect">
+            <a:avLst/>
+          </a:prstGeom>
+          <a:noFill/>
+          <a:ln cap="flat" cmpd="sng" w="9525">
+            <a:solidFill>
+              <a:schemeClr val="accent5"/>
+            </a:solidFill>
+            <a:prstDash val="solid"/>
+            <a:round/>
+            <a:headEnd len="sm" w="sm" type="none"/>
+            <a:tailEnd len="sm" w="sm" type="none"/>
+          </a:ln>
+        </p:spPr>
+        <p:txBody>
+          <a:bodyPr anchorCtr="0" anchor="ctr" bIns="91425" lIns="91425" spcFirstLastPara="1" rIns="91425" wrap="square" tIns="91425">
+            <a:noAutofit/>
+          </a:bodyPr>
+          <a:lstStyle/>
+          <a:p>
+            <a:pPr indent="0" lvl="0" marL="0" rtl="0" algn="l">
+              <a:spcBef>
+                <a:spcPts val="0"/>
+              </a:spcBef>
+              <a:spcAft>
+                <a:spcPts val="0"/>
+              </a:spcAft>
+              <a:buNone/>
+            </a:pPr>
+            <a:r>
+              <a:t/>
+            </a:r>
+            <a:endParaRPr/>
+          </a:p>
+        </p:txBody>
+      </p:sp>
       <p:pic>
         <p:nvPicPr>
           <p:cNvPr id="335" name="Google Shape;335;p46"/>
           <p:cNvPicPr preferRelativeResize="0"/>
           <p:nvPr/>
         </p:nvPicPr>
-        <p:blipFill rotWithShape="1">
+        <p:blipFill>
           <a:blip r:embed="rId4">
-            <a:alphaModFix/>
+            <a:alphaModFix amt="51000"/>
           </a:blip>
-          <a:srcRect b="0" l="35745" r="0" t="0"/>
-          <a:stretch/>
+          <a:stretch>
+            <a:fillRect/>
+          </a:stretch>
         </p:blipFill>
         <p:spPr>
           <a:xfrm>
-            <a:off x="1990803" y="2917175"/>
-            <a:ext cx="2938751" cy="520925"/>
+            <a:off x="152400" y="4386244"/>
+            <a:ext cx="3473844" cy="603250"/>
           </a:xfrm>
           <a:prstGeom prst="rect">
             <a:avLst/>
@@ -23237,8 +23813,8 @@
         </p:blipFill>
         <p:spPr>
           <a:xfrm>
-            <a:off x="2337075" y="2014263"/>
-            <a:ext cx="4573458" cy="520950"/>
+            <a:off x="248600" y="1917600"/>
+            <a:ext cx="8839201" cy="714279"/>
           </a:xfrm>
           <a:prstGeom prst="rect">
             <a:avLst/>
@@ -23255,46 +23831,17 @@
           <p:cNvPicPr preferRelativeResize="0"/>
           <p:nvPr/>
         </p:nvPicPr>
-        <p:blipFill>
+        <p:blipFill rotWithShape="1">
           <a:blip r:embed="rId4">
             <a:alphaModFix/>
           </a:blip>
-          <a:stretch>
-            <a:fillRect/>
-          </a:stretch>
+          <a:srcRect b="0" l="35745" r="0" t="0"/>
+          <a:stretch/>
         </p:blipFill>
         <p:spPr>
           <a:xfrm>
-            <a:off x="152400" y="3807725"/>
-            <a:ext cx="2933700" cy="1183375"/>
-          </a:xfrm>
-          <a:prstGeom prst="rect">
-            <a:avLst/>
-          </a:prstGeom>
-          <a:noFill/>
-          <a:ln>
-            <a:noFill/>
-          </a:ln>
-        </p:spPr>
-      </p:pic>
-      <p:pic>
-        <p:nvPicPr>
-          <p:cNvPr id="343" name="Google Shape;343;p47"/>
-          <p:cNvPicPr preferRelativeResize="0"/>
-          <p:nvPr/>
-        </p:nvPicPr>
-        <p:blipFill>
-          <a:blip r:embed="rId5">
-            <a:alphaModFix/>
-          </a:blip>
-          <a:stretch>
-            <a:fillRect/>
-          </a:stretch>
-        </p:blipFill>
-        <p:spPr>
-          <a:xfrm>
-            <a:off x="7215333" y="2630550"/>
-            <a:ext cx="1928667" cy="2512940"/>
+            <a:off x="1990803" y="2917175"/>
+            <a:ext cx="2938751" cy="520925"/>
           </a:xfrm>
           <a:prstGeom prst="rect">
             <a:avLst/>
@@ -23318,7 +23865,7 @@
   <p:cSld>
     <p:spTree>
       <p:nvGrpSpPr>
-        <p:cNvPr id="347" name="Shape 347"/>
+        <p:cNvPr id="346" name="Shape 346"/>
         <p:cNvGrpSpPr/>
         <p:nvPr/>
       </p:nvGrpSpPr>
@@ -23332,7 +23879,7 @@
       </p:grpSpPr>
       <p:sp>
         <p:nvSpPr>
-          <p:cNvPr id="348" name="Google Shape;348;p48"/>
+          <p:cNvPr id="347" name="Google Shape;347;p48"/>
           <p:cNvSpPr txBox="1"/>
           <p:nvPr>
             <p:ph type="title"/>
@@ -23364,111 +23911,7 @@
             </a:pPr>
             <a:r>
               <a:rPr lang="en-GB"/>
-              <a:t>Conjugate Priors</a:t>
-            </a:r>
-            <a:endParaRPr/>
-          </a:p>
-        </p:txBody>
-      </p:sp>
-      <p:sp>
-        <p:nvSpPr>
-          <p:cNvPr id="349" name="Google Shape;349;p48"/>
-          <p:cNvSpPr txBox="1"/>
-          <p:nvPr>
-            <p:ph idx="1" type="body"/>
-          </p:nvPr>
-        </p:nvSpPr>
-        <p:spPr>
-          <a:xfrm>
-            <a:off x="311700" y="1152475"/>
-            <a:ext cx="4260300" cy="3416400"/>
-          </a:xfrm>
-          <a:prstGeom prst="rect">
-            <a:avLst/>
-          </a:prstGeom>
-        </p:spPr>
-        <p:txBody>
-          <a:bodyPr anchorCtr="0" anchor="ctr" bIns="91425" lIns="91425" spcFirstLastPara="1" rIns="91425" wrap="square" tIns="91425">
-            <a:noAutofit/>
-          </a:bodyPr>
-          <a:lstStyle/>
-          <a:p>
-            <a:pPr indent="-342900" lvl="0" marL="457200" rtl="0" algn="l">
-              <a:lnSpc>
-                <a:spcPct val="100000"/>
-              </a:lnSpc>
-              <a:spcBef>
-                <a:spcPts val="0"/>
-              </a:spcBef>
-              <a:spcAft>
-                <a:spcPts val="0"/>
-              </a:spcAft>
-              <a:buSzPts val="1800"/>
-              <a:buChar char="●"/>
-            </a:pPr>
-            <a:r>
-              <a:rPr lang="en-GB"/>
-              <a:t>Beta distribution is example of conj. Prior</a:t>
-            </a:r>
-            <a:endParaRPr/>
-          </a:p>
-          <a:p>
-            <a:pPr indent="-342900" lvl="0" marL="457200" rtl="0" algn="l">
-              <a:lnSpc>
-                <a:spcPct val="100000"/>
-              </a:lnSpc>
-              <a:spcBef>
-                <a:spcPts val="0"/>
-              </a:spcBef>
-              <a:spcAft>
-                <a:spcPts val="0"/>
-              </a:spcAft>
-              <a:buSzPts val="1800"/>
-              <a:buChar char="●"/>
-            </a:pPr>
-            <a:r>
-              <a:rPr lang="en-GB"/>
-              <a:t>Use it and you will get the same distribution in posterior</a:t>
-            </a:r>
-            <a:endParaRPr/>
-          </a:p>
-          <a:p>
-            <a:pPr indent="-342900" lvl="0" marL="457200" rtl="0" algn="l">
-              <a:lnSpc>
-                <a:spcPct val="100000"/>
-              </a:lnSpc>
-              <a:spcBef>
-                <a:spcPts val="0"/>
-              </a:spcBef>
-              <a:spcAft>
-                <a:spcPts val="0"/>
-              </a:spcAft>
-              <a:buSzPts val="1800"/>
-              <a:buChar char="●"/>
-            </a:pPr>
-            <a:r>
-              <a:rPr lang="en-GB"/>
-              <a:t>Once the math is done, never do it again</a:t>
-            </a:r>
-            <a:endParaRPr/>
-          </a:p>
-          <a:p>
-            <a:pPr indent="-342900" lvl="0" marL="457200" rtl="0" algn="l">
-              <a:lnSpc>
-                <a:spcPct val="100000"/>
-              </a:lnSpc>
-              <a:spcBef>
-                <a:spcPts val="0"/>
-              </a:spcBef>
-              <a:spcAft>
-                <a:spcPts val="0"/>
-              </a:spcAft>
-              <a:buSzPts val="1800"/>
-              <a:buChar char="●"/>
-            </a:pPr>
-            <a:r>
-              <a:rPr lang="en-GB"/>
-              <a:t>Update functions using data as it appears</a:t>
+              <a:t>How!?: Part 2 - Continuous Case</a:t>
             </a:r>
             <a:endParaRPr/>
           </a:p>
@@ -23476,7 +23919,7 @@
       </p:sp>
       <p:pic>
         <p:nvPicPr>
-          <p:cNvPr id="350" name="Google Shape;350;p48"/>
+          <p:cNvPr id="348" name="Google Shape;348;p48"/>
           <p:cNvPicPr preferRelativeResize="0"/>
           <p:nvPr/>
         </p:nvPicPr>
@@ -23490,8 +23933,64 @@
         </p:blipFill>
         <p:spPr>
           <a:xfrm>
-            <a:off x="4572001" y="2311275"/>
-            <a:ext cx="4260301" cy="485280"/>
+            <a:off x="2337075" y="2014263"/>
+            <a:ext cx="4573458" cy="520950"/>
+          </a:xfrm>
+          <a:prstGeom prst="rect">
+            <a:avLst/>
+          </a:prstGeom>
+          <a:noFill/>
+          <a:ln>
+            <a:noFill/>
+          </a:ln>
+        </p:spPr>
+      </p:pic>
+      <p:pic>
+        <p:nvPicPr>
+          <p:cNvPr id="349" name="Google Shape;349;p48"/>
+          <p:cNvPicPr preferRelativeResize="0"/>
+          <p:nvPr/>
+        </p:nvPicPr>
+        <p:blipFill>
+          <a:blip r:embed="rId4">
+            <a:alphaModFix/>
+          </a:blip>
+          <a:stretch>
+            <a:fillRect/>
+          </a:stretch>
+        </p:blipFill>
+        <p:spPr>
+          <a:xfrm>
+            <a:off x="152400" y="3807725"/>
+            <a:ext cx="2933700" cy="1183375"/>
+          </a:xfrm>
+          <a:prstGeom prst="rect">
+            <a:avLst/>
+          </a:prstGeom>
+          <a:noFill/>
+          <a:ln>
+            <a:noFill/>
+          </a:ln>
+        </p:spPr>
+      </p:pic>
+      <p:pic>
+        <p:nvPicPr>
+          <p:cNvPr id="350" name="Google Shape;350;p48"/>
+          <p:cNvPicPr preferRelativeResize="0"/>
+          <p:nvPr/>
+        </p:nvPicPr>
+        <p:blipFill>
+          <a:blip r:embed="rId5">
+            <a:alphaModFix/>
+          </a:blip>
+          <a:stretch>
+            <a:fillRect/>
+          </a:stretch>
+        </p:blipFill>
+        <p:spPr>
+          <a:xfrm>
+            <a:off x="7215333" y="2630550"/>
+            <a:ext cx="1928667" cy="2512940"/>
           </a:xfrm>
           <a:prstGeom prst="rect">
             <a:avLst/>
@@ -23571,90 +24070,103 @@
         <p:nvSpPr>
           <p:cNvPr id="356" name="Google Shape;356;p49"/>
           <p:cNvSpPr txBox="1"/>
-          <p:nvPr/>
+          <p:nvPr>
+            <p:ph idx="1" type="body"/>
+          </p:nvPr>
         </p:nvSpPr>
         <p:spPr>
           <a:xfrm>
-            <a:off x="73975" y="4551450"/>
-            <a:ext cx="7393200" cy="497400"/>
+            <a:off x="311700" y="1152475"/>
+            <a:ext cx="4260300" cy="3416400"/>
           </a:xfrm>
           <a:prstGeom prst="rect">
             <a:avLst/>
           </a:prstGeom>
-          <a:noFill/>
-          <a:ln>
-            <a:noFill/>
-          </a:ln>
         </p:spPr>
         <p:txBody>
-          <a:bodyPr anchorCtr="0" anchor="t" bIns="91425" lIns="91425" spcFirstLastPara="1" rIns="91425" wrap="square" tIns="91425">
+          <a:bodyPr anchorCtr="0" anchor="ctr" bIns="91425" lIns="91425" spcFirstLastPara="1" rIns="91425" wrap="square" tIns="91425">
             <a:noAutofit/>
           </a:bodyPr>
           <a:lstStyle/>
           <a:p>
-            <a:pPr indent="0" lvl="0" marL="0" rtl="0" algn="l">
-              <a:spcBef>
-                <a:spcPts val="0"/>
-              </a:spcBef>
-              <a:spcAft>
-                <a:spcPts val="0"/>
-              </a:spcAft>
-              <a:buNone/>
-            </a:pPr>
-            <a:r>
-              <a:rPr lang="en-GB" u="sng">
-                <a:solidFill>
-                  <a:srgbClr val="9E9E9E"/>
-                </a:solidFill>
-                <a:latin typeface="Average"/>
-                <a:ea typeface="Average"/>
-                <a:cs typeface="Average"/>
-                <a:sym typeface="Average"/>
-                <a:hlinkClick r:id="rId3"/>
-              </a:rPr>
-              <a:t>https://en.wikipedia.org/wiki/Conjugate_prior#Table_of_conjugate_distributions</a:t>
-            </a:r>
-            <a:endParaRPr>
-              <a:solidFill>
-                <a:srgbClr val="9E9E9E"/>
-              </a:solidFill>
-              <a:latin typeface="Average"/>
-              <a:ea typeface="Average"/>
-              <a:cs typeface="Average"/>
-              <a:sym typeface="Average"/>
-            </a:endParaRPr>
-          </a:p>
-          <a:p>
-            <a:pPr indent="0" lvl="0" marL="0" rtl="0" algn="l">
-              <a:spcBef>
-                <a:spcPts val="0"/>
-              </a:spcBef>
-              <a:spcAft>
-                <a:spcPts val="0"/>
-              </a:spcAft>
-              <a:buNone/>
-            </a:pPr>
-            <a:r>
-              <a:rPr lang="en-GB">
-                <a:solidFill>
-                  <a:srgbClr val="9E9E9E"/>
-                </a:solidFill>
-                <a:latin typeface="Average"/>
-                <a:ea typeface="Average"/>
-                <a:cs typeface="Average"/>
-                <a:sym typeface="Average"/>
-              </a:rPr>
-              <a:t>(Just Google “conjugate priors table wikipedia”)</a:t>
-            </a:r>
-            <a:endParaRPr>
-              <a:solidFill>
-                <a:srgbClr val="9E9E9E"/>
-              </a:solidFill>
-              <a:latin typeface="Average"/>
-              <a:ea typeface="Average"/>
-              <a:cs typeface="Average"/>
-              <a:sym typeface="Average"/>
-            </a:endParaRPr>
+            <a:pPr indent="-342900" lvl="0" marL="457200" rtl="0" algn="l">
+              <a:lnSpc>
+                <a:spcPct val="100000"/>
+              </a:lnSpc>
+              <a:spcBef>
+                <a:spcPts val="0"/>
+              </a:spcBef>
+              <a:spcAft>
+                <a:spcPts val="0"/>
+              </a:spcAft>
+              <a:buSzPts val="1800"/>
+              <a:buChar char="●"/>
+            </a:pPr>
+            <a:r>
+              <a:rPr lang="en-GB"/>
+              <a:t>Beta distribution is example of conj. Prior</a:t>
+            </a:r>
+            <a:endParaRPr/>
+          </a:p>
+          <a:p>
+            <a:pPr indent="-342900" lvl="0" marL="457200" rtl="0" algn="l">
+              <a:lnSpc>
+                <a:spcPct val="100000"/>
+              </a:lnSpc>
+              <a:spcBef>
+                <a:spcPts val="0"/>
+              </a:spcBef>
+              <a:spcAft>
+                <a:spcPts val="0"/>
+              </a:spcAft>
+              <a:buSzPts val="1800"/>
+              <a:buChar char="●"/>
+            </a:pPr>
+            <a:r>
+              <a:rPr lang="en-GB"/>
+              <a:t>Use it and you will get the same distribution in posterior</a:t>
+            </a:r>
+            <a:endParaRPr/>
+          </a:p>
+          <a:p>
+            <a:pPr indent="-342900" lvl="0" marL="457200" rtl="0" algn="l">
+              <a:lnSpc>
+                <a:spcPct val="100000"/>
+              </a:lnSpc>
+              <a:spcBef>
+                <a:spcPts val="0"/>
+              </a:spcBef>
+              <a:spcAft>
+                <a:spcPts val="0"/>
+              </a:spcAft>
+              <a:buSzPts val="1800"/>
+              <a:buChar char="●"/>
+            </a:pPr>
+            <a:r>
+              <a:rPr lang="en-GB"/>
+              <a:t>Once the math is done, never do it again</a:t>
+            </a:r>
+            <a:endParaRPr/>
+          </a:p>
+          <a:p>
+            <a:pPr indent="-342900" lvl="0" marL="457200" rtl="0" algn="l">
+              <a:lnSpc>
+                <a:spcPct val="100000"/>
+              </a:lnSpc>
+              <a:spcBef>
+                <a:spcPts val="0"/>
+              </a:spcBef>
+              <a:spcAft>
+                <a:spcPts val="0"/>
+              </a:spcAft>
+              <a:buSzPts val="1800"/>
+              <a:buChar char="●"/>
+            </a:pPr>
+            <a:r>
+              <a:rPr lang="en-GB"/>
+              <a:t>Update functions using data as it appears</a:t>
+            </a:r>
+            <a:endParaRPr/>
           </a:p>
         </p:txBody>
       </p:sp>
@@ -23665,7 +24177,7 @@
           <p:nvPr/>
         </p:nvPicPr>
         <p:blipFill>
-          <a:blip r:embed="rId4">
+          <a:blip r:embed="rId3">
             <a:alphaModFix/>
           </a:blip>
           <a:stretch>
@@ -23674,8 +24186,8 @@
         </p:blipFill>
         <p:spPr>
           <a:xfrm>
-            <a:off x="152400" y="2274838"/>
-            <a:ext cx="8839200" cy="593834"/>
+            <a:off x="4572001" y="2311275"/>
+            <a:ext cx="4260301" cy="485280"/>
           </a:xfrm>
           <a:prstGeom prst="rect">
             <a:avLst/>
@@ -23842,9 +24354,193 @@
           </a:p>
         </p:txBody>
       </p:sp>
+      <p:pic>
+        <p:nvPicPr>
+          <p:cNvPr id="364" name="Google Shape;364;p50"/>
+          <p:cNvPicPr preferRelativeResize="0"/>
+          <p:nvPr/>
+        </p:nvPicPr>
+        <p:blipFill>
+          <a:blip r:embed="rId4">
+            <a:alphaModFix/>
+          </a:blip>
+          <a:stretch>
+            <a:fillRect/>
+          </a:stretch>
+        </p:blipFill>
+        <p:spPr>
+          <a:xfrm>
+            <a:off x="152400" y="2274838"/>
+            <a:ext cx="8839200" cy="593834"/>
+          </a:xfrm>
+          <a:prstGeom prst="rect">
+            <a:avLst/>
+          </a:prstGeom>
+          <a:noFill/>
+          <a:ln>
+            <a:noFill/>
+          </a:ln>
+        </p:spPr>
+      </p:pic>
+    </p:spTree>
+  </p:cSld>
+  <p:clrMapOvr>
+    <a:masterClrMapping/>
+  </p:clrMapOvr>
+</p:sld>
+</file>
+
+<file path=ppt/slides/slide39.xml><?xml version="1.0" encoding="utf-8"?>
+<p:sld xmlns:a="http://schemas.openxmlformats.org/drawingml/2006/main" xmlns:r="http://schemas.openxmlformats.org/officeDocument/2006/relationships" xmlns:mc="http://schemas.openxmlformats.org/markup-compatibility/2006" xmlns:mv="urn:schemas-microsoft-com:mac:vml" xmlns:p="http://schemas.openxmlformats.org/presentationml/2006/main" xmlns:c="http://schemas.openxmlformats.org/drawingml/2006/chart" xmlns:dgm="http://schemas.openxmlformats.org/drawingml/2006/diagram" xmlns:o="urn:schemas-microsoft-com:office:office" xmlns:v="urn:schemas-microsoft-com:vml" xmlns:pvml="urn:schemas-microsoft-com:office:powerpoint" xmlns:com="http://schemas.openxmlformats.org/drawingml/2006/compatibility" xmlns:p14="http://schemas.microsoft.com/office/powerpoint/2010/main" xmlns:p15="http://schemas.microsoft.com/office/powerpoint/2012/main">
+  <p:cSld>
+    <p:spTree>
+      <p:nvGrpSpPr>
+        <p:cNvPr id="368" name="Shape 368"/>
+        <p:cNvGrpSpPr/>
+        <p:nvPr/>
+      </p:nvGrpSpPr>
+      <p:grpSpPr>
+        <a:xfrm>
+          <a:off x="0" y="0"/>
+          <a:ext cx="0" cy="0"/>
+          <a:chOff x="0" y="0"/>
+          <a:chExt cx="0" cy="0"/>
+        </a:xfrm>
+      </p:grpSpPr>
+      <p:sp>
+        <p:nvSpPr>
+          <p:cNvPr id="369" name="Google Shape;369;p51"/>
+          <p:cNvSpPr txBox="1"/>
+          <p:nvPr>
+            <p:ph type="title"/>
+          </p:nvPr>
+        </p:nvSpPr>
+        <p:spPr>
+          <a:xfrm>
+            <a:off x="311700" y="445025"/>
+            <a:ext cx="8520600" cy="572700"/>
+          </a:xfrm>
+          <a:prstGeom prst="rect">
+            <a:avLst/>
+          </a:prstGeom>
+        </p:spPr>
+        <p:txBody>
+          <a:bodyPr anchorCtr="0" anchor="t" bIns="91425" lIns="91425" spcFirstLastPara="1" rIns="91425" wrap="square" tIns="91425">
+            <a:noAutofit/>
+          </a:bodyPr>
+          <a:lstStyle/>
+          <a:p>
+            <a:pPr indent="0" lvl="0" marL="0" rtl="0" algn="l">
+              <a:spcBef>
+                <a:spcPts val="0"/>
+              </a:spcBef>
+              <a:spcAft>
+                <a:spcPts val="0"/>
+              </a:spcAft>
+              <a:buNone/>
+            </a:pPr>
+            <a:r>
+              <a:rPr lang="en-GB"/>
+              <a:t>Conjugate Priors</a:t>
+            </a:r>
+            <a:endParaRPr/>
+          </a:p>
+        </p:txBody>
+      </p:sp>
+      <p:sp>
+        <p:nvSpPr>
+          <p:cNvPr id="370" name="Google Shape;370;p51"/>
+          <p:cNvSpPr txBox="1"/>
+          <p:nvPr/>
+        </p:nvSpPr>
+        <p:spPr>
+          <a:xfrm>
+            <a:off x="73975" y="4551450"/>
+            <a:ext cx="7393200" cy="497400"/>
+          </a:xfrm>
+          <a:prstGeom prst="rect">
+            <a:avLst/>
+          </a:prstGeom>
+          <a:noFill/>
+          <a:ln>
+            <a:noFill/>
+          </a:ln>
+        </p:spPr>
+        <p:txBody>
+          <a:bodyPr anchorCtr="0" anchor="t" bIns="91425" lIns="91425" spcFirstLastPara="1" rIns="91425" wrap="square" tIns="91425">
+            <a:noAutofit/>
+          </a:bodyPr>
+          <a:lstStyle/>
+          <a:p>
+            <a:pPr indent="0" lvl="0" marL="0" rtl="0" algn="l">
+              <a:spcBef>
+                <a:spcPts val="0"/>
+              </a:spcBef>
+              <a:spcAft>
+                <a:spcPts val="0"/>
+              </a:spcAft>
+              <a:buNone/>
+            </a:pPr>
+            <a:r>
+              <a:rPr lang="en-GB" u="sng">
+                <a:solidFill>
+                  <a:srgbClr val="9E9E9E"/>
+                </a:solidFill>
+                <a:latin typeface="Average"/>
+                <a:ea typeface="Average"/>
+                <a:cs typeface="Average"/>
+                <a:sym typeface="Average"/>
+                <a:hlinkClick r:id="rId3"/>
+              </a:rPr>
+              <a:t>https://en.wikipedia.org/wiki/Conjugate_prior#Table_of_conjugate_distributions</a:t>
+            </a:r>
+            <a:endParaRPr>
+              <a:solidFill>
+                <a:srgbClr val="9E9E9E"/>
+              </a:solidFill>
+              <a:latin typeface="Average"/>
+              <a:ea typeface="Average"/>
+              <a:cs typeface="Average"/>
+              <a:sym typeface="Average"/>
+            </a:endParaRPr>
+          </a:p>
+          <a:p>
+            <a:pPr indent="0" lvl="0" marL="0" rtl="0" algn="l">
+              <a:spcBef>
+                <a:spcPts val="0"/>
+              </a:spcBef>
+              <a:spcAft>
+                <a:spcPts val="0"/>
+              </a:spcAft>
+              <a:buNone/>
+            </a:pPr>
+            <a:r>
+              <a:rPr lang="en-GB">
+                <a:solidFill>
+                  <a:srgbClr val="9E9E9E"/>
+                </a:solidFill>
+                <a:latin typeface="Average"/>
+                <a:ea typeface="Average"/>
+                <a:cs typeface="Average"/>
+                <a:sym typeface="Average"/>
+              </a:rPr>
+              <a:t>(Just Google “conjugate priors table wikipedia”)</a:t>
+            </a:r>
+            <a:endParaRPr>
+              <a:solidFill>
+                <a:srgbClr val="9E9E9E"/>
+              </a:solidFill>
+              <a:latin typeface="Average"/>
+              <a:ea typeface="Average"/>
+              <a:cs typeface="Average"/>
+              <a:sym typeface="Average"/>
+            </a:endParaRPr>
+          </a:p>
+        </p:txBody>
+      </p:sp>
       <p:grpSp>
         <p:nvGrpSpPr>
-          <p:cNvPr id="364" name="Google Shape;364;p50"/>
+          <p:cNvPr id="371" name="Google Shape;371;p51"/>
           <p:cNvGrpSpPr/>
           <p:nvPr/>
         </p:nvGrpSpPr>
@@ -23858,7 +24554,7 @@
         </p:grpSpPr>
         <p:pic>
           <p:nvPicPr>
-            <p:cNvPr id="365" name="Google Shape;365;p50"/>
+            <p:cNvPr id="372" name="Google Shape;372;p51"/>
             <p:cNvPicPr preferRelativeResize="0"/>
             <p:nvPr/>
           </p:nvPicPr>
@@ -23886,7 +24582,7 @@
         </p:pic>
         <p:pic>
           <p:nvPicPr>
-            <p:cNvPr id="366" name="Google Shape;366;p50"/>
+            <p:cNvPr id="373" name="Google Shape;373;p51"/>
             <p:cNvPicPr preferRelativeResize="0"/>
             <p:nvPr/>
           </p:nvPicPr>
@@ -23921,87 +24617,6 @@
 </p:sld>
 </file>
 
-<file path=ppt/slides/slide39.xml><?xml version="1.0" encoding="utf-8"?>
-<p:sld xmlns:a="http://schemas.openxmlformats.org/drawingml/2006/main" xmlns:r="http://schemas.openxmlformats.org/officeDocument/2006/relationships" xmlns:mc="http://schemas.openxmlformats.org/markup-compatibility/2006" xmlns:mv="urn:schemas-microsoft-com:mac:vml" xmlns:p="http://schemas.openxmlformats.org/presentationml/2006/main" xmlns:c="http://schemas.openxmlformats.org/drawingml/2006/chart" xmlns:dgm="http://schemas.openxmlformats.org/drawingml/2006/diagram" xmlns:o="urn:schemas-microsoft-com:office:office" xmlns:v="urn:schemas-microsoft-com:vml" xmlns:pvml="urn:schemas-microsoft-com:office:powerpoint" xmlns:com="http://schemas.openxmlformats.org/drawingml/2006/compatibility" xmlns:p14="http://schemas.microsoft.com/office/powerpoint/2010/main" xmlns:p15="http://schemas.microsoft.com/office/powerpoint/2012/main">
-  <p:cSld>
-    <p:spTree>
-      <p:nvGrpSpPr>
-        <p:cNvPr id="370" name="Shape 370"/>
-        <p:cNvGrpSpPr/>
-        <p:nvPr/>
-      </p:nvGrpSpPr>
-      <p:grpSpPr>
-        <a:xfrm>
-          <a:off x="0" y="0"/>
-          <a:ext cx="0" cy="0"/>
-          <a:chOff x="0" y="0"/>
-          <a:chExt cx="0" cy="0"/>
-        </a:xfrm>
-      </p:grpSpPr>
-      <p:sp>
-        <p:nvSpPr>
-          <p:cNvPr id="371" name="Google Shape;371;p51"/>
-          <p:cNvSpPr txBox="1"/>
-          <p:nvPr>
-            <p:ph type="title"/>
-          </p:nvPr>
-        </p:nvSpPr>
-        <p:spPr>
-          <a:xfrm>
-            <a:off x="671250" y="2141250"/>
-            <a:ext cx="7852200" cy="861000"/>
-          </a:xfrm>
-          <a:prstGeom prst="rect">
-            <a:avLst/>
-          </a:prstGeom>
-        </p:spPr>
-        <p:txBody>
-          <a:bodyPr anchorCtr="0" anchor="ctr" bIns="91425" lIns="91425" spcFirstLastPara="1" rIns="91425" wrap="square" tIns="91425">
-            <a:noAutofit/>
-          </a:bodyPr>
-          <a:lstStyle/>
-          <a:p>
-            <a:pPr indent="0" lvl="0" marL="0" rtl="0" algn="ctr">
-              <a:spcBef>
-                <a:spcPts val="0"/>
-              </a:spcBef>
-              <a:spcAft>
-                <a:spcPts val="0"/>
-              </a:spcAft>
-              <a:buNone/>
-            </a:pPr>
-            <a:r>
-              <a:rPr lang="en-GB"/>
-              <a:t>Demo:</a:t>
-            </a:r>
-            <a:endParaRPr/>
-          </a:p>
-          <a:p>
-            <a:pPr indent="0" lvl="0" marL="0" rtl="0" algn="ctr">
-              <a:spcBef>
-                <a:spcPts val="0"/>
-              </a:spcBef>
-              <a:spcAft>
-                <a:spcPts val="0"/>
-              </a:spcAft>
-              <a:buNone/>
-            </a:pPr>
-            <a:r>
-              <a:rPr lang="en-GB"/>
-              <a:t>Conjugate Priors</a:t>
-            </a:r>
-            <a:endParaRPr/>
-          </a:p>
-        </p:txBody>
-      </p:sp>
-    </p:spTree>
-  </p:cSld>
-  <p:clrMapOvr>
-    <a:masterClrMapping/>
-  </p:clrMapOvr>
-</p:sld>
-</file>
-
 <file path=ppt/slides/slide4.xml><?xml version="1.0" encoding="utf-8"?>
 <p:sld xmlns:a="http://schemas.openxmlformats.org/drawingml/2006/main" xmlns:r="http://schemas.openxmlformats.org/officeDocument/2006/relationships" xmlns:mc="http://schemas.openxmlformats.org/markup-compatibility/2006" xmlns:mv="urn:schemas-microsoft-com:mac:vml" xmlns:p="http://schemas.openxmlformats.org/presentationml/2006/main" xmlns:c="http://schemas.openxmlformats.org/drawingml/2006/chart" xmlns:dgm="http://schemas.openxmlformats.org/drawingml/2006/diagram" xmlns:o="urn:schemas-microsoft-com:office:office" xmlns:v="urn:schemas-microsoft-com:vml" xmlns:pvml="urn:schemas-microsoft-com:office:powerpoint" xmlns:com="http://schemas.openxmlformats.org/drawingml/2006/compatibility" xmlns:p14="http://schemas.microsoft.com/office/powerpoint/2010/main" xmlns:p15="http://schemas.microsoft.com/office/powerpoint/2012/main">
   <p:cSld>
@@ -24293,7 +24908,7 @@
   <p:cSld>
     <p:spTree>
       <p:nvGrpSpPr>
-        <p:cNvPr id="375" name="Shape 375"/>
+        <p:cNvPr id="377" name="Shape 377"/>
         <p:cNvGrpSpPr/>
         <p:nvPr/>
       </p:nvGrpSpPr>
@@ -24307,7 +24922,7 @@
       </p:grpSpPr>
       <p:sp>
         <p:nvSpPr>
-          <p:cNvPr id="376" name="Google Shape;376;p52"/>
+          <p:cNvPr id="378" name="Google Shape;378;p52"/>
           <p:cNvSpPr txBox="1"/>
           <p:nvPr>
             <p:ph type="title"/>
@@ -24339,7 +24954,7 @@
             </a:pPr>
             <a:r>
               <a:rPr lang="en-GB"/>
-              <a:t>Foreshadow: MCMC</a:t>
+              <a:t>Posteriors - What Now?</a:t>
             </a:r>
             <a:endParaRPr/>
           </a:p>
@@ -24347,7 +24962,7 @@
       </p:sp>
       <p:sp>
         <p:nvSpPr>
-          <p:cNvPr id="377" name="Google Shape;377;p52"/>
+          <p:cNvPr id="379" name="Google Shape;379;p52"/>
           <p:cNvSpPr txBox="1"/>
           <p:nvPr>
             <p:ph idx="1" type="body"/>
@@ -24356,19 +24971,22 @@
         <p:spPr>
           <a:xfrm>
             <a:off x="311700" y="1152475"/>
-            <a:ext cx="8520600" cy="3416400"/>
+            <a:ext cx="4260300" cy="3416400"/>
           </a:xfrm>
           <a:prstGeom prst="rect">
             <a:avLst/>
           </a:prstGeom>
         </p:spPr>
         <p:txBody>
-          <a:bodyPr anchorCtr="0" anchor="t" bIns="91425" lIns="91425" spcFirstLastPara="1" rIns="91425" wrap="square" tIns="91425">
+          <a:bodyPr anchorCtr="0" anchor="ctr" bIns="91425" lIns="91425" spcFirstLastPara="1" rIns="91425" wrap="square" tIns="91425">
             <a:noAutofit/>
           </a:bodyPr>
           <a:lstStyle/>
           <a:p>
             <a:pPr indent="-342900" lvl="0" marL="457200" rtl="0" algn="l">
+              <a:lnSpc>
+                <a:spcPct val="100000"/>
+              </a:lnSpc>
               <a:spcBef>
                 <a:spcPts val="0"/>
               </a:spcBef>
@@ -24380,12 +24998,80 @@
             </a:pPr>
             <a:r>
               <a:rPr lang="en-GB"/>
-              <a:t>Integrating is hard</a:t>
+              <a:t>Estimation of Parameters</a:t>
+            </a:r>
+            <a:endParaRPr/>
+          </a:p>
+          <a:p>
+            <a:pPr indent="-342900" lvl="0" marL="457200" rtl="0" algn="l">
+              <a:lnSpc>
+                <a:spcPct val="100000"/>
+              </a:lnSpc>
+              <a:spcBef>
+                <a:spcPts val="0"/>
+              </a:spcBef>
+              <a:spcAft>
+                <a:spcPts val="0"/>
+              </a:spcAft>
+              <a:buSzPts val="1800"/>
+              <a:buChar char="●"/>
+            </a:pPr>
+            <a:r>
+              <a:rPr lang="en-GB"/>
+              <a:t>Credible Intervals</a:t>
+            </a:r>
+            <a:endParaRPr/>
+          </a:p>
+          <a:p>
+            <a:pPr indent="-342900" lvl="0" marL="457200" rtl="0" algn="l">
+              <a:lnSpc>
+                <a:spcPct val="100000"/>
+              </a:lnSpc>
+              <a:spcBef>
+                <a:spcPts val="0"/>
+              </a:spcBef>
+              <a:spcAft>
+                <a:spcPts val="0"/>
+              </a:spcAft>
+              <a:buSzPts val="1800"/>
+              <a:buChar char="●"/>
+            </a:pPr>
+            <a:r>
+              <a:rPr lang="en-GB"/>
+              <a:t>Check priors</a:t>
             </a:r>
             <a:endParaRPr/>
           </a:p>
         </p:txBody>
       </p:sp>
+      <p:pic>
+        <p:nvPicPr>
+          <p:cNvPr id="380" name="Google Shape;380;p52"/>
+          <p:cNvPicPr preferRelativeResize="0"/>
+          <p:nvPr/>
+        </p:nvPicPr>
+        <p:blipFill>
+          <a:blip r:embed="rId3">
+            <a:alphaModFix/>
+          </a:blip>
+          <a:stretch>
+            <a:fillRect/>
+          </a:stretch>
+        </p:blipFill>
+        <p:spPr>
+          <a:xfrm>
+            <a:off x="4572001" y="2311275"/>
+            <a:ext cx="4260301" cy="485280"/>
+          </a:xfrm>
+          <a:prstGeom prst="rect">
+            <a:avLst/>
+          </a:prstGeom>
+          <a:noFill/>
+          <a:ln>
+            <a:noFill/>
+          </a:ln>
+        </p:spPr>
+      </p:pic>
     </p:spTree>
   </p:cSld>
   <p:clrMapOvr>
@@ -24399,7 +25085,7 @@
   <p:cSld>
     <p:spTree>
       <p:nvGrpSpPr>
-        <p:cNvPr id="381" name="Shape 381"/>
+        <p:cNvPr id="384" name="Shape 384"/>
         <p:cNvGrpSpPr/>
         <p:nvPr/>
       </p:nvGrpSpPr>
@@ -24413,7 +25099,7 @@
       </p:grpSpPr>
       <p:sp>
         <p:nvSpPr>
-          <p:cNvPr id="382" name="Google Shape;382;p53"/>
+          <p:cNvPr id="385" name="Google Shape;385;p53"/>
           <p:cNvSpPr txBox="1"/>
           <p:nvPr>
             <p:ph type="title"/>
@@ -24421,20 +25107,20 @@
         </p:nvSpPr>
         <p:spPr>
           <a:xfrm>
-            <a:off x="311700" y="445025"/>
-            <a:ext cx="8520600" cy="572700"/>
+            <a:off x="671250" y="2141250"/>
+            <a:ext cx="7852200" cy="861000"/>
           </a:xfrm>
           <a:prstGeom prst="rect">
             <a:avLst/>
           </a:prstGeom>
         </p:spPr>
         <p:txBody>
-          <a:bodyPr anchorCtr="0" anchor="t" bIns="91425" lIns="91425" spcFirstLastPara="1" rIns="91425" wrap="square" tIns="91425">
+          <a:bodyPr anchorCtr="0" anchor="ctr" bIns="91425" lIns="91425" spcFirstLastPara="1" rIns="91425" wrap="square" tIns="91425">
             <a:noAutofit/>
           </a:bodyPr>
           <a:lstStyle/>
           <a:p>
-            <a:pPr indent="0" lvl="0" marL="0" rtl="0" algn="l">
+            <a:pPr indent="0" lvl="0" marL="0" rtl="0" algn="ctr">
               <a:spcBef>
                 <a:spcPts val="0"/>
               </a:spcBef>
@@ -24445,46 +25131,23 @@
             </a:pPr>
             <a:r>
               <a:rPr lang="en-GB"/>
-              <a:t>Conclusion and “Call to Action”</a:t>
+              <a:t>Demo:</a:t>
             </a:r>
             <a:endParaRPr/>
           </a:p>
-        </p:txBody>
-      </p:sp>
-      <p:sp>
-        <p:nvSpPr>
-          <p:cNvPr id="383" name="Google Shape;383;p53"/>
-          <p:cNvSpPr txBox="1"/>
-          <p:nvPr>
-            <p:ph idx="1" type="body"/>
-          </p:nvPr>
-        </p:nvSpPr>
-        <p:spPr>
-          <a:xfrm>
-            <a:off x="311700" y="1152475"/>
-            <a:ext cx="8520600" cy="3416400"/>
-          </a:xfrm>
-          <a:prstGeom prst="rect">
-            <a:avLst/>
-          </a:prstGeom>
-        </p:spPr>
-        <p:txBody>
-          <a:bodyPr anchorCtr="0" anchor="t" bIns="91425" lIns="91425" spcFirstLastPara="1" rIns="91425" wrap="square" tIns="91425">
-            <a:noAutofit/>
-          </a:bodyPr>
-          <a:lstStyle/>
-          <a:p>
-            <a:pPr indent="0" lvl="0" marL="0" rtl="0" algn="l">
-              <a:spcBef>
-                <a:spcPts val="0"/>
-              </a:spcBef>
-              <a:spcAft>
-                <a:spcPts val="1600"/>
-              </a:spcAft>
-              <a:buNone/>
-            </a:pPr>
-            <a:r>
-              <a:t/>
+          <a:p>
+            <a:pPr indent="0" lvl="0" marL="0" rtl="0" algn="ctr">
+              <a:spcBef>
+                <a:spcPts val="0"/>
+              </a:spcBef>
+              <a:spcAft>
+                <a:spcPts val="0"/>
+              </a:spcAft>
+              <a:buNone/>
+            </a:pPr>
+            <a:r>
+              <a:rPr lang="en-GB"/>
+              <a:t>Conjugate Priors</a:t>
             </a:r>
             <a:endParaRPr/>
           </a:p>
@@ -24503,7 +25166,7 @@
   <p:cSld>
     <p:spTree>
       <p:nvGrpSpPr>
-        <p:cNvPr id="387" name="Shape 387"/>
+        <p:cNvPr id="389" name="Shape 389"/>
         <p:cNvGrpSpPr/>
         <p:nvPr/>
       </p:nvGrpSpPr>
@@ -24517,7 +25180,7 @@
       </p:grpSpPr>
       <p:sp>
         <p:nvSpPr>
-          <p:cNvPr id="388" name="Google Shape;388;p54"/>
+          <p:cNvPr id="390" name="Google Shape;390;p54"/>
           <p:cNvSpPr txBox="1"/>
           <p:nvPr>
             <p:ph type="title"/>
@@ -24538,7 +25201,7 @@
           </a:bodyPr>
           <a:lstStyle/>
           <a:p>
-            <a:pPr indent="0" lvl="0" marL="0" rtl="0" algn="ctr">
+            <a:pPr indent="0" lvl="0" marL="0" rtl="0" algn="l">
               <a:spcBef>
                 <a:spcPts val="0"/>
               </a:spcBef>
@@ -24549,7 +25212,7 @@
             </a:pPr>
             <a:r>
               <a:rPr lang="en-GB"/>
-              <a:t>Find Slides on Github</a:t>
+              <a:t>Foreshadow: MCMC</a:t>
             </a:r>
             <a:endParaRPr/>
           </a:p>
@@ -24557,7 +25220,7 @@
       </p:sp>
       <p:sp>
         <p:nvSpPr>
-          <p:cNvPr id="389" name="Google Shape;389;p54"/>
+          <p:cNvPr id="391" name="Google Shape;391;p54"/>
           <p:cNvSpPr txBox="1"/>
           <p:nvPr>
             <p:ph idx="1" type="body"/>
@@ -24566,7 +25229,7 @@
         <p:spPr>
           <a:xfrm>
             <a:off x="311700" y="1152475"/>
-            <a:ext cx="3999900" cy="3416400"/>
+            <a:ext cx="8520600" cy="3416400"/>
           </a:xfrm>
           <a:prstGeom prst="rect">
             <a:avLst/>
@@ -24578,82 +25241,24 @@
           </a:bodyPr>
           <a:lstStyle/>
           <a:p>
-            <a:pPr indent="0" lvl="0" marL="0" rtl="0" algn="ctr">
-              <a:lnSpc>
-                <a:spcPct val="100000"/>
-              </a:lnSpc>
-              <a:spcBef>
-                <a:spcPts val="0"/>
-              </a:spcBef>
-              <a:spcAft>
-                <a:spcPts val="0"/>
-              </a:spcAft>
-              <a:buNone/>
-            </a:pPr>
-            <a:r>
-              <a:rPr lang="en-GB" sz="2100"/>
-              <a:t>https://cutt.ly/zGqux9</a:t>
+            <a:pPr indent="-342900" lvl="0" marL="457200" rtl="0" algn="l">
+              <a:spcBef>
+                <a:spcPts val="0"/>
+              </a:spcBef>
+              <a:spcAft>
+                <a:spcPts val="0"/>
+              </a:spcAft>
+              <a:buSzPts val="1800"/>
+              <a:buChar char="●"/>
+            </a:pPr>
+            <a:r>
+              <a:rPr lang="en-GB"/>
+              <a:t>Integrating is hard</a:t>
             </a:r>
             <a:endParaRPr/>
           </a:p>
         </p:txBody>
       </p:sp>
-      <p:pic>
-        <p:nvPicPr>
-          <p:cNvPr id="390" name="Google Shape;390;p54"/>
-          <p:cNvPicPr preferRelativeResize="0"/>
-          <p:nvPr/>
-        </p:nvPicPr>
-        <p:blipFill>
-          <a:blip r:embed="rId3">
-            <a:alphaModFix/>
-          </a:blip>
-          <a:stretch>
-            <a:fillRect/>
-          </a:stretch>
-        </p:blipFill>
-        <p:spPr>
-          <a:xfrm>
-            <a:off x="1123725" y="1870900"/>
-            <a:ext cx="2375850" cy="2375850"/>
-          </a:xfrm>
-          <a:prstGeom prst="rect">
-            <a:avLst/>
-          </a:prstGeom>
-          <a:noFill/>
-          <a:ln>
-            <a:noFill/>
-          </a:ln>
-        </p:spPr>
-      </p:pic>
-      <p:pic>
-        <p:nvPicPr>
-          <p:cNvPr id="391" name="Google Shape;391;p54"/>
-          <p:cNvPicPr preferRelativeResize="0"/>
-          <p:nvPr/>
-        </p:nvPicPr>
-        <p:blipFill>
-          <a:blip r:embed="rId4">
-            <a:alphaModFix/>
-          </a:blip>
-          <a:stretch>
-            <a:fillRect/>
-          </a:stretch>
-        </p:blipFill>
-        <p:spPr>
-          <a:xfrm>
-            <a:off x="4471400" y="1474600"/>
-            <a:ext cx="4527602" cy="2772145"/>
-          </a:xfrm>
-          <a:prstGeom prst="rect">
-            <a:avLst/>
-          </a:prstGeom>
-          <a:noFill/>
-          <a:ln>
-            <a:noFill/>
-          </a:ln>
-        </p:spPr>
-      </p:pic>
     </p:spTree>
   </p:cSld>
   <p:clrMapOvr>
@@ -24684,6 +25289,956 @@
           <p:cNvPr id="396" name="Google Shape;396;p55"/>
           <p:cNvSpPr txBox="1"/>
           <p:nvPr>
+            <p:ph idx="1" type="body"/>
+          </p:nvPr>
+        </p:nvSpPr>
+        <p:spPr>
+          <a:xfrm>
+            <a:off x="348700" y="2849250"/>
+            <a:ext cx="8520600" cy="1737600"/>
+          </a:xfrm>
+          <a:prstGeom prst="rect">
+            <a:avLst/>
+          </a:prstGeom>
+        </p:spPr>
+        <p:txBody>
+          <a:bodyPr anchorCtr="0" anchor="t" bIns="91425" lIns="91425" spcFirstLastPara="1" rIns="91425" wrap="square" tIns="91425">
+            <a:noAutofit/>
+          </a:bodyPr>
+          <a:lstStyle/>
+          <a:p>
+            <a:pPr indent="-342900" lvl="0" marL="457200" rtl="0" algn="l">
+              <a:spcBef>
+                <a:spcPts val="0"/>
+              </a:spcBef>
+              <a:spcAft>
+                <a:spcPts val="0"/>
+              </a:spcAft>
+              <a:buSzPts val="1800"/>
+              <a:buChar char="●"/>
+            </a:pPr>
+            <a:r>
+              <a:rPr lang="en-GB"/>
+              <a:t>Disadvantages</a:t>
+            </a:r>
+            <a:endParaRPr/>
+          </a:p>
+          <a:p>
+            <a:pPr indent="-317500" lvl="1" marL="914400" rtl="0" algn="l">
+              <a:spcBef>
+                <a:spcPts val="0"/>
+              </a:spcBef>
+              <a:spcAft>
+                <a:spcPts val="0"/>
+              </a:spcAft>
+              <a:buSzPts val="1400"/>
+              <a:buChar char="○"/>
+            </a:pPr>
+            <a:r>
+              <a:rPr lang="en-GB"/>
+              <a:t>Steeper learning curve</a:t>
+            </a:r>
+            <a:endParaRPr/>
+          </a:p>
+          <a:p>
+            <a:pPr indent="-317500" lvl="1" marL="914400" rtl="0" algn="l">
+              <a:spcBef>
+                <a:spcPts val="0"/>
+              </a:spcBef>
+              <a:spcAft>
+                <a:spcPts val="0"/>
+              </a:spcAft>
+              <a:buSzPts val="1400"/>
+              <a:buChar char="○"/>
+            </a:pPr>
+            <a:r>
+              <a:rPr lang="en-GB"/>
+              <a:t>Mathematics can be difficult in continuous case</a:t>
+            </a:r>
+            <a:endParaRPr/>
+          </a:p>
+          <a:p>
+            <a:pPr indent="-317500" lvl="1" marL="914400" rtl="0" algn="l">
+              <a:spcBef>
+                <a:spcPts val="0"/>
+              </a:spcBef>
+              <a:spcAft>
+                <a:spcPts val="0"/>
+              </a:spcAft>
+              <a:buSzPts val="1400"/>
+              <a:buChar char="○"/>
+            </a:pPr>
+            <a:r>
+              <a:rPr lang="en-GB"/>
+              <a:t>Workarounds can be computationally expensive</a:t>
+            </a:r>
+            <a:endParaRPr/>
+          </a:p>
+          <a:p>
+            <a:pPr indent="-317500" lvl="1" marL="914400" rtl="0" algn="l">
+              <a:spcBef>
+                <a:spcPts val="0"/>
+              </a:spcBef>
+              <a:spcAft>
+                <a:spcPts val="0"/>
+              </a:spcAft>
+              <a:buSzPts val="1400"/>
+              <a:buChar char="○"/>
+            </a:pPr>
+            <a:r>
+              <a:rPr lang="en-GB"/>
+              <a:t>Criticisms of being less “objective”</a:t>
+            </a:r>
+            <a:endParaRPr/>
+          </a:p>
+          <a:p>
+            <a:pPr indent="-317500" lvl="1" marL="914400" rtl="0" algn="l">
+              <a:spcBef>
+                <a:spcPts val="0"/>
+              </a:spcBef>
+              <a:spcAft>
+                <a:spcPts val="0"/>
+              </a:spcAft>
+              <a:buSzPts val="1400"/>
+              <a:buChar char="○"/>
+            </a:pPr>
+            <a:r>
+              <a:rPr lang="en-GB"/>
+              <a:t>Estimations become the same as frequentist estimations with high sample sizes (redundant)</a:t>
+            </a:r>
+            <a:endParaRPr/>
+          </a:p>
+        </p:txBody>
+      </p:sp>
+      <p:sp>
+        <p:nvSpPr>
+          <p:cNvPr id="397" name="Google Shape;397;p55"/>
+          <p:cNvSpPr txBox="1"/>
+          <p:nvPr>
+            <p:ph type="title"/>
+          </p:nvPr>
+        </p:nvSpPr>
+        <p:spPr>
+          <a:xfrm>
+            <a:off x="311700" y="445025"/>
+            <a:ext cx="8520600" cy="572700"/>
+          </a:xfrm>
+          <a:prstGeom prst="rect">
+            <a:avLst/>
+          </a:prstGeom>
+        </p:spPr>
+        <p:txBody>
+          <a:bodyPr anchorCtr="0" anchor="t" bIns="91425" lIns="91425" spcFirstLastPara="1" rIns="91425" wrap="square" tIns="91425">
+            <a:noAutofit/>
+          </a:bodyPr>
+          <a:lstStyle/>
+          <a:p>
+            <a:pPr indent="0" lvl="0" marL="0" rtl="0" algn="l">
+              <a:spcBef>
+                <a:spcPts val="0"/>
+              </a:spcBef>
+              <a:spcAft>
+                <a:spcPts val="0"/>
+              </a:spcAft>
+              <a:buNone/>
+            </a:pPr>
+            <a:r>
+              <a:rPr lang="en-GB"/>
+              <a:t>Bayesian</a:t>
+            </a:r>
+            <a:r>
+              <a:rPr lang="en-GB"/>
+              <a:t> Stats</a:t>
+            </a:r>
+            <a:endParaRPr/>
+          </a:p>
+        </p:txBody>
+      </p:sp>
+      <p:sp>
+        <p:nvSpPr>
+          <p:cNvPr id="398" name="Google Shape;398;p55"/>
+          <p:cNvSpPr txBox="1"/>
+          <p:nvPr>
+            <p:ph idx="1" type="body"/>
+          </p:nvPr>
+        </p:nvSpPr>
+        <p:spPr>
+          <a:xfrm>
+            <a:off x="311700" y="1111650"/>
+            <a:ext cx="8520600" cy="1737600"/>
+          </a:xfrm>
+          <a:prstGeom prst="rect">
+            <a:avLst/>
+          </a:prstGeom>
+        </p:spPr>
+        <p:txBody>
+          <a:bodyPr anchorCtr="0" anchor="t" bIns="91425" lIns="91425" spcFirstLastPara="1" rIns="91425" wrap="square" tIns="91425">
+            <a:noAutofit/>
+          </a:bodyPr>
+          <a:lstStyle/>
+          <a:p>
+            <a:pPr indent="-342900" lvl="0" marL="457200" rtl="0" algn="l">
+              <a:spcBef>
+                <a:spcPts val="0"/>
+              </a:spcBef>
+              <a:spcAft>
+                <a:spcPts val="0"/>
+              </a:spcAft>
+              <a:buSzPts val="1800"/>
+              <a:buChar char="●"/>
+            </a:pPr>
+            <a:r>
+              <a:rPr lang="en-GB"/>
+              <a:t>Advantages</a:t>
+            </a:r>
+            <a:endParaRPr/>
+          </a:p>
+          <a:p>
+            <a:pPr indent="-317500" lvl="1" marL="914400" rtl="0" algn="l">
+              <a:spcBef>
+                <a:spcPts val="0"/>
+              </a:spcBef>
+              <a:spcAft>
+                <a:spcPts val="0"/>
+              </a:spcAft>
+              <a:buSzPts val="1400"/>
+              <a:buChar char="○"/>
+            </a:pPr>
+            <a:r>
+              <a:rPr lang="en-GB"/>
+              <a:t>Incorporation of Domain Knowledge</a:t>
+            </a:r>
+            <a:endParaRPr/>
+          </a:p>
+          <a:p>
+            <a:pPr indent="-317500" lvl="1" marL="914400" rtl="0" algn="l">
+              <a:spcBef>
+                <a:spcPts val="0"/>
+              </a:spcBef>
+              <a:spcAft>
+                <a:spcPts val="0"/>
+              </a:spcAft>
+              <a:buSzPts val="1400"/>
+              <a:buChar char="○"/>
+            </a:pPr>
+            <a:r>
+              <a:rPr lang="en-GB"/>
+              <a:t>Estimation in the case of little data (specific circumstances)</a:t>
+            </a:r>
+            <a:endParaRPr/>
+          </a:p>
+          <a:p>
+            <a:pPr indent="-317500" lvl="1" marL="914400" rtl="0" algn="l">
+              <a:spcBef>
+                <a:spcPts val="0"/>
+              </a:spcBef>
+              <a:spcAft>
+                <a:spcPts val="0"/>
+              </a:spcAft>
+              <a:buSzPts val="1400"/>
+              <a:buChar char="○"/>
+            </a:pPr>
+            <a:r>
+              <a:rPr lang="en-GB"/>
+              <a:t>Allows for models of as little or high complexity as necessary</a:t>
+            </a:r>
+            <a:endParaRPr/>
+          </a:p>
+          <a:p>
+            <a:pPr indent="-317500" lvl="1" marL="914400" rtl="0" algn="l">
+              <a:spcBef>
+                <a:spcPts val="0"/>
+              </a:spcBef>
+              <a:spcAft>
+                <a:spcPts val="0"/>
+              </a:spcAft>
+              <a:buSzPts val="1400"/>
+              <a:buChar char="○"/>
+            </a:pPr>
+            <a:r>
+              <a:rPr lang="en-GB"/>
+              <a:t>Parameters are distributions</a:t>
+            </a:r>
+            <a:endParaRPr/>
+          </a:p>
+          <a:p>
+            <a:pPr indent="-317500" lvl="1" marL="914400" rtl="0" algn="l">
+              <a:spcBef>
+                <a:spcPts val="0"/>
+              </a:spcBef>
+              <a:spcAft>
+                <a:spcPts val="0"/>
+              </a:spcAft>
+              <a:buSzPts val="1400"/>
+              <a:buChar char="○"/>
+            </a:pPr>
+            <a:r>
+              <a:rPr lang="en-GB"/>
+              <a:t>Easier to communicate</a:t>
+            </a:r>
+            <a:endParaRPr/>
+          </a:p>
+        </p:txBody>
+      </p:sp>
+    </p:spTree>
+  </p:cSld>
+  <p:clrMapOvr>
+    <a:masterClrMapping/>
+  </p:clrMapOvr>
+</p:sld>
+</file>
+
+<file path=ppt/slides/slide44.xml><?xml version="1.0" encoding="utf-8"?>
+<p:sld xmlns:a="http://schemas.openxmlformats.org/drawingml/2006/main" xmlns:r="http://schemas.openxmlformats.org/officeDocument/2006/relationships" xmlns:mc="http://schemas.openxmlformats.org/markup-compatibility/2006" xmlns:mv="urn:schemas-microsoft-com:mac:vml" xmlns:p="http://schemas.openxmlformats.org/presentationml/2006/main" xmlns:c="http://schemas.openxmlformats.org/drawingml/2006/chart" xmlns:dgm="http://schemas.openxmlformats.org/drawingml/2006/diagram" xmlns:o="urn:schemas-microsoft-com:office:office" xmlns:v="urn:schemas-microsoft-com:vml" xmlns:pvml="urn:schemas-microsoft-com:office:powerpoint" xmlns:com="http://schemas.openxmlformats.org/drawingml/2006/compatibility" xmlns:p14="http://schemas.microsoft.com/office/powerpoint/2010/main" xmlns:p15="http://schemas.microsoft.com/office/powerpoint/2012/main">
+  <p:cSld>
+    <p:spTree>
+      <p:nvGrpSpPr>
+        <p:cNvPr id="402" name="Shape 402"/>
+        <p:cNvGrpSpPr/>
+        <p:nvPr/>
+      </p:nvGrpSpPr>
+      <p:grpSpPr>
+        <a:xfrm>
+          <a:off x="0" y="0"/>
+          <a:ext cx="0" cy="0"/>
+          <a:chOff x="0" y="0"/>
+          <a:chExt cx="0" cy="0"/>
+        </a:xfrm>
+      </p:grpSpPr>
+      <p:sp>
+        <p:nvSpPr>
+          <p:cNvPr id="403" name="Google Shape;403;p56"/>
+          <p:cNvSpPr txBox="1"/>
+          <p:nvPr>
+            <p:ph type="title"/>
+          </p:nvPr>
+        </p:nvSpPr>
+        <p:spPr>
+          <a:xfrm>
+            <a:off x="311700" y="445025"/>
+            <a:ext cx="8520600" cy="572700"/>
+          </a:xfrm>
+          <a:prstGeom prst="rect">
+            <a:avLst/>
+          </a:prstGeom>
+        </p:spPr>
+        <p:txBody>
+          <a:bodyPr anchorCtr="0" anchor="t" bIns="91425" lIns="91425" spcFirstLastPara="1" rIns="91425" wrap="square" tIns="91425">
+            <a:noAutofit/>
+          </a:bodyPr>
+          <a:lstStyle/>
+          <a:p>
+            <a:pPr indent="0" lvl="0" marL="0" rtl="0" algn="l">
+              <a:spcBef>
+                <a:spcPts val="0"/>
+              </a:spcBef>
+              <a:spcAft>
+                <a:spcPts val="0"/>
+              </a:spcAft>
+              <a:buNone/>
+            </a:pPr>
+            <a:r>
+              <a:rPr lang="en-GB"/>
+              <a:t>Conclusion and “Call to Action”</a:t>
+            </a:r>
+            <a:endParaRPr/>
+          </a:p>
+        </p:txBody>
+      </p:sp>
+      <p:sp>
+        <p:nvSpPr>
+          <p:cNvPr id="404" name="Google Shape;404;p56"/>
+          <p:cNvSpPr txBox="1"/>
+          <p:nvPr>
+            <p:ph idx="1" type="body"/>
+          </p:nvPr>
+        </p:nvSpPr>
+        <p:spPr>
+          <a:xfrm>
+            <a:off x="311700" y="1152475"/>
+            <a:ext cx="8520600" cy="3416400"/>
+          </a:xfrm>
+          <a:prstGeom prst="rect">
+            <a:avLst/>
+          </a:prstGeom>
+        </p:spPr>
+        <p:txBody>
+          <a:bodyPr anchorCtr="0" anchor="t" bIns="91425" lIns="91425" spcFirstLastPara="1" rIns="91425" wrap="square" tIns="91425">
+            <a:noAutofit/>
+          </a:bodyPr>
+          <a:lstStyle/>
+          <a:p>
+            <a:pPr indent="-342900" lvl="0" marL="457200" rtl="0" algn="l">
+              <a:spcBef>
+                <a:spcPts val="0"/>
+              </a:spcBef>
+              <a:spcAft>
+                <a:spcPts val="0"/>
+              </a:spcAft>
+              <a:buSzPts val="1800"/>
+              <a:buChar char="●"/>
+            </a:pPr>
+            <a:r>
+              <a:rPr lang="en-GB"/>
+              <a:t>Remember differences between F and B to understand both</a:t>
+            </a:r>
+            <a:endParaRPr/>
+          </a:p>
+          <a:p>
+            <a:pPr indent="-342900" lvl="0" marL="457200" rtl="0" algn="l">
+              <a:spcBef>
+                <a:spcPts val="0"/>
+              </a:spcBef>
+              <a:spcAft>
+                <a:spcPts val="0"/>
+              </a:spcAft>
+              <a:buSzPts val="1800"/>
+              <a:buChar char="●"/>
+            </a:pPr>
+            <a:r>
+              <a:rPr lang="en-GB"/>
+              <a:t>Understand that it’s not as difficult as it looks</a:t>
+            </a:r>
+            <a:endParaRPr/>
+          </a:p>
+          <a:p>
+            <a:pPr indent="-342900" lvl="0" marL="457200" rtl="0" algn="l">
+              <a:spcBef>
+                <a:spcPts val="0"/>
+              </a:spcBef>
+              <a:spcAft>
+                <a:spcPts val="0"/>
+              </a:spcAft>
+              <a:buSzPts val="1800"/>
+              <a:buChar char="●"/>
+            </a:pPr>
+            <a:r>
+              <a:rPr lang="en-GB"/>
+              <a:t>Practice makes perfect</a:t>
+            </a:r>
+            <a:endParaRPr/>
+          </a:p>
+          <a:p>
+            <a:pPr indent="-342900" lvl="0" marL="457200" rtl="0" algn="l">
+              <a:spcBef>
+                <a:spcPts val="0"/>
+              </a:spcBef>
+              <a:spcAft>
+                <a:spcPts val="0"/>
+              </a:spcAft>
+              <a:buSzPts val="1800"/>
+              <a:buChar char="●"/>
+            </a:pPr>
+            <a:r>
+              <a:rPr lang="en-GB"/>
+              <a:t>Sources to get started</a:t>
+            </a:r>
+            <a:endParaRPr/>
+          </a:p>
+          <a:p>
+            <a:pPr indent="-342900" lvl="0" marL="457200" rtl="0" algn="l">
+              <a:spcBef>
+                <a:spcPts val="0"/>
+              </a:spcBef>
+              <a:spcAft>
+                <a:spcPts val="0"/>
+              </a:spcAft>
+              <a:buSzPts val="1800"/>
+              <a:buChar char="●"/>
+            </a:pPr>
+            <a:r>
+              <a:rPr lang="en-GB"/>
+              <a:t>Remember when you should consider it</a:t>
+            </a:r>
+            <a:endParaRPr/>
+          </a:p>
+          <a:p>
+            <a:pPr indent="-342900" lvl="0" marL="457200" rtl="0" algn="l">
+              <a:spcBef>
+                <a:spcPts val="0"/>
+              </a:spcBef>
+              <a:spcAft>
+                <a:spcPts val="0"/>
+              </a:spcAft>
+              <a:buSzPts val="1800"/>
+              <a:buChar char="●"/>
+            </a:pPr>
+            <a:r>
+              <a:rPr lang="en-GB"/>
+              <a:t>Might not be necessary</a:t>
+            </a:r>
+            <a:endParaRPr/>
+          </a:p>
+        </p:txBody>
+      </p:sp>
+    </p:spTree>
+  </p:cSld>
+  <p:clrMapOvr>
+    <a:masterClrMapping/>
+  </p:clrMapOvr>
+</p:sld>
+</file>
+
+<file path=ppt/slides/slide45.xml><?xml version="1.0" encoding="utf-8"?>
+<p:sld xmlns:a="http://schemas.openxmlformats.org/drawingml/2006/main" xmlns:r="http://schemas.openxmlformats.org/officeDocument/2006/relationships" xmlns:mc="http://schemas.openxmlformats.org/markup-compatibility/2006" xmlns:mv="urn:schemas-microsoft-com:mac:vml" xmlns:p="http://schemas.openxmlformats.org/presentationml/2006/main" xmlns:c="http://schemas.openxmlformats.org/drawingml/2006/chart" xmlns:dgm="http://schemas.openxmlformats.org/drawingml/2006/diagram" xmlns:o="urn:schemas-microsoft-com:office:office" xmlns:v="urn:schemas-microsoft-com:vml" xmlns:pvml="urn:schemas-microsoft-com:office:powerpoint" xmlns:com="http://schemas.openxmlformats.org/drawingml/2006/compatibility" xmlns:p14="http://schemas.microsoft.com/office/powerpoint/2010/main" xmlns:p15="http://schemas.microsoft.com/office/powerpoint/2012/main">
+  <p:cSld>
+    <p:spTree>
+      <p:nvGrpSpPr>
+        <p:cNvPr id="408" name="Shape 408"/>
+        <p:cNvGrpSpPr/>
+        <p:nvPr/>
+      </p:nvGrpSpPr>
+      <p:grpSpPr>
+        <a:xfrm>
+          <a:off x="0" y="0"/>
+          <a:ext cx="0" cy="0"/>
+          <a:chOff x="0" y="0"/>
+          <a:chExt cx="0" cy="0"/>
+        </a:xfrm>
+      </p:grpSpPr>
+      <p:sp>
+        <p:nvSpPr>
+          <p:cNvPr id="409" name="Google Shape;409;p57"/>
+          <p:cNvSpPr txBox="1"/>
+          <p:nvPr>
+            <p:ph type="title"/>
+          </p:nvPr>
+        </p:nvSpPr>
+        <p:spPr>
+          <a:xfrm>
+            <a:off x="311700" y="445025"/>
+            <a:ext cx="8520600" cy="572700"/>
+          </a:xfrm>
+          <a:prstGeom prst="rect">
+            <a:avLst/>
+          </a:prstGeom>
+        </p:spPr>
+        <p:txBody>
+          <a:bodyPr anchorCtr="0" anchor="t" bIns="91425" lIns="91425" spcFirstLastPara="1" rIns="91425" wrap="square" tIns="91425">
+            <a:noAutofit/>
+          </a:bodyPr>
+          <a:lstStyle/>
+          <a:p>
+            <a:pPr indent="0" lvl="0" marL="0" rtl="0" algn="l">
+              <a:spcBef>
+                <a:spcPts val="0"/>
+              </a:spcBef>
+              <a:spcAft>
+                <a:spcPts val="0"/>
+              </a:spcAft>
+              <a:buNone/>
+            </a:pPr>
+            <a:r>
+              <a:rPr lang="en-GB"/>
+              <a:t>Resources for further learning</a:t>
+            </a:r>
+            <a:endParaRPr/>
+          </a:p>
+        </p:txBody>
+      </p:sp>
+      <p:pic>
+        <p:nvPicPr>
+          <p:cNvPr id="410" name="Google Shape;410;p57"/>
+          <p:cNvPicPr preferRelativeResize="0"/>
+          <p:nvPr/>
+        </p:nvPicPr>
+        <p:blipFill>
+          <a:blip r:embed="rId3">
+            <a:alphaModFix/>
+          </a:blip>
+          <a:stretch>
+            <a:fillRect/>
+          </a:stretch>
+        </p:blipFill>
+        <p:spPr>
+          <a:xfrm>
+            <a:off x="1198238" y="1115475"/>
+            <a:ext cx="6747527" cy="3416400"/>
+          </a:xfrm>
+          <a:prstGeom prst="rect">
+            <a:avLst/>
+          </a:prstGeom>
+          <a:noFill/>
+          <a:ln>
+            <a:noFill/>
+          </a:ln>
+        </p:spPr>
+      </p:pic>
+    </p:spTree>
+  </p:cSld>
+  <p:clrMapOvr>
+    <a:masterClrMapping/>
+  </p:clrMapOvr>
+</p:sld>
+</file>
+
+<file path=ppt/slides/slide46.xml><?xml version="1.0" encoding="utf-8"?>
+<p:sld xmlns:a="http://schemas.openxmlformats.org/drawingml/2006/main" xmlns:r="http://schemas.openxmlformats.org/officeDocument/2006/relationships" xmlns:mc="http://schemas.openxmlformats.org/markup-compatibility/2006" xmlns:mv="urn:schemas-microsoft-com:mac:vml" xmlns:p="http://schemas.openxmlformats.org/presentationml/2006/main" xmlns:c="http://schemas.openxmlformats.org/drawingml/2006/chart" xmlns:dgm="http://schemas.openxmlformats.org/drawingml/2006/diagram" xmlns:o="urn:schemas-microsoft-com:office:office" xmlns:v="urn:schemas-microsoft-com:vml" xmlns:pvml="urn:schemas-microsoft-com:office:powerpoint" xmlns:com="http://schemas.openxmlformats.org/drawingml/2006/compatibility" xmlns:p14="http://schemas.microsoft.com/office/powerpoint/2010/main" xmlns:p15="http://schemas.microsoft.com/office/powerpoint/2012/main">
+  <p:cSld>
+    <p:spTree>
+      <p:nvGrpSpPr>
+        <p:cNvPr id="414" name="Shape 414"/>
+        <p:cNvGrpSpPr/>
+        <p:nvPr/>
+      </p:nvGrpSpPr>
+      <p:grpSpPr>
+        <a:xfrm>
+          <a:off x="0" y="0"/>
+          <a:ext cx="0" cy="0"/>
+          <a:chOff x="0" y="0"/>
+          <a:chExt cx="0" cy="0"/>
+        </a:xfrm>
+      </p:grpSpPr>
+      <p:sp>
+        <p:nvSpPr>
+          <p:cNvPr id="415" name="Google Shape;415;p58"/>
+          <p:cNvSpPr txBox="1"/>
+          <p:nvPr>
+            <p:ph type="title"/>
+          </p:nvPr>
+        </p:nvSpPr>
+        <p:spPr>
+          <a:xfrm>
+            <a:off x="311700" y="445025"/>
+            <a:ext cx="8520600" cy="572700"/>
+          </a:xfrm>
+          <a:prstGeom prst="rect">
+            <a:avLst/>
+          </a:prstGeom>
+        </p:spPr>
+        <p:txBody>
+          <a:bodyPr anchorCtr="0" anchor="t" bIns="91425" lIns="91425" spcFirstLastPara="1" rIns="91425" wrap="square" tIns="91425">
+            <a:noAutofit/>
+          </a:bodyPr>
+          <a:lstStyle/>
+          <a:p>
+            <a:pPr indent="0" lvl="0" marL="0" rtl="0" algn="l">
+              <a:spcBef>
+                <a:spcPts val="0"/>
+              </a:spcBef>
+              <a:spcAft>
+                <a:spcPts val="0"/>
+              </a:spcAft>
+              <a:buNone/>
+            </a:pPr>
+            <a:r>
+              <a:rPr lang="en-GB"/>
+              <a:t>Resources for further learning</a:t>
+            </a:r>
+            <a:endParaRPr/>
+          </a:p>
+          <a:p>
+            <a:pPr indent="0" lvl="0" marL="0" rtl="0" algn="l">
+              <a:spcBef>
+                <a:spcPts val="0"/>
+              </a:spcBef>
+              <a:spcAft>
+                <a:spcPts val="0"/>
+              </a:spcAft>
+              <a:buNone/>
+            </a:pPr>
+            <a:r>
+              <a:t/>
+            </a:r>
+            <a:endParaRPr/>
+          </a:p>
+        </p:txBody>
+      </p:sp>
+      <p:sp>
+        <p:nvSpPr>
+          <p:cNvPr id="416" name="Google Shape;416;p58"/>
+          <p:cNvSpPr txBox="1"/>
+          <p:nvPr>
+            <p:ph idx="1" type="body"/>
+          </p:nvPr>
+        </p:nvSpPr>
+        <p:spPr>
+          <a:xfrm>
+            <a:off x="311700" y="1152475"/>
+            <a:ext cx="8520600" cy="3416400"/>
+          </a:xfrm>
+          <a:prstGeom prst="rect">
+            <a:avLst/>
+          </a:prstGeom>
+        </p:spPr>
+        <p:txBody>
+          <a:bodyPr anchorCtr="0" anchor="ctr" bIns="91425" lIns="91425" spcFirstLastPara="1" rIns="91425" wrap="square" tIns="91425">
+            <a:noAutofit/>
+          </a:bodyPr>
+          <a:lstStyle/>
+          <a:p>
+            <a:pPr indent="-342900" lvl="0" marL="457200" rtl="0" algn="l">
+              <a:spcBef>
+                <a:spcPts val="0"/>
+              </a:spcBef>
+              <a:spcAft>
+                <a:spcPts val="0"/>
+              </a:spcAft>
+              <a:buSzPts val="1800"/>
+              <a:buChar char="●"/>
+            </a:pPr>
+            <a:r>
+              <a:rPr lang="en-GB"/>
+              <a:t>Mathematical Understanding: </a:t>
+            </a:r>
+            <a:br>
+              <a:rPr lang="en-GB"/>
+            </a:br>
+            <a:r>
+              <a:rPr lang="en-GB" sz="1400"/>
+              <a:t>	“Bayesian Stats: From Concept to Data Analysis”,</a:t>
+            </a:r>
+            <a:br>
+              <a:rPr lang="en-GB" sz="1400"/>
+            </a:br>
+            <a:r>
+              <a:rPr lang="en-GB" sz="1400"/>
+              <a:t>	</a:t>
+            </a:r>
+            <a:r>
+              <a:rPr i="1" lang="en-GB" sz="1400"/>
+              <a:t>U of Santa Cruz </a:t>
+            </a:r>
+            <a:br>
+              <a:rPr i="1" lang="en-GB"/>
+            </a:br>
+            <a:endParaRPr/>
+          </a:p>
+          <a:p>
+            <a:pPr indent="-342900" lvl="0" marL="457200" rtl="0" algn="l">
+              <a:spcBef>
+                <a:spcPts val="0"/>
+              </a:spcBef>
+              <a:spcAft>
+                <a:spcPts val="0"/>
+              </a:spcAft>
+              <a:buSzPts val="1800"/>
+              <a:buChar char="●"/>
+            </a:pPr>
+            <a:r>
+              <a:rPr lang="en-GB"/>
+              <a:t>Intuition between Bayesianism &amp; Frequentism:</a:t>
+            </a:r>
+            <a:br>
+              <a:rPr lang="en-GB"/>
+            </a:br>
+            <a:r>
+              <a:rPr lang="en-GB" sz="1400"/>
+              <a:t>	“Frequentism and Bayesianism”,</a:t>
+            </a:r>
+            <a:br>
+              <a:rPr lang="en-GB" sz="1400"/>
+            </a:br>
+            <a:r>
+              <a:rPr lang="en-GB" sz="1400"/>
+              <a:t>	</a:t>
+            </a:r>
+            <a:r>
+              <a:rPr i="1" lang="en-GB" sz="1400"/>
+              <a:t>Scipy - Jake Vander Plas</a:t>
+            </a:r>
+            <a:r>
+              <a:rPr lang="en-GB" sz="1400"/>
+              <a:t> </a:t>
+            </a:r>
+            <a:endParaRPr sz="1400"/>
+          </a:p>
+        </p:txBody>
+      </p:sp>
+    </p:spTree>
+  </p:cSld>
+  <p:clrMapOvr>
+    <a:masterClrMapping/>
+  </p:clrMapOvr>
+</p:sld>
+</file>
+
+<file path=ppt/slides/slide47.xml><?xml version="1.0" encoding="utf-8"?>
+<p:sld xmlns:a="http://schemas.openxmlformats.org/drawingml/2006/main" xmlns:r="http://schemas.openxmlformats.org/officeDocument/2006/relationships" xmlns:mc="http://schemas.openxmlformats.org/markup-compatibility/2006" xmlns:mv="urn:schemas-microsoft-com:mac:vml" xmlns:p="http://schemas.openxmlformats.org/presentationml/2006/main" xmlns:c="http://schemas.openxmlformats.org/drawingml/2006/chart" xmlns:dgm="http://schemas.openxmlformats.org/drawingml/2006/diagram" xmlns:o="urn:schemas-microsoft-com:office:office" xmlns:v="urn:schemas-microsoft-com:vml" xmlns:pvml="urn:schemas-microsoft-com:office:powerpoint" xmlns:com="http://schemas.openxmlformats.org/drawingml/2006/compatibility" xmlns:p14="http://schemas.microsoft.com/office/powerpoint/2010/main" xmlns:p15="http://schemas.microsoft.com/office/powerpoint/2012/main">
+  <p:cSld>
+    <p:spTree>
+      <p:nvGrpSpPr>
+        <p:cNvPr id="420" name="Shape 420"/>
+        <p:cNvGrpSpPr/>
+        <p:nvPr/>
+      </p:nvGrpSpPr>
+      <p:grpSpPr>
+        <a:xfrm>
+          <a:off x="0" y="0"/>
+          <a:ext cx="0" cy="0"/>
+          <a:chOff x="0" y="0"/>
+          <a:chExt cx="0" cy="0"/>
+        </a:xfrm>
+      </p:grpSpPr>
+      <p:sp>
+        <p:nvSpPr>
+          <p:cNvPr id="421" name="Google Shape;421;p59"/>
+          <p:cNvSpPr txBox="1"/>
+          <p:nvPr>
+            <p:ph type="title"/>
+          </p:nvPr>
+        </p:nvSpPr>
+        <p:spPr>
+          <a:xfrm>
+            <a:off x="311700" y="445025"/>
+            <a:ext cx="8520600" cy="572700"/>
+          </a:xfrm>
+          <a:prstGeom prst="rect">
+            <a:avLst/>
+          </a:prstGeom>
+        </p:spPr>
+        <p:txBody>
+          <a:bodyPr anchorCtr="0" anchor="t" bIns="91425" lIns="91425" spcFirstLastPara="1" rIns="91425" wrap="square" tIns="91425">
+            <a:noAutofit/>
+          </a:bodyPr>
+          <a:lstStyle/>
+          <a:p>
+            <a:pPr indent="0" lvl="0" marL="0" rtl="0" algn="ctr">
+              <a:spcBef>
+                <a:spcPts val="0"/>
+              </a:spcBef>
+              <a:spcAft>
+                <a:spcPts val="0"/>
+              </a:spcAft>
+              <a:buNone/>
+            </a:pPr>
+            <a:r>
+              <a:rPr lang="en-GB"/>
+              <a:t>Find Slides on Github</a:t>
+            </a:r>
+            <a:endParaRPr/>
+          </a:p>
+        </p:txBody>
+      </p:sp>
+      <p:sp>
+        <p:nvSpPr>
+          <p:cNvPr id="422" name="Google Shape;422;p59"/>
+          <p:cNvSpPr txBox="1"/>
+          <p:nvPr>
+            <p:ph idx="1" type="body"/>
+          </p:nvPr>
+        </p:nvSpPr>
+        <p:spPr>
+          <a:xfrm>
+            <a:off x="311700" y="1152475"/>
+            <a:ext cx="3999900" cy="3416400"/>
+          </a:xfrm>
+          <a:prstGeom prst="rect">
+            <a:avLst/>
+          </a:prstGeom>
+        </p:spPr>
+        <p:txBody>
+          <a:bodyPr anchorCtr="0" anchor="t" bIns="91425" lIns="91425" spcFirstLastPara="1" rIns="91425" wrap="square" tIns="91425">
+            <a:noAutofit/>
+          </a:bodyPr>
+          <a:lstStyle/>
+          <a:p>
+            <a:pPr indent="0" lvl="0" marL="0" rtl="0" algn="ctr">
+              <a:lnSpc>
+                <a:spcPct val="100000"/>
+              </a:lnSpc>
+              <a:spcBef>
+                <a:spcPts val="0"/>
+              </a:spcBef>
+              <a:spcAft>
+                <a:spcPts val="0"/>
+              </a:spcAft>
+              <a:buNone/>
+            </a:pPr>
+            <a:r>
+              <a:rPr lang="en-GB" sz="2100"/>
+              <a:t>https://cutt.ly/zGqux9</a:t>
+            </a:r>
+            <a:endParaRPr/>
+          </a:p>
+        </p:txBody>
+      </p:sp>
+      <p:pic>
+        <p:nvPicPr>
+          <p:cNvPr id="423" name="Google Shape;423;p59"/>
+          <p:cNvPicPr preferRelativeResize="0"/>
+          <p:nvPr/>
+        </p:nvPicPr>
+        <p:blipFill>
+          <a:blip r:embed="rId3">
+            <a:alphaModFix/>
+          </a:blip>
+          <a:stretch>
+            <a:fillRect/>
+          </a:stretch>
+        </p:blipFill>
+        <p:spPr>
+          <a:xfrm>
+            <a:off x="1123725" y="1870900"/>
+            <a:ext cx="2375850" cy="2375850"/>
+          </a:xfrm>
+          <a:prstGeom prst="rect">
+            <a:avLst/>
+          </a:prstGeom>
+          <a:noFill/>
+          <a:ln>
+            <a:noFill/>
+          </a:ln>
+        </p:spPr>
+      </p:pic>
+      <p:pic>
+        <p:nvPicPr>
+          <p:cNvPr id="424" name="Google Shape;424;p59"/>
+          <p:cNvPicPr preferRelativeResize="0"/>
+          <p:nvPr/>
+        </p:nvPicPr>
+        <p:blipFill>
+          <a:blip r:embed="rId4">
+            <a:alphaModFix/>
+          </a:blip>
+          <a:stretch>
+            <a:fillRect/>
+          </a:stretch>
+        </p:blipFill>
+        <p:spPr>
+          <a:xfrm>
+            <a:off x="4471400" y="1474600"/>
+            <a:ext cx="4527602" cy="2772145"/>
+          </a:xfrm>
+          <a:prstGeom prst="rect">
+            <a:avLst/>
+          </a:prstGeom>
+          <a:noFill/>
+          <a:ln>
+            <a:noFill/>
+          </a:ln>
+        </p:spPr>
+      </p:pic>
+    </p:spTree>
+  </p:cSld>
+  <p:clrMapOvr>
+    <a:masterClrMapping/>
+  </p:clrMapOvr>
+</p:sld>
+</file>
+
+<file path=ppt/slides/slide48.xml><?xml version="1.0" encoding="utf-8"?>
+<p:sld xmlns:a="http://schemas.openxmlformats.org/drawingml/2006/main" xmlns:r="http://schemas.openxmlformats.org/officeDocument/2006/relationships" xmlns:mc="http://schemas.openxmlformats.org/markup-compatibility/2006" xmlns:mv="urn:schemas-microsoft-com:mac:vml" xmlns:p="http://schemas.openxmlformats.org/presentationml/2006/main" xmlns:c="http://schemas.openxmlformats.org/drawingml/2006/chart" xmlns:dgm="http://schemas.openxmlformats.org/drawingml/2006/diagram" xmlns:o="urn:schemas-microsoft-com:office:office" xmlns:v="urn:schemas-microsoft-com:vml" xmlns:pvml="urn:schemas-microsoft-com:office:powerpoint" xmlns:com="http://schemas.openxmlformats.org/drawingml/2006/compatibility" xmlns:p14="http://schemas.microsoft.com/office/powerpoint/2010/main" xmlns:p15="http://schemas.microsoft.com/office/powerpoint/2012/main">
+  <p:cSld>
+    <p:spTree>
+      <p:nvGrpSpPr>
+        <p:cNvPr id="428" name="Shape 428"/>
+        <p:cNvGrpSpPr/>
+        <p:nvPr/>
+      </p:nvGrpSpPr>
+      <p:grpSpPr>
+        <a:xfrm>
+          <a:off x="0" y="0"/>
+          <a:ext cx="0" cy="0"/>
+          <a:chOff x="0" y="0"/>
+          <a:chExt cx="0" cy="0"/>
+        </a:xfrm>
+      </p:grpSpPr>
+      <p:sp>
+        <p:nvSpPr>
+          <p:cNvPr id="429" name="Google Shape;429;p60"/>
+          <p:cNvSpPr txBox="1"/>
+          <p:nvPr>
             <p:ph type="ctrTitle"/>
           </p:nvPr>
         </p:nvSpPr>
@@ -24721,7 +26276,7 @@
       </p:sp>
       <p:sp>
         <p:nvSpPr>
-          <p:cNvPr id="397" name="Google Shape;397;p55"/>
+          <p:cNvPr id="430" name="Google Shape;430;p60"/>
           <p:cNvSpPr txBox="1"/>
           <p:nvPr>
             <p:ph idx="1" type="subTitle"/>
@@ -24772,7 +26327,7 @@
       </p:sp>
       <p:sp>
         <p:nvSpPr>
-          <p:cNvPr id="398" name="Google Shape;398;p55">
+          <p:cNvPr id="431" name="Google Shape;431;p60">
             <a:hlinkClick r:id="rId3"/>
           </p:cNvPr>
           <p:cNvSpPr/>
@@ -24986,7 +26541,7 @@
       </p:sp>
       <p:sp>
         <p:nvSpPr>
-          <p:cNvPr id="399" name="Google Shape;399;p55">
+          <p:cNvPr id="432" name="Google Shape;432;p60">
             <a:hlinkClick r:id="rId4"/>
           </p:cNvPr>
           <p:cNvSpPr/>
@@ -25237,7 +26792,7 @@
       </p:sp>
       <p:sp>
         <p:nvSpPr>
-          <p:cNvPr id="400" name="Google Shape;400;p55">
+          <p:cNvPr id="433" name="Google Shape;433;p60">
             <a:hlinkClick r:id="rId5"/>
           </p:cNvPr>
           <p:cNvSpPr/>

</xml_diff>